<commit_message>
fix bug and modify uml
</commit_message>
<xml_diff>
--- a/adhafera/interface/ui.pptx
+++ b/adhafera/interface/ui.pptx
@@ -201,7 +201,7 @@
           <a:p>
             <a:fld id="{EE82FEE5-269B-9B49-A8C4-823C45BE6055}" type="datetimeFigureOut">
               <a:rPr kumimoji="1" lang="ja-JP" altLang="en-US" smtClean="0"/>
-              <a:t>15/02/08</a:t>
+              <a:t>15/04/05</a:t>
             </a:fld>
             <a:endParaRPr kumimoji="1" lang="ja-JP" altLang="en-US"/>
           </a:p>
@@ -1018,7 +1018,7 @@
           <a:p>
             <a:fld id="{3ABA01A1-4899-9944-833D-6A66CDE659CB}" type="datetimeFigureOut">
               <a:rPr kumimoji="1" lang="ja-JP" altLang="en-US" smtClean="0"/>
-              <a:t>15/02/08</a:t>
+              <a:t>15/04/05</a:t>
             </a:fld>
             <a:endParaRPr kumimoji="1" lang="ja-JP" altLang="en-US"/>
           </a:p>
@@ -1220,7 +1220,7 @@
           <a:p>
             <a:fld id="{3ABA01A1-4899-9944-833D-6A66CDE659CB}" type="datetimeFigureOut">
               <a:rPr kumimoji="1" lang="ja-JP" altLang="en-US" smtClean="0"/>
-              <a:t>15/02/08</a:t>
+              <a:t>15/04/05</a:t>
             </a:fld>
             <a:endParaRPr kumimoji="1" lang="ja-JP" altLang="en-US"/>
           </a:p>
@@ -1432,7 +1432,7 @@
           <a:p>
             <a:fld id="{3ABA01A1-4899-9944-833D-6A66CDE659CB}" type="datetimeFigureOut">
               <a:rPr kumimoji="1" lang="ja-JP" altLang="en-US" smtClean="0"/>
-              <a:t>15/02/08</a:t>
+              <a:t>15/04/05</a:t>
             </a:fld>
             <a:endParaRPr kumimoji="1" lang="ja-JP" altLang="en-US"/>
           </a:p>
@@ -1634,7 +1634,7 @@
           <a:p>
             <a:fld id="{3ABA01A1-4899-9944-833D-6A66CDE659CB}" type="datetimeFigureOut">
               <a:rPr kumimoji="1" lang="ja-JP" altLang="en-US" smtClean="0"/>
-              <a:t>15/02/08</a:t>
+              <a:t>15/04/05</a:t>
             </a:fld>
             <a:endParaRPr kumimoji="1" lang="ja-JP" altLang="en-US"/>
           </a:p>
@@ -1880,7 +1880,7 @@
           <a:p>
             <a:fld id="{3ABA01A1-4899-9944-833D-6A66CDE659CB}" type="datetimeFigureOut">
               <a:rPr kumimoji="1" lang="ja-JP" altLang="en-US" smtClean="0"/>
-              <a:t>15/02/08</a:t>
+              <a:t>15/04/05</a:t>
             </a:fld>
             <a:endParaRPr kumimoji="1" lang="ja-JP" altLang="en-US"/>
           </a:p>
@@ -2232,7 +2232,7 @@
           <a:p>
             <a:fld id="{3ABA01A1-4899-9944-833D-6A66CDE659CB}" type="datetimeFigureOut">
               <a:rPr kumimoji="1" lang="ja-JP" altLang="en-US" smtClean="0"/>
-              <a:t>15/02/08</a:t>
+              <a:t>15/04/05</a:t>
             </a:fld>
             <a:endParaRPr kumimoji="1" lang="ja-JP" altLang="en-US"/>
           </a:p>
@@ -2718,7 +2718,7 @@
           <a:p>
             <a:fld id="{3ABA01A1-4899-9944-833D-6A66CDE659CB}" type="datetimeFigureOut">
               <a:rPr kumimoji="1" lang="ja-JP" altLang="en-US" smtClean="0"/>
-              <a:t>15/02/08</a:t>
+              <a:t>15/04/05</a:t>
             </a:fld>
             <a:endParaRPr kumimoji="1" lang="ja-JP" altLang="en-US"/>
           </a:p>
@@ -2836,7 +2836,7 @@
           <a:p>
             <a:fld id="{3ABA01A1-4899-9944-833D-6A66CDE659CB}" type="datetimeFigureOut">
               <a:rPr kumimoji="1" lang="ja-JP" altLang="en-US" smtClean="0"/>
-              <a:t>15/02/08</a:t>
+              <a:t>15/04/05</a:t>
             </a:fld>
             <a:endParaRPr kumimoji="1" lang="ja-JP" altLang="en-US"/>
           </a:p>
@@ -2931,7 +2931,7 @@
           <a:p>
             <a:fld id="{3ABA01A1-4899-9944-833D-6A66CDE659CB}" type="datetimeFigureOut">
               <a:rPr kumimoji="1" lang="ja-JP" altLang="en-US" smtClean="0"/>
-              <a:t>15/02/08</a:t>
+              <a:t>15/04/05</a:t>
             </a:fld>
             <a:endParaRPr kumimoji="1" lang="ja-JP" altLang="en-US"/>
           </a:p>
@@ -3240,7 +3240,7 @@
           <a:p>
             <a:fld id="{3ABA01A1-4899-9944-833D-6A66CDE659CB}" type="datetimeFigureOut">
               <a:rPr kumimoji="1" lang="ja-JP" altLang="en-US" smtClean="0"/>
-              <a:t>15/02/08</a:t>
+              <a:t>15/04/05</a:t>
             </a:fld>
             <a:endParaRPr kumimoji="1" lang="ja-JP" altLang="en-US"/>
           </a:p>
@@ -3493,7 +3493,7 @@
           <a:p>
             <a:fld id="{3ABA01A1-4899-9944-833D-6A66CDE659CB}" type="datetimeFigureOut">
               <a:rPr kumimoji="1" lang="ja-JP" altLang="en-US" smtClean="0"/>
-              <a:t>15/02/08</a:t>
+              <a:t>15/04/05</a:t>
             </a:fld>
             <a:endParaRPr kumimoji="1" lang="ja-JP" altLang="en-US"/>
           </a:p>
@@ -3738,7 +3738,7 @@
           <a:p>
             <a:fld id="{3ABA01A1-4899-9944-833D-6A66CDE659CB}" type="datetimeFigureOut">
               <a:rPr kumimoji="1" lang="ja-JP" altLang="en-US" smtClean="0"/>
-              <a:t>15/02/08</a:t>
+              <a:t>15/04/05</a:t>
             </a:fld>
             <a:endParaRPr kumimoji="1" lang="ja-JP" altLang="en-US"/>
           </a:p>
@@ -4174,11 +4174,11 @@
             </a:r>
             <a:r>
               <a:rPr lang="en-US" altLang="ja-JP" sz="2800" dirty="0" smtClean="0"/>
-              <a:t>2015/02/</a:t>
+              <a:t>2015/</a:t>
             </a:r>
             <a:r>
               <a:rPr lang="en-US" altLang="ja-JP" sz="2800" dirty="0" smtClean="0"/>
-              <a:t>08</a:t>
+              <a:t>04/05</a:t>
             </a:r>
             <a:r>
               <a:rPr lang="en-US" altLang="ja-JP" sz="2800" dirty="0" smtClean="0"/>
@@ -4193,7 +4193,11 @@
             </a:r>
             <a:r>
               <a:rPr lang="en-US" altLang="ja-JP" sz="2800" dirty="0" smtClean="0"/>
-              <a:t> 3.4.0</a:t>
+              <a:t> </a:t>
+            </a:r>
+            <a:r>
+              <a:rPr lang="en-US" altLang="ja-JP" sz="2800" dirty="0" smtClean="0"/>
+              <a:t>3.5.0</a:t>
             </a:r>
             <a:endParaRPr kumimoji="1" lang="ja-JP" altLang="en-US" dirty="0"/>
           </a:p>
@@ -4589,8 +4593,8 @@
         </p:nvSpPr>
         <p:spPr>
           <a:xfrm>
-            <a:off x="2045567" y="5982125"/>
-            <a:ext cx="1243263" cy="360947"/>
+            <a:off x="948411" y="5973618"/>
+            <a:ext cx="1481133" cy="360947"/>
           </a:xfrm>
           <a:prstGeom prst="roundRect">
             <a:avLst/>
@@ -4632,6 +4636,91 @@
                 <a:cs typeface="メイリオ"/>
               </a:rPr>
               <a:t>削除</a:t>
+            </a:r>
+            <a:endParaRPr lang="en-US" altLang="ja-JP" dirty="0" smtClean="0">
+              <a:solidFill>
+                <a:srgbClr val="FF0000"/>
+              </a:solidFill>
+              <a:latin typeface="メイリオ"/>
+              <a:ea typeface="メイリオ"/>
+              <a:cs typeface="メイリオ"/>
+            </a:endParaRPr>
+          </a:p>
+        </p:txBody>
+      </p:sp>
+      <p:sp>
+        <p:nvSpPr>
+          <p:cNvPr id="12" name="角丸四角形 11"/>
+          <p:cNvSpPr/>
+          <p:nvPr/>
+        </p:nvSpPr>
+        <p:spPr>
+          <a:xfrm>
+            <a:off x="2891210" y="5980546"/>
+            <a:ext cx="1520370" cy="360947"/>
+          </a:xfrm>
+          <a:prstGeom prst="roundRect">
+            <a:avLst/>
+          </a:prstGeom>
+          <a:noFill/>
+          <a:ln w="25400">
+            <a:solidFill>
+              <a:srgbClr val="FF0000"/>
+            </a:solidFill>
+          </a:ln>
+          <a:effectLst/>
+        </p:spPr>
+        <p:style>
+          <a:lnRef idx="1">
+            <a:schemeClr val="accent1"/>
+          </a:lnRef>
+          <a:fillRef idx="3">
+            <a:schemeClr val="accent1"/>
+          </a:fillRef>
+          <a:effectRef idx="2">
+            <a:schemeClr val="accent1"/>
+          </a:effectRef>
+          <a:fontRef idx="minor">
+            <a:schemeClr val="lt1"/>
+          </a:fontRef>
+        </p:style>
+        <p:txBody>
+          <a:bodyPr rtlCol="0" anchor="ctr"/>
+          <a:lstStyle/>
+          <a:p>
+            <a:pPr algn="ctr"/>
+            <a:r>
+              <a:rPr lang="en-US" altLang="en-US" dirty="0" smtClean="0">
+                <a:solidFill>
+                  <a:srgbClr val="FF0000"/>
+                </a:solidFill>
+                <a:latin typeface="メイリオ"/>
+                <a:ea typeface="メイリオ"/>
+                <a:cs typeface="メイリオ"/>
+              </a:rPr>
+              <a:t>全</a:t>
+            </a:r>
+            <a:r>
+              <a:rPr lang="en-US" altLang="en-US" dirty="0" smtClean="0">
+                <a:solidFill>
+                  <a:srgbClr val="FF0000"/>
+                </a:solidFill>
+                <a:latin typeface="メイリオ"/>
+                <a:ea typeface="メイリオ"/>
+                <a:cs typeface="メイリオ"/>
+              </a:rPr>
+              <a:t>削</a:t>
+            </a:r>
+            <a:r>
+              <a:rPr lang="en-US" altLang="en-US" dirty="0" smtClean="0">
+                <a:solidFill>
+                  <a:srgbClr val="FF0000"/>
+                </a:solidFill>
+                <a:latin typeface="メイリオ"/>
+                <a:ea typeface="メイリオ"/>
+                <a:cs typeface="メイリオ"/>
+              </a:rPr>
+              <a:t>除</a:t>
             </a:r>
             <a:endParaRPr lang="en-US" altLang="ja-JP" dirty="0" smtClean="0">
               <a:solidFill>

</xml_diff>

<commit_message>
output images for ui
</commit_message>
<xml_diff>
--- a/adhafera/interface/ui.pptx
+++ b/adhafera/interface/ui.pptx
@@ -4084,15 +4084,7 @@
             </a:r>
             <a:r>
               <a:rPr lang="en-US" altLang="ja-JP" sz="2800" dirty="0" smtClean="0"/>
-              <a:t>2016/</a:t>
-            </a:r>
-            <a:r>
-              <a:rPr lang="en-US" altLang="ja-JP" sz="2800" dirty="0" smtClean="0"/>
-              <a:t>08/06</a:t>
-            </a:r>
-            <a:r>
-              <a:rPr lang="en-US" altLang="ja-JP" sz="2800" dirty="0" smtClean="0"/>
-              <a:t/>
+              <a:t>2016/08/06</a:t>
             </a:r>
             <a:br>
               <a:rPr lang="en-US" altLang="ja-JP" sz="2800" dirty="0" smtClean="0"/>
@@ -4103,11 +4095,7 @@
             </a:r>
             <a:r>
               <a:rPr lang="en-US" altLang="ja-JP" sz="2800" dirty="0" smtClean="0"/>
-              <a:t> </a:t>
-            </a:r>
-            <a:r>
-              <a:rPr lang="en-US" altLang="ja-JP" sz="2800" dirty="0" smtClean="0"/>
-              <a:t>2.0.0</a:t>
+              <a:t> 2.0.0</a:t>
             </a:r>
             <a:endParaRPr kumimoji="1" lang="ja-JP" altLang="en-US" dirty="0"/>
           </a:p>
@@ -4183,16 +4171,16 @@
       </p:sp>
       <p:grpSp>
         <p:nvGrpSpPr>
-          <p:cNvPr id="6" name="図形グループ 5"/>
+          <p:cNvPr id="2" name="図形グループ 1"/>
           <p:cNvGrpSpPr/>
           <p:nvPr/>
         </p:nvGrpSpPr>
         <p:grpSpPr>
           <a:xfrm>
             <a:off x="2399632" y="815476"/>
-            <a:ext cx="4130842" cy="5788523"/>
+            <a:ext cx="5453293" cy="5788523"/>
             <a:chOff x="2399632" y="815476"/>
-            <a:chExt cx="4130842" cy="5788523"/>
+            <a:chExt cx="5453293" cy="5788523"/>
           </a:xfrm>
         </p:grpSpPr>
         <p:sp>
@@ -4995,329 +4983,324 @@
             </a:p>
           </p:txBody>
         </p:sp>
-      </p:grpSp>
-      <p:sp>
-        <p:nvSpPr>
-          <p:cNvPr id="28" name="円形吹き出し 27"/>
-          <p:cNvSpPr/>
-          <p:nvPr/>
-        </p:nvSpPr>
-        <p:spPr>
-          <a:xfrm>
-            <a:off x="5443408" y="1665279"/>
-            <a:ext cx="2409517" cy="872852"/>
-          </a:xfrm>
-          <a:prstGeom prst="wedgeEllipseCallout">
-            <a:avLst>
-              <a:gd name="adj1" fmla="val -47434"/>
-              <a:gd name="adj2" fmla="val -62691"/>
-            </a:avLst>
-          </a:prstGeom>
-          <a:solidFill>
-            <a:schemeClr val="bg1"/>
-          </a:solidFill>
-          <a:ln w="19050">
+        <p:sp>
+          <p:nvSpPr>
+            <p:cNvPr id="28" name="円形吹き出し 27"/>
+            <p:cNvSpPr/>
+            <p:nvPr/>
+          </p:nvSpPr>
+          <p:spPr>
+            <a:xfrm>
+              <a:off x="5443408" y="1665279"/>
+              <a:ext cx="2409517" cy="872852"/>
+            </a:xfrm>
+            <a:prstGeom prst="wedgeEllipseCallout">
+              <a:avLst>
+                <a:gd name="adj1" fmla="val -47434"/>
+                <a:gd name="adj2" fmla="val -62691"/>
+              </a:avLst>
+            </a:prstGeom>
             <a:solidFill>
-              <a:srgbClr val="008000"/>
+              <a:schemeClr val="bg1"/>
             </a:solidFill>
-          </a:ln>
-        </p:spPr>
-        <p:style>
-          <a:lnRef idx="1">
-            <a:schemeClr val="accent1"/>
-          </a:lnRef>
-          <a:fillRef idx="3">
-            <a:schemeClr val="accent1"/>
-          </a:fillRef>
-          <a:effectRef idx="2">
-            <a:schemeClr val="accent1"/>
-          </a:effectRef>
-          <a:fontRef idx="minor">
-            <a:schemeClr val="lt1"/>
-          </a:fontRef>
-        </p:style>
-        <p:txBody>
-          <a:bodyPr rtlCol="0" anchor="ctr"/>
-          <a:lstStyle/>
-          <a:p>
-            <a:pPr algn="ctr"/>
-            <a:endParaRPr kumimoji="1" lang="ja-JP" altLang="en-US" sz="1400" dirty="0">
+            <a:ln w="19050">
               <a:solidFill>
-                <a:schemeClr val="tx1"/>
+                <a:srgbClr val="008000"/>
               </a:solidFill>
-              <a:latin typeface="メイリオ"/>
-              <a:ea typeface="メイリオ"/>
-              <a:cs typeface="メイリオ"/>
-            </a:endParaRPr>
-          </a:p>
-        </p:txBody>
-      </p:sp>
-      <p:sp>
-        <p:nvSpPr>
-          <p:cNvPr id="29" name="テキスト ボックス 28"/>
-          <p:cNvSpPr txBox="1"/>
-          <p:nvPr/>
-        </p:nvSpPr>
-        <p:spPr>
-          <a:xfrm>
-            <a:off x="5648428" y="1837660"/>
-            <a:ext cx="1980029" cy="523220"/>
-          </a:xfrm>
-          <a:prstGeom prst="rect">
-            <a:avLst/>
-          </a:prstGeom>
-          <a:noFill/>
-        </p:spPr>
-        <p:txBody>
-          <a:bodyPr wrap="none" rtlCol="0">
-            <a:spAutoFit/>
-          </a:bodyPr>
-          <a:lstStyle/>
-          <a:p>
-            <a:r>
-              <a:rPr lang="ja-JP" altLang="en-US" sz="1400" dirty="0" smtClean="0">
+            </a:ln>
+          </p:spPr>
+          <p:style>
+            <a:lnRef idx="1">
+              <a:schemeClr val="accent1"/>
+            </a:lnRef>
+            <a:fillRef idx="3">
+              <a:schemeClr val="accent1"/>
+            </a:fillRef>
+            <a:effectRef idx="2">
+              <a:schemeClr val="accent1"/>
+            </a:effectRef>
+            <a:fontRef idx="minor">
+              <a:schemeClr val="lt1"/>
+            </a:fontRef>
+          </p:style>
+          <p:txBody>
+            <a:bodyPr rtlCol="0" anchor="ctr"/>
+            <a:lstStyle/>
+            <a:p>
+              <a:pPr algn="ctr"/>
+              <a:endParaRPr kumimoji="1" lang="ja-JP" altLang="en-US" sz="1400" dirty="0">
+                <a:solidFill>
+                  <a:schemeClr val="tx1"/>
+                </a:solidFill>
                 <a:latin typeface="メイリオ"/>
                 <a:ea typeface="メイリオ"/>
                 <a:cs typeface="メイリオ"/>
-              </a:rPr>
-              <a:t>アプリ起動時の</a:t>
-            </a:r>
-            <a:r>
-              <a:rPr lang="en-US" altLang="en-US" sz="1400" dirty="0" smtClean="0">
+              </a:endParaRPr>
+            </a:p>
+          </p:txBody>
+        </p:sp>
+        <p:sp>
+          <p:nvSpPr>
+            <p:cNvPr id="29" name="テキスト ボックス 28"/>
+            <p:cNvSpPr txBox="1"/>
+            <p:nvPr/>
+          </p:nvSpPr>
+          <p:spPr>
+            <a:xfrm>
+              <a:off x="5648428" y="1837660"/>
+              <a:ext cx="1980029" cy="523220"/>
+            </a:xfrm>
+            <a:prstGeom prst="rect">
+              <a:avLst/>
+            </a:prstGeom>
+            <a:noFill/>
+          </p:spPr>
+          <p:txBody>
+            <a:bodyPr wrap="none" rtlCol="0">
+              <a:spAutoFit/>
+            </a:bodyPr>
+            <a:lstStyle/>
+            <a:p>
+              <a:r>
+                <a:rPr lang="ja-JP" altLang="en-US" sz="1400" dirty="0" smtClean="0">
+                  <a:latin typeface="メイリオ"/>
+                  <a:ea typeface="メイリオ"/>
+                  <a:cs typeface="メイリオ"/>
+                </a:rPr>
+                <a:t>アプリ起動時の</a:t>
+              </a:r>
+              <a:r>
+                <a:rPr lang="en-US" altLang="en-US" sz="1400" dirty="0" smtClean="0">
+                  <a:latin typeface="メイリオ"/>
+                  <a:ea typeface="メイリオ"/>
+                  <a:cs typeface="メイリオ"/>
+                </a:rPr>
+                <a:t>日付が</a:t>
+              </a:r>
+            </a:p>
+            <a:p>
+              <a:r>
+                <a:rPr lang="ja-JP" altLang="en-US" sz="1400" dirty="0" smtClean="0">
+                  <a:latin typeface="メイリオ"/>
+                  <a:ea typeface="メイリオ"/>
+                  <a:cs typeface="メイリオ"/>
+                </a:rPr>
+                <a:t>入力されている</a:t>
+              </a:r>
+              <a:endParaRPr lang="en-US" altLang="ja-JP" sz="1400" dirty="0" smtClean="0">
                 <a:latin typeface="メイリオ"/>
                 <a:ea typeface="メイリオ"/>
                 <a:cs typeface="メイリオ"/>
-              </a:rPr>
-              <a:t>日付が</a:t>
-            </a:r>
-          </a:p>
-          <a:p>
-            <a:r>
-              <a:rPr lang="ja-JP" altLang="en-US" sz="1400" dirty="0" smtClean="0">
+              </a:endParaRPr>
+            </a:p>
+          </p:txBody>
+        </p:sp>
+        <p:sp>
+          <p:nvSpPr>
+            <p:cNvPr id="30" name="テキスト ボックス 29"/>
+            <p:cNvSpPr txBox="1"/>
+            <p:nvPr/>
+          </p:nvSpPr>
+          <p:spPr>
+            <a:xfrm>
+              <a:off x="3041515" y="4056699"/>
+              <a:ext cx="877163" cy="369332"/>
+            </a:xfrm>
+            <a:prstGeom prst="rect">
+              <a:avLst/>
+            </a:prstGeom>
+            <a:noFill/>
+            <a:ln>
+              <a:noFill/>
+            </a:ln>
+          </p:spPr>
+          <p:txBody>
+            <a:bodyPr wrap="none" rtlCol="0">
+              <a:spAutoFit/>
+            </a:bodyPr>
+            <a:lstStyle/>
+            <a:p>
+              <a:r>
+                <a:rPr lang="en-US" altLang="en-US" dirty="0" smtClean="0">
+                  <a:latin typeface="メイリオ"/>
+                  <a:ea typeface="メイリオ"/>
+                  <a:cs typeface="メイリオ"/>
+                </a:rPr>
+                <a:t>収支</a:t>
+              </a:r>
+              <a:r>
+                <a:rPr kumimoji="1" lang="ja-JP" altLang="en-US" dirty="0" smtClean="0">
+                  <a:latin typeface="メイリオ"/>
+                  <a:ea typeface="メイリオ"/>
+                  <a:cs typeface="メイリオ"/>
+                </a:rPr>
+                <a:t>：</a:t>
+              </a:r>
+              <a:endParaRPr kumimoji="1" lang="ja-JP" altLang="en-US" dirty="0">
                 <a:latin typeface="メイリオ"/>
                 <a:ea typeface="メイリオ"/>
                 <a:cs typeface="メイリオ"/>
-              </a:rPr>
-              <a:t>入力されている</a:t>
-            </a:r>
-            <a:endParaRPr lang="en-US" altLang="ja-JP" sz="1400" dirty="0" smtClean="0">
-              <a:latin typeface="メイリオ"/>
-              <a:ea typeface="メイリオ"/>
-              <a:cs typeface="メイリオ"/>
-            </a:endParaRPr>
-          </a:p>
-        </p:txBody>
-      </p:sp>
-      <p:sp>
-        <p:nvSpPr>
-          <p:cNvPr id="30" name="テキスト ボックス 29"/>
-          <p:cNvSpPr txBox="1"/>
-          <p:nvPr/>
-        </p:nvSpPr>
-        <p:spPr>
-          <a:xfrm>
-            <a:off x="3041515" y="4056699"/>
-            <a:ext cx="877163" cy="369332"/>
-          </a:xfrm>
-          <a:prstGeom prst="rect">
-            <a:avLst/>
-          </a:prstGeom>
-          <a:noFill/>
-          <a:ln>
+              </a:endParaRPr>
+            </a:p>
+          </p:txBody>
+        </p:sp>
+        <p:sp>
+          <p:nvSpPr>
+            <p:cNvPr id="31" name="テキスト ボックス 30"/>
+            <p:cNvSpPr txBox="1"/>
+            <p:nvPr/>
+          </p:nvSpPr>
+          <p:spPr>
+            <a:xfrm>
+              <a:off x="4669812" y="4056699"/>
+              <a:ext cx="1184413" cy="369332"/>
+            </a:xfrm>
+            <a:prstGeom prst="rect">
+              <a:avLst/>
+            </a:prstGeom>
             <a:noFill/>
-          </a:ln>
-        </p:spPr>
-        <p:txBody>
-          <a:bodyPr wrap="none" rtlCol="0">
-            <a:spAutoFit/>
-          </a:bodyPr>
-          <a:lstStyle/>
-          <a:p>
-            <a:r>
-              <a:rPr lang="en-US" altLang="en-US" dirty="0" smtClean="0">
+            <a:ln>
+              <a:noFill/>
+            </a:ln>
+          </p:spPr>
+          <p:txBody>
+            <a:bodyPr wrap="square" rtlCol="0">
+              <a:spAutoFit/>
+            </a:bodyPr>
+            <a:lstStyle/>
+            <a:p>
+              <a:r>
+                <a:rPr lang="en-US" altLang="ja-JP" dirty="0" err="1" smtClean="0">
+                  <a:latin typeface="メイリオ"/>
+                  <a:ea typeface="メイリオ"/>
+                  <a:cs typeface="メイリオ"/>
+                </a:rPr>
+                <a:t>xxxxx</a:t>
+              </a:r>
+              <a:r>
+                <a:rPr lang="en-US" altLang="ja-JP" dirty="0">
+                  <a:latin typeface="メイリオ"/>
+                  <a:ea typeface="メイリオ"/>
+                  <a:cs typeface="メイリオ"/>
+                </a:rPr>
+                <a:t> </a:t>
+              </a:r>
+              <a:r>
+                <a:rPr lang="ja-JP" altLang="en-US" dirty="0" smtClean="0">
+                  <a:latin typeface="メイリオ"/>
+                  <a:ea typeface="メイリオ"/>
+                  <a:cs typeface="メイリオ"/>
+                </a:rPr>
+                <a:t>円</a:t>
+              </a:r>
+              <a:endParaRPr kumimoji="1" lang="ja-JP" altLang="en-US" dirty="0">
                 <a:latin typeface="メイリオ"/>
                 <a:ea typeface="メイリオ"/>
                 <a:cs typeface="メイリオ"/>
-              </a:rPr>
-              <a:t>収支</a:t>
-            </a:r>
-            <a:r>
-              <a:rPr kumimoji="1" lang="ja-JP" altLang="en-US" dirty="0" smtClean="0">
+              </a:endParaRPr>
+            </a:p>
+          </p:txBody>
+        </p:sp>
+        <p:sp>
+          <p:nvSpPr>
+            <p:cNvPr id="32" name="円形吹き出し 31"/>
+            <p:cNvSpPr/>
+            <p:nvPr/>
+          </p:nvSpPr>
+          <p:spPr>
+            <a:xfrm>
+              <a:off x="5133990" y="4623225"/>
+              <a:ext cx="2409517" cy="872852"/>
+            </a:xfrm>
+            <a:prstGeom prst="wedgeEllipseCallout">
+              <a:avLst>
+                <a:gd name="adj1" fmla="val -47434"/>
+                <a:gd name="adj2" fmla="val -62691"/>
+              </a:avLst>
+            </a:prstGeom>
+            <a:solidFill>
+              <a:schemeClr val="bg1"/>
+            </a:solidFill>
+            <a:ln w="19050">
+              <a:solidFill>
+                <a:srgbClr val="008000"/>
+              </a:solidFill>
+            </a:ln>
+          </p:spPr>
+          <p:style>
+            <a:lnRef idx="1">
+              <a:schemeClr val="accent1"/>
+            </a:lnRef>
+            <a:fillRef idx="3">
+              <a:schemeClr val="accent1"/>
+            </a:fillRef>
+            <a:effectRef idx="2">
+              <a:schemeClr val="accent1"/>
+            </a:effectRef>
+            <a:fontRef idx="minor">
+              <a:schemeClr val="lt1"/>
+            </a:fontRef>
+          </p:style>
+          <p:txBody>
+            <a:bodyPr rtlCol="0" anchor="ctr"/>
+            <a:lstStyle/>
+            <a:p>
+              <a:pPr algn="ctr"/>
+              <a:endParaRPr kumimoji="1" lang="ja-JP" altLang="en-US" sz="1400" dirty="0">
+                <a:solidFill>
+                  <a:schemeClr val="tx1"/>
+                </a:solidFill>
                 <a:latin typeface="メイリオ"/>
                 <a:ea typeface="メイリオ"/>
                 <a:cs typeface="メイリオ"/>
-              </a:rPr>
-              <a:t>：</a:t>
-            </a:r>
-            <a:endParaRPr kumimoji="1" lang="ja-JP" altLang="en-US" dirty="0">
-              <a:latin typeface="メイリオ"/>
-              <a:ea typeface="メイリオ"/>
-              <a:cs typeface="メイリオ"/>
-            </a:endParaRPr>
-          </a:p>
-        </p:txBody>
-      </p:sp>
-      <p:sp>
-        <p:nvSpPr>
-          <p:cNvPr id="31" name="テキスト ボックス 30"/>
-          <p:cNvSpPr txBox="1"/>
-          <p:nvPr/>
-        </p:nvSpPr>
-        <p:spPr>
-          <a:xfrm>
-            <a:off x="4669812" y="4056699"/>
-            <a:ext cx="1184413" cy="369332"/>
-          </a:xfrm>
-          <a:prstGeom prst="rect">
-            <a:avLst/>
-          </a:prstGeom>
-          <a:noFill/>
-          <a:ln>
+              </a:endParaRPr>
+            </a:p>
+          </p:txBody>
+        </p:sp>
+        <p:sp>
+          <p:nvSpPr>
+            <p:cNvPr id="33" name="テキスト ボックス 32"/>
+            <p:cNvSpPr txBox="1"/>
+            <p:nvPr/>
+          </p:nvSpPr>
+          <p:spPr>
+            <a:xfrm>
+              <a:off x="5285980" y="4807152"/>
+              <a:ext cx="2159566" cy="523220"/>
+            </a:xfrm>
+            <a:prstGeom prst="rect">
+              <a:avLst/>
+            </a:prstGeom>
             <a:noFill/>
-          </a:ln>
-        </p:spPr>
-        <p:txBody>
-          <a:bodyPr wrap="square" rtlCol="0">
-            <a:spAutoFit/>
-          </a:bodyPr>
-          <a:lstStyle/>
-          <a:p>
-            <a:r>
-              <a:rPr lang="en-US" altLang="ja-JP" dirty="0" err="1" smtClean="0">
-                <a:latin typeface="メイリオ"/>
-                <a:ea typeface="メイリオ"/>
-                <a:cs typeface="メイリオ"/>
-              </a:rPr>
-              <a:t>xxxxx</a:t>
-            </a:r>
-            <a:r>
-              <a:rPr lang="en-US" altLang="ja-JP" dirty="0">
-                <a:latin typeface="メイリオ"/>
-                <a:ea typeface="メイリオ"/>
-                <a:cs typeface="メイリオ"/>
-              </a:rPr>
-              <a:t> </a:t>
-            </a:r>
-            <a:r>
-              <a:rPr lang="ja-JP" altLang="en-US" dirty="0" smtClean="0">
-                <a:latin typeface="メイリオ"/>
-                <a:ea typeface="メイリオ"/>
-                <a:cs typeface="メイリオ"/>
-              </a:rPr>
-              <a:t>円</a:t>
-            </a:r>
-            <a:endParaRPr kumimoji="1" lang="ja-JP" altLang="en-US" dirty="0">
-              <a:latin typeface="メイリオ"/>
-              <a:ea typeface="メイリオ"/>
-              <a:cs typeface="メイリオ"/>
-            </a:endParaRPr>
-          </a:p>
-        </p:txBody>
-      </p:sp>
-      <p:sp>
-        <p:nvSpPr>
-          <p:cNvPr id="32" name="円形吹き出し 31"/>
-          <p:cNvSpPr/>
-          <p:nvPr/>
-        </p:nvSpPr>
-        <p:spPr>
-          <a:xfrm>
-            <a:off x="5133990" y="4623225"/>
-            <a:ext cx="2409517" cy="872852"/>
-          </a:xfrm>
-          <a:prstGeom prst="wedgeEllipseCallout">
-            <a:avLst>
-              <a:gd name="adj1" fmla="val -47434"/>
-              <a:gd name="adj2" fmla="val -62691"/>
-            </a:avLst>
-          </a:prstGeom>
-          <a:solidFill>
-            <a:schemeClr val="bg1"/>
-          </a:solidFill>
-          <a:ln w="19050">
-            <a:solidFill>
-              <a:srgbClr val="008000"/>
-            </a:solidFill>
-          </a:ln>
-        </p:spPr>
-        <p:style>
-          <a:lnRef idx="1">
-            <a:schemeClr val="accent1"/>
-          </a:lnRef>
-          <a:fillRef idx="3">
-            <a:schemeClr val="accent1"/>
-          </a:fillRef>
-          <a:effectRef idx="2">
-            <a:schemeClr val="accent1"/>
-          </a:effectRef>
-          <a:fontRef idx="minor">
-            <a:schemeClr val="lt1"/>
-          </a:fontRef>
-        </p:style>
-        <p:txBody>
-          <a:bodyPr rtlCol="0" anchor="ctr"/>
-          <a:lstStyle/>
-          <a:p>
-            <a:pPr algn="ctr"/>
-            <a:endParaRPr kumimoji="1" lang="ja-JP" altLang="en-US" sz="1400" dirty="0">
-              <a:solidFill>
-                <a:schemeClr val="tx1"/>
-              </a:solidFill>
-              <a:latin typeface="メイリオ"/>
-              <a:ea typeface="メイリオ"/>
-              <a:cs typeface="メイリオ"/>
-            </a:endParaRPr>
-          </a:p>
-        </p:txBody>
-      </p:sp>
-      <p:sp>
-        <p:nvSpPr>
-          <p:cNvPr id="33" name="テキスト ボックス 32"/>
-          <p:cNvSpPr txBox="1"/>
-          <p:nvPr/>
-        </p:nvSpPr>
-        <p:spPr>
-          <a:xfrm>
-            <a:off x="5285980" y="4807152"/>
-            <a:ext cx="2159566" cy="523220"/>
-          </a:xfrm>
-          <a:prstGeom prst="rect">
-            <a:avLst/>
-          </a:prstGeom>
-          <a:noFill/>
-        </p:spPr>
-        <p:txBody>
-          <a:bodyPr wrap="none" rtlCol="0">
-            <a:spAutoFit/>
-          </a:bodyPr>
-          <a:lstStyle/>
-          <a:p>
-            <a:r>
-              <a:rPr lang="en-US" altLang="en-US" sz="1400" dirty="0" smtClean="0">
-                <a:latin typeface="メイリオ"/>
-                <a:ea typeface="メイリオ"/>
-                <a:cs typeface="メイリオ"/>
-              </a:rPr>
-              <a:t>アプリ起動時の月の収支</a:t>
-            </a:r>
-          </a:p>
-          <a:p>
-            <a:r>
-              <a:rPr lang="en-US" altLang="en-US" sz="1400" dirty="0" smtClean="0">
-                <a:latin typeface="メイリオ"/>
-                <a:ea typeface="メイリオ"/>
-                <a:cs typeface="メイリオ"/>
-              </a:rPr>
-              <a:t>が表示される</a:t>
-            </a:r>
-            <a:endParaRPr lang="en-US" altLang="en-US" sz="1400" dirty="0" smtClean="0">
-              <a:latin typeface="メイリオ"/>
-              <a:ea typeface="メイリオ"/>
-              <a:cs typeface="メイリオ"/>
-            </a:endParaRPr>
-          </a:p>
-        </p:txBody>
-      </p:sp>
+          </p:spPr>
+          <p:txBody>
+            <a:bodyPr wrap="none" rtlCol="0">
+              <a:spAutoFit/>
+            </a:bodyPr>
+            <a:lstStyle/>
+            <a:p>
+              <a:r>
+                <a:rPr lang="en-US" altLang="en-US" sz="1400" dirty="0" smtClean="0">
+                  <a:latin typeface="メイリオ"/>
+                  <a:ea typeface="メイリオ"/>
+                  <a:cs typeface="メイリオ"/>
+                </a:rPr>
+                <a:t>アプリ起動時の月の収支</a:t>
+              </a:r>
+            </a:p>
+            <a:p>
+              <a:r>
+                <a:rPr lang="en-US" altLang="en-US" sz="1400" dirty="0" smtClean="0">
+                  <a:latin typeface="メイリオ"/>
+                  <a:ea typeface="メイリオ"/>
+                  <a:cs typeface="メイリオ"/>
+                </a:rPr>
+                <a:t>が表示される</a:t>
+              </a:r>
+            </a:p>
+          </p:txBody>
+        </p:sp>
+      </p:grpSp>
     </p:spTree>
     <p:extLst>
       <p:ext uri="{BB962C8B-B14F-4D97-AF65-F5344CB8AC3E}">
@@ -5376,15 +5359,7 @@
                 <a:ea typeface="メイリオ"/>
                 <a:cs typeface="メイリオ"/>
               </a:rPr>
-              <a:t>登録</a:t>
-            </a:r>
-            <a:r>
-              <a:rPr lang="ja-JP" altLang="en-US" sz="2800" dirty="0" smtClean="0">
-                <a:latin typeface="メイリオ"/>
-                <a:ea typeface="メイリオ"/>
-                <a:cs typeface="メイリオ"/>
-              </a:rPr>
-              <a:t>成功時</a:t>
+              <a:t>登録成功時</a:t>
             </a:r>
             <a:endParaRPr kumimoji="1" lang="ja-JP" altLang="en-US" sz="2000" dirty="0">
               <a:latin typeface="メイリオ"/>
@@ -5396,16 +5371,16 @@
       </p:sp>
       <p:grpSp>
         <p:nvGrpSpPr>
-          <p:cNvPr id="6" name="図形グループ 5"/>
+          <p:cNvPr id="2" name="図形グループ 1"/>
           <p:cNvGrpSpPr/>
           <p:nvPr/>
         </p:nvGrpSpPr>
         <p:grpSpPr>
           <a:xfrm>
             <a:off x="2399632" y="815476"/>
-            <a:ext cx="4130842" cy="5788523"/>
+            <a:ext cx="5453293" cy="5788523"/>
             <a:chOff x="2399632" y="815476"/>
-            <a:chExt cx="4130842" cy="5788523"/>
+            <a:chExt cx="5453293" cy="5788523"/>
           </a:xfrm>
         </p:grpSpPr>
         <p:sp>
@@ -6208,358 +6183,345 @@
             </a:p>
           </p:txBody>
         </p:sp>
-      </p:grpSp>
-      <p:sp>
-        <p:nvSpPr>
-          <p:cNvPr id="28" name="円形吹き出し 27"/>
-          <p:cNvSpPr/>
-          <p:nvPr/>
-        </p:nvSpPr>
-        <p:spPr>
-          <a:xfrm>
-            <a:off x="5443408" y="1665279"/>
-            <a:ext cx="2409517" cy="872852"/>
-          </a:xfrm>
-          <a:prstGeom prst="wedgeEllipseCallout">
-            <a:avLst>
-              <a:gd name="adj1" fmla="val -47434"/>
-              <a:gd name="adj2" fmla="val -62691"/>
-            </a:avLst>
-          </a:prstGeom>
-          <a:solidFill>
-            <a:schemeClr val="bg1"/>
-          </a:solidFill>
-          <a:ln w="19050">
+        <p:sp>
+          <p:nvSpPr>
+            <p:cNvPr id="28" name="円形吹き出し 27"/>
+            <p:cNvSpPr/>
+            <p:nvPr/>
+          </p:nvSpPr>
+          <p:spPr>
+            <a:xfrm>
+              <a:off x="5443408" y="1665279"/>
+              <a:ext cx="2409517" cy="872852"/>
+            </a:xfrm>
+            <a:prstGeom prst="wedgeEllipseCallout">
+              <a:avLst>
+                <a:gd name="adj1" fmla="val -47434"/>
+                <a:gd name="adj2" fmla="val -62691"/>
+              </a:avLst>
+            </a:prstGeom>
             <a:solidFill>
-              <a:srgbClr val="008000"/>
+              <a:schemeClr val="bg1"/>
             </a:solidFill>
-          </a:ln>
-        </p:spPr>
-        <p:style>
-          <a:lnRef idx="1">
-            <a:schemeClr val="accent1"/>
-          </a:lnRef>
-          <a:fillRef idx="3">
-            <a:schemeClr val="accent1"/>
-          </a:fillRef>
-          <a:effectRef idx="2">
-            <a:schemeClr val="accent1"/>
-          </a:effectRef>
-          <a:fontRef idx="minor">
-            <a:schemeClr val="lt1"/>
-          </a:fontRef>
-        </p:style>
-        <p:txBody>
-          <a:bodyPr rtlCol="0" anchor="ctr"/>
-          <a:lstStyle/>
-          <a:p>
-            <a:pPr algn="ctr"/>
-            <a:endParaRPr kumimoji="1" lang="ja-JP" altLang="en-US" sz="1400" dirty="0">
+            <a:ln w="19050">
               <a:solidFill>
-                <a:schemeClr val="tx1"/>
+                <a:srgbClr val="008000"/>
               </a:solidFill>
-              <a:latin typeface="メイリオ"/>
-              <a:ea typeface="メイリオ"/>
-              <a:cs typeface="メイリオ"/>
-            </a:endParaRPr>
-          </a:p>
-        </p:txBody>
-      </p:sp>
-      <p:sp>
-        <p:nvSpPr>
-          <p:cNvPr id="29" name="テキスト ボックス 28"/>
-          <p:cNvSpPr txBox="1"/>
-          <p:nvPr/>
-        </p:nvSpPr>
-        <p:spPr>
-          <a:xfrm>
-            <a:off x="5648428" y="1837660"/>
-            <a:ext cx="1980029" cy="523220"/>
-          </a:xfrm>
-          <a:prstGeom prst="rect">
-            <a:avLst/>
-          </a:prstGeom>
-          <a:noFill/>
-        </p:spPr>
-        <p:txBody>
-          <a:bodyPr wrap="none" rtlCol="0">
-            <a:spAutoFit/>
-          </a:bodyPr>
-          <a:lstStyle/>
-          <a:p>
-            <a:r>
-              <a:rPr lang="ja-JP" altLang="en-US" sz="1400" dirty="0" smtClean="0">
+            </a:ln>
+          </p:spPr>
+          <p:style>
+            <a:lnRef idx="1">
+              <a:schemeClr val="accent1"/>
+            </a:lnRef>
+            <a:fillRef idx="3">
+              <a:schemeClr val="accent1"/>
+            </a:fillRef>
+            <a:effectRef idx="2">
+              <a:schemeClr val="accent1"/>
+            </a:effectRef>
+            <a:fontRef idx="minor">
+              <a:schemeClr val="lt1"/>
+            </a:fontRef>
+          </p:style>
+          <p:txBody>
+            <a:bodyPr rtlCol="0" anchor="ctr"/>
+            <a:lstStyle/>
+            <a:p>
+              <a:pPr algn="ctr"/>
+              <a:endParaRPr kumimoji="1" lang="ja-JP" altLang="en-US" sz="1400" dirty="0">
+                <a:solidFill>
+                  <a:schemeClr val="tx1"/>
+                </a:solidFill>
                 <a:latin typeface="メイリオ"/>
                 <a:ea typeface="メイリオ"/>
                 <a:cs typeface="メイリオ"/>
-              </a:rPr>
-              <a:t>アプリ起動時の</a:t>
-            </a:r>
-            <a:r>
-              <a:rPr lang="en-US" altLang="en-US" sz="1400" dirty="0" smtClean="0">
+              </a:endParaRPr>
+            </a:p>
+          </p:txBody>
+        </p:sp>
+        <p:sp>
+          <p:nvSpPr>
+            <p:cNvPr id="29" name="テキスト ボックス 28"/>
+            <p:cNvSpPr txBox="1"/>
+            <p:nvPr/>
+          </p:nvSpPr>
+          <p:spPr>
+            <a:xfrm>
+              <a:off x="5648428" y="1837660"/>
+              <a:ext cx="1980029" cy="523220"/>
+            </a:xfrm>
+            <a:prstGeom prst="rect">
+              <a:avLst/>
+            </a:prstGeom>
+            <a:noFill/>
+          </p:spPr>
+          <p:txBody>
+            <a:bodyPr wrap="none" rtlCol="0">
+              <a:spAutoFit/>
+            </a:bodyPr>
+            <a:lstStyle/>
+            <a:p>
+              <a:r>
+                <a:rPr lang="ja-JP" altLang="en-US" sz="1400" dirty="0" smtClean="0">
+                  <a:latin typeface="メイリオ"/>
+                  <a:ea typeface="メイリオ"/>
+                  <a:cs typeface="メイリオ"/>
+                </a:rPr>
+                <a:t>アプリ起動時の</a:t>
+              </a:r>
+              <a:r>
+                <a:rPr lang="en-US" altLang="en-US" sz="1400" dirty="0" smtClean="0">
+                  <a:latin typeface="メイリオ"/>
+                  <a:ea typeface="メイリオ"/>
+                  <a:cs typeface="メイリオ"/>
+                </a:rPr>
+                <a:t>日付が</a:t>
+              </a:r>
+            </a:p>
+            <a:p>
+              <a:r>
+                <a:rPr lang="ja-JP" altLang="en-US" sz="1400" dirty="0" smtClean="0">
+                  <a:latin typeface="メイリオ"/>
+                  <a:ea typeface="メイリオ"/>
+                  <a:cs typeface="メイリオ"/>
+                </a:rPr>
+                <a:t>入力されている</a:t>
+              </a:r>
+              <a:endParaRPr lang="en-US" altLang="ja-JP" sz="1400" dirty="0" smtClean="0">
                 <a:latin typeface="メイリオ"/>
                 <a:ea typeface="メイリオ"/>
                 <a:cs typeface="メイリオ"/>
-              </a:rPr>
-              <a:t>日付が</a:t>
-            </a:r>
-          </a:p>
-          <a:p>
-            <a:r>
-              <a:rPr lang="ja-JP" altLang="en-US" sz="1400" dirty="0" smtClean="0">
+              </a:endParaRPr>
+            </a:p>
+          </p:txBody>
+        </p:sp>
+        <p:sp>
+          <p:nvSpPr>
+            <p:cNvPr id="30" name="テキスト ボックス 29"/>
+            <p:cNvSpPr txBox="1"/>
+            <p:nvPr/>
+          </p:nvSpPr>
+          <p:spPr>
+            <a:xfrm>
+              <a:off x="3041515" y="4056699"/>
+              <a:ext cx="877163" cy="369332"/>
+            </a:xfrm>
+            <a:prstGeom prst="rect">
+              <a:avLst/>
+            </a:prstGeom>
+            <a:noFill/>
+            <a:ln>
+              <a:noFill/>
+            </a:ln>
+          </p:spPr>
+          <p:txBody>
+            <a:bodyPr wrap="none" rtlCol="0">
+              <a:spAutoFit/>
+            </a:bodyPr>
+            <a:lstStyle/>
+            <a:p>
+              <a:r>
+                <a:rPr lang="en-US" altLang="en-US" dirty="0" smtClean="0">
+                  <a:latin typeface="メイリオ"/>
+                  <a:ea typeface="メイリオ"/>
+                  <a:cs typeface="メイリオ"/>
+                </a:rPr>
+                <a:t>収支</a:t>
+              </a:r>
+              <a:r>
+                <a:rPr kumimoji="1" lang="ja-JP" altLang="en-US" dirty="0" smtClean="0">
+                  <a:latin typeface="メイリオ"/>
+                  <a:ea typeface="メイリオ"/>
+                  <a:cs typeface="メイリオ"/>
+                </a:rPr>
+                <a:t>：</a:t>
+              </a:r>
+              <a:endParaRPr kumimoji="1" lang="ja-JP" altLang="en-US" dirty="0">
                 <a:latin typeface="メイリオ"/>
                 <a:ea typeface="メイリオ"/>
                 <a:cs typeface="メイリオ"/>
-              </a:rPr>
-              <a:t>入力されている</a:t>
-            </a:r>
-            <a:endParaRPr lang="en-US" altLang="ja-JP" sz="1400" dirty="0" smtClean="0">
-              <a:latin typeface="メイリオ"/>
-              <a:ea typeface="メイリオ"/>
-              <a:cs typeface="メイリオ"/>
-            </a:endParaRPr>
-          </a:p>
-        </p:txBody>
-      </p:sp>
-      <p:sp>
-        <p:nvSpPr>
-          <p:cNvPr id="30" name="テキスト ボックス 29"/>
-          <p:cNvSpPr txBox="1"/>
-          <p:nvPr/>
-        </p:nvSpPr>
-        <p:spPr>
-          <a:xfrm>
-            <a:off x="3041515" y="4056699"/>
-            <a:ext cx="877163" cy="369332"/>
-          </a:xfrm>
-          <a:prstGeom prst="rect">
-            <a:avLst/>
-          </a:prstGeom>
-          <a:noFill/>
-          <a:ln>
+              </a:endParaRPr>
+            </a:p>
+          </p:txBody>
+        </p:sp>
+        <p:sp>
+          <p:nvSpPr>
+            <p:cNvPr id="31" name="テキスト ボックス 30"/>
+            <p:cNvSpPr txBox="1"/>
+            <p:nvPr/>
+          </p:nvSpPr>
+          <p:spPr>
+            <a:xfrm>
+              <a:off x="4669812" y="4056699"/>
+              <a:ext cx="1184413" cy="369332"/>
+            </a:xfrm>
+            <a:prstGeom prst="rect">
+              <a:avLst/>
+            </a:prstGeom>
             <a:noFill/>
-          </a:ln>
-        </p:spPr>
-        <p:txBody>
-          <a:bodyPr wrap="none" rtlCol="0">
-            <a:spAutoFit/>
-          </a:bodyPr>
-          <a:lstStyle/>
-          <a:p>
-            <a:r>
-              <a:rPr lang="en-US" altLang="en-US" dirty="0" smtClean="0">
+            <a:ln>
+              <a:noFill/>
+            </a:ln>
+          </p:spPr>
+          <p:txBody>
+            <a:bodyPr wrap="square" rtlCol="0">
+              <a:spAutoFit/>
+            </a:bodyPr>
+            <a:lstStyle/>
+            <a:p>
+              <a:r>
+                <a:rPr lang="en-US" altLang="ja-JP" dirty="0" err="1" smtClean="0">
+                  <a:latin typeface="メイリオ"/>
+                  <a:ea typeface="メイリオ"/>
+                  <a:cs typeface="メイリオ"/>
+                </a:rPr>
+                <a:t>xxxxx</a:t>
+              </a:r>
+              <a:r>
+                <a:rPr lang="en-US" altLang="ja-JP" dirty="0">
+                  <a:latin typeface="メイリオ"/>
+                  <a:ea typeface="メイリオ"/>
+                  <a:cs typeface="メイリオ"/>
+                </a:rPr>
+                <a:t> </a:t>
+              </a:r>
+              <a:r>
+                <a:rPr lang="ja-JP" altLang="en-US" dirty="0" smtClean="0">
+                  <a:latin typeface="メイリオ"/>
+                  <a:ea typeface="メイリオ"/>
+                  <a:cs typeface="メイリオ"/>
+                </a:rPr>
+                <a:t>円</a:t>
+              </a:r>
+              <a:endParaRPr kumimoji="1" lang="ja-JP" altLang="en-US" dirty="0">
                 <a:latin typeface="メイリオ"/>
                 <a:ea typeface="メイリオ"/>
                 <a:cs typeface="メイリオ"/>
-              </a:rPr>
-              <a:t>収支</a:t>
-            </a:r>
-            <a:r>
-              <a:rPr kumimoji="1" lang="ja-JP" altLang="en-US" dirty="0" smtClean="0">
+              </a:endParaRPr>
+            </a:p>
+          </p:txBody>
+        </p:sp>
+        <p:sp>
+          <p:nvSpPr>
+            <p:cNvPr id="32" name="円形吹き出し 31"/>
+            <p:cNvSpPr/>
+            <p:nvPr/>
+          </p:nvSpPr>
+          <p:spPr>
+            <a:xfrm>
+              <a:off x="5133990" y="4623225"/>
+              <a:ext cx="2409517" cy="872852"/>
+            </a:xfrm>
+            <a:prstGeom prst="wedgeEllipseCallout">
+              <a:avLst>
+                <a:gd name="adj1" fmla="val -47434"/>
+                <a:gd name="adj2" fmla="val -62691"/>
+              </a:avLst>
+            </a:prstGeom>
+            <a:solidFill>
+              <a:schemeClr val="bg1"/>
+            </a:solidFill>
+            <a:ln w="19050">
+              <a:solidFill>
+                <a:srgbClr val="008000"/>
+              </a:solidFill>
+            </a:ln>
+          </p:spPr>
+          <p:style>
+            <a:lnRef idx="1">
+              <a:schemeClr val="accent1"/>
+            </a:lnRef>
+            <a:fillRef idx="3">
+              <a:schemeClr val="accent1"/>
+            </a:fillRef>
+            <a:effectRef idx="2">
+              <a:schemeClr val="accent1"/>
+            </a:effectRef>
+            <a:fontRef idx="minor">
+              <a:schemeClr val="lt1"/>
+            </a:fontRef>
+          </p:style>
+          <p:txBody>
+            <a:bodyPr rtlCol="0" anchor="ctr"/>
+            <a:lstStyle/>
+            <a:p>
+              <a:pPr algn="ctr"/>
+              <a:endParaRPr kumimoji="1" lang="ja-JP" altLang="en-US" sz="1400" dirty="0">
+                <a:solidFill>
+                  <a:schemeClr val="tx1"/>
+                </a:solidFill>
                 <a:latin typeface="メイリオ"/>
                 <a:ea typeface="メイリオ"/>
                 <a:cs typeface="メイリオ"/>
-              </a:rPr>
-              <a:t>：</a:t>
-            </a:r>
-            <a:endParaRPr kumimoji="1" lang="ja-JP" altLang="en-US" dirty="0">
-              <a:latin typeface="メイリオ"/>
-              <a:ea typeface="メイリオ"/>
-              <a:cs typeface="メイリオ"/>
-            </a:endParaRPr>
-          </a:p>
-        </p:txBody>
-      </p:sp>
-      <p:sp>
-        <p:nvSpPr>
-          <p:cNvPr id="31" name="テキスト ボックス 30"/>
-          <p:cNvSpPr txBox="1"/>
-          <p:nvPr/>
-        </p:nvSpPr>
-        <p:spPr>
-          <a:xfrm>
-            <a:off x="4669812" y="4056699"/>
-            <a:ext cx="1184413" cy="369332"/>
-          </a:xfrm>
-          <a:prstGeom prst="rect">
-            <a:avLst/>
-          </a:prstGeom>
-          <a:noFill/>
-          <a:ln>
+              </a:endParaRPr>
+            </a:p>
+          </p:txBody>
+        </p:sp>
+        <p:sp>
+          <p:nvSpPr>
+            <p:cNvPr id="33" name="テキスト ボックス 32"/>
+            <p:cNvSpPr txBox="1"/>
+            <p:nvPr/>
+          </p:nvSpPr>
+          <p:spPr>
+            <a:xfrm>
+              <a:off x="5285980" y="4807152"/>
+              <a:ext cx="2159566" cy="523220"/>
+            </a:xfrm>
+            <a:prstGeom prst="rect">
+              <a:avLst/>
+            </a:prstGeom>
             <a:noFill/>
-          </a:ln>
-        </p:spPr>
-        <p:txBody>
-          <a:bodyPr wrap="square" rtlCol="0">
-            <a:spAutoFit/>
-          </a:bodyPr>
-          <a:lstStyle/>
-          <a:p>
-            <a:r>
-              <a:rPr lang="en-US" altLang="ja-JP" dirty="0" err="1" smtClean="0">
+          </p:spPr>
+          <p:txBody>
+            <a:bodyPr wrap="none" rtlCol="0">
+              <a:spAutoFit/>
+            </a:bodyPr>
+            <a:lstStyle/>
+            <a:p>
+              <a:r>
+                <a:rPr lang="ja-JP" altLang="en-US" sz="1400" dirty="0" smtClean="0">
+                  <a:latin typeface="メイリオ"/>
+                  <a:ea typeface="メイリオ"/>
+                  <a:cs typeface="メイリオ"/>
+                </a:rPr>
+                <a:t>登録した家計簿を含めて</a:t>
+              </a:r>
+              <a:endParaRPr lang="en-US" altLang="ja-JP" sz="1400" dirty="0" smtClean="0">
                 <a:latin typeface="メイリオ"/>
                 <a:ea typeface="メイリオ"/>
                 <a:cs typeface="メイリオ"/>
-              </a:rPr>
-              <a:t>xxxxx</a:t>
-            </a:r>
-            <a:r>
-              <a:rPr lang="en-US" altLang="ja-JP" dirty="0">
-                <a:latin typeface="メイリオ"/>
-                <a:ea typeface="メイリオ"/>
-                <a:cs typeface="メイリオ"/>
-              </a:rPr>
-              <a:t> </a:t>
-            </a:r>
-            <a:r>
-              <a:rPr lang="ja-JP" altLang="en-US" dirty="0" smtClean="0">
-                <a:latin typeface="メイリオ"/>
-                <a:ea typeface="メイリオ"/>
-                <a:cs typeface="メイリオ"/>
-              </a:rPr>
-              <a:t>円</a:t>
-            </a:r>
-            <a:endParaRPr kumimoji="1" lang="ja-JP" altLang="en-US" dirty="0">
-              <a:latin typeface="メイリオ"/>
-              <a:ea typeface="メイリオ"/>
-              <a:cs typeface="メイリオ"/>
-            </a:endParaRPr>
-          </a:p>
-        </p:txBody>
-      </p:sp>
-      <p:sp>
-        <p:nvSpPr>
-          <p:cNvPr id="32" name="円形吹き出し 31"/>
-          <p:cNvSpPr/>
-          <p:nvPr/>
-        </p:nvSpPr>
-        <p:spPr>
-          <a:xfrm>
-            <a:off x="5133990" y="4623225"/>
-            <a:ext cx="2409517" cy="872852"/>
-          </a:xfrm>
-          <a:prstGeom prst="wedgeEllipseCallout">
-            <a:avLst>
-              <a:gd name="adj1" fmla="val -47434"/>
-              <a:gd name="adj2" fmla="val -62691"/>
-            </a:avLst>
-          </a:prstGeom>
-          <a:solidFill>
-            <a:schemeClr val="bg1"/>
-          </a:solidFill>
-          <a:ln w="19050">
-            <a:solidFill>
-              <a:srgbClr val="008000"/>
-            </a:solidFill>
-          </a:ln>
-        </p:spPr>
-        <p:style>
-          <a:lnRef idx="1">
-            <a:schemeClr val="accent1"/>
-          </a:lnRef>
-          <a:fillRef idx="3">
-            <a:schemeClr val="accent1"/>
-          </a:fillRef>
-          <a:effectRef idx="2">
-            <a:schemeClr val="accent1"/>
-          </a:effectRef>
-          <a:fontRef idx="minor">
-            <a:schemeClr val="lt1"/>
-          </a:fontRef>
-        </p:style>
-        <p:txBody>
-          <a:bodyPr rtlCol="0" anchor="ctr"/>
-          <a:lstStyle/>
-          <a:p>
-            <a:pPr algn="ctr"/>
-            <a:endParaRPr kumimoji="1" lang="ja-JP" altLang="en-US" sz="1400" dirty="0">
-              <a:solidFill>
-                <a:schemeClr val="tx1"/>
-              </a:solidFill>
-              <a:latin typeface="メイリオ"/>
-              <a:ea typeface="メイリオ"/>
-              <a:cs typeface="メイリオ"/>
-            </a:endParaRPr>
-          </a:p>
-        </p:txBody>
-      </p:sp>
-      <p:sp>
-        <p:nvSpPr>
-          <p:cNvPr id="33" name="テキスト ボックス 32"/>
-          <p:cNvSpPr txBox="1"/>
-          <p:nvPr/>
-        </p:nvSpPr>
-        <p:spPr>
-          <a:xfrm>
-            <a:off x="5285980" y="4807152"/>
-            <a:ext cx="2159566" cy="523220"/>
-          </a:xfrm>
-          <a:prstGeom prst="rect">
-            <a:avLst/>
-          </a:prstGeom>
-          <a:noFill/>
-        </p:spPr>
-        <p:txBody>
-          <a:bodyPr wrap="none" rtlCol="0">
-            <a:spAutoFit/>
-          </a:bodyPr>
-          <a:lstStyle/>
-          <a:p>
-            <a:r>
-              <a:rPr lang="ja-JP" altLang="en-US" sz="1400" dirty="0" smtClean="0">
-                <a:latin typeface="メイリオ"/>
-                <a:ea typeface="メイリオ"/>
-                <a:cs typeface="メイリオ"/>
-              </a:rPr>
-              <a:t>登録した家計簿を含めて</a:t>
-            </a:r>
-            <a:endParaRPr lang="en-US" altLang="ja-JP" sz="1400" dirty="0" smtClean="0">
-              <a:latin typeface="メイリオ"/>
-              <a:ea typeface="メイリオ"/>
-              <a:cs typeface="メイリオ"/>
-            </a:endParaRPr>
-          </a:p>
-          <a:p>
-            <a:r>
-              <a:rPr lang="en-US" altLang="en-US" sz="1400" dirty="0" smtClean="0">
-                <a:latin typeface="メイリオ"/>
-                <a:ea typeface="メイリオ"/>
-                <a:cs typeface="メイリオ"/>
-              </a:rPr>
-              <a:t>収支</a:t>
-            </a:r>
-            <a:r>
-              <a:rPr lang="en-US" altLang="en-US" sz="1400" dirty="0" smtClean="0">
-                <a:latin typeface="メイリオ"/>
-                <a:ea typeface="メイリオ"/>
-                <a:cs typeface="メイリオ"/>
-              </a:rPr>
-              <a:t>が</a:t>
-            </a:r>
-            <a:r>
-              <a:rPr lang="ja-JP" altLang="en-US" sz="1400" dirty="0" smtClean="0">
-                <a:latin typeface="メイリオ"/>
-                <a:ea typeface="メイリオ"/>
-                <a:cs typeface="メイリオ"/>
-              </a:rPr>
-              <a:t>再計算</a:t>
-            </a:r>
-            <a:r>
-              <a:rPr lang="en-US" altLang="en-US" sz="1400" dirty="0" smtClean="0">
-                <a:latin typeface="メイリオ"/>
-                <a:ea typeface="メイリオ"/>
-                <a:cs typeface="メイリオ"/>
-              </a:rPr>
-              <a:t>される</a:t>
-            </a:r>
-            <a:endParaRPr lang="en-US" altLang="en-US" sz="1400" dirty="0" smtClean="0">
-              <a:latin typeface="メイリオ"/>
-              <a:ea typeface="メイリオ"/>
-              <a:cs typeface="メイリオ"/>
-            </a:endParaRPr>
-          </a:p>
-        </p:txBody>
-      </p:sp>
+              </a:endParaRPr>
+            </a:p>
+            <a:p>
+              <a:r>
+                <a:rPr lang="en-US" altLang="en-US" sz="1400" dirty="0" smtClean="0">
+                  <a:latin typeface="メイリオ"/>
+                  <a:ea typeface="メイリオ"/>
+                  <a:cs typeface="メイリオ"/>
+                </a:rPr>
+                <a:t>収支が</a:t>
+              </a:r>
+              <a:r>
+                <a:rPr lang="ja-JP" altLang="en-US" sz="1400" dirty="0" smtClean="0">
+                  <a:latin typeface="メイリオ"/>
+                  <a:ea typeface="メイリオ"/>
+                  <a:cs typeface="メイリオ"/>
+                </a:rPr>
+                <a:t>再計算</a:t>
+              </a:r>
+              <a:r>
+                <a:rPr lang="en-US" altLang="en-US" sz="1400" dirty="0" smtClean="0">
+                  <a:latin typeface="メイリオ"/>
+                  <a:ea typeface="メイリオ"/>
+                  <a:cs typeface="メイリオ"/>
+                </a:rPr>
+                <a:t>される</a:t>
+              </a:r>
+            </a:p>
+          </p:txBody>
+        </p:sp>
+      </p:grpSp>
     </p:spTree>
     <p:extLst>
       <p:ext uri="{BB962C8B-B14F-4D97-AF65-F5344CB8AC3E}">
@@ -6628,861 +6590,846 @@
           </a:p>
         </p:txBody>
       </p:sp>
-      <p:grpSp>
-        <p:nvGrpSpPr>
-          <p:cNvPr id="8" name="図形グループ 7"/>
-          <p:cNvGrpSpPr/>
+      <p:sp>
+        <p:nvSpPr>
+          <p:cNvPr id="5" name="正方形/長方形 4"/>
+          <p:cNvSpPr/>
           <p:nvPr/>
-        </p:nvGrpSpPr>
-        <p:grpSpPr>
+        </p:nvSpPr>
+        <p:spPr>
           <a:xfrm>
             <a:off x="2399632" y="815476"/>
             <a:ext cx="4130842" cy="5788523"/>
-            <a:chOff x="2399632" y="815476"/>
-            <a:chExt cx="4130842" cy="5788523"/>
           </a:xfrm>
-        </p:grpSpPr>
-        <p:sp>
-          <p:nvSpPr>
-            <p:cNvPr id="5" name="正方形/長方形 4"/>
-            <p:cNvSpPr/>
-            <p:nvPr/>
-          </p:nvSpPr>
-          <p:spPr>
-            <a:xfrm>
-              <a:off x="2399632" y="815476"/>
-              <a:ext cx="4130842" cy="5788523"/>
-            </a:xfrm>
-            <a:prstGeom prst="rect">
-              <a:avLst/>
-            </a:prstGeom>
-            <a:noFill/>
-            <a:ln w="25400">
+          <a:prstGeom prst="rect">
+            <a:avLst/>
+          </a:prstGeom>
+          <a:noFill/>
+          <a:ln w="25400">
+            <a:solidFill>
+              <a:schemeClr val="tx1"/>
+            </a:solidFill>
+          </a:ln>
+          <a:effectLst/>
+        </p:spPr>
+        <p:style>
+          <a:lnRef idx="1">
+            <a:schemeClr val="accent1"/>
+          </a:lnRef>
+          <a:fillRef idx="3">
+            <a:schemeClr val="accent1"/>
+          </a:fillRef>
+          <a:effectRef idx="2">
+            <a:schemeClr val="accent1"/>
+          </a:effectRef>
+          <a:fontRef idx="minor">
+            <a:schemeClr val="lt1"/>
+          </a:fontRef>
+        </p:style>
+        <p:txBody>
+          <a:bodyPr rtlCol="0" anchor="ctr"/>
+          <a:lstStyle/>
+          <a:p>
+            <a:pPr algn="ctr"/>
+            <a:endParaRPr kumimoji="1" lang="ja-JP" altLang="en-US" sz="2800" dirty="0">
               <a:solidFill>
                 <a:schemeClr val="tx1"/>
               </a:solidFill>
-            </a:ln>
-            <a:effectLst/>
-          </p:spPr>
-          <p:style>
-            <a:lnRef idx="1">
-              <a:schemeClr val="accent1"/>
-            </a:lnRef>
-            <a:fillRef idx="3">
-              <a:schemeClr val="accent1"/>
-            </a:fillRef>
-            <a:effectRef idx="2">
-              <a:schemeClr val="accent1"/>
-            </a:effectRef>
-            <a:fontRef idx="minor">
-              <a:schemeClr val="lt1"/>
-            </a:fontRef>
-          </p:style>
-          <p:txBody>
-            <a:bodyPr rtlCol="0" anchor="ctr"/>
-            <a:lstStyle/>
-            <a:p>
-              <a:pPr algn="ctr"/>
-              <a:endParaRPr kumimoji="1" lang="ja-JP" altLang="en-US" sz="2800" dirty="0">
+              <a:latin typeface="メイリオ"/>
+              <a:ea typeface="メイリオ"/>
+              <a:cs typeface="メイリオ"/>
+            </a:endParaRPr>
+          </a:p>
+        </p:txBody>
+      </p:sp>
+      <p:sp>
+        <p:nvSpPr>
+          <p:cNvPr id="13" name="テキスト ボックス 12"/>
+          <p:cNvSpPr txBox="1"/>
+          <p:nvPr/>
+        </p:nvSpPr>
+        <p:spPr>
+          <a:xfrm>
+            <a:off x="3041515" y="1295947"/>
+            <a:ext cx="877163" cy="369332"/>
+          </a:xfrm>
+          <a:prstGeom prst="rect">
+            <a:avLst/>
+          </a:prstGeom>
+          <a:noFill/>
+          <a:ln>
+            <a:noFill/>
+          </a:ln>
+        </p:spPr>
+        <p:txBody>
+          <a:bodyPr wrap="none" rtlCol="0">
+            <a:spAutoFit/>
+          </a:bodyPr>
+          <a:lstStyle/>
+          <a:p>
+            <a:r>
+              <a:rPr kumimoji="1" lang="ja-JP" altLang="en-US" dirty="0" smtClean="0">
+                <a:latin typeface="メイリオ"/>
+                <a:ea typeface="メイリオ"/>
+                <a:cs typeface="メイリオ"/>
+              </a:rPr>
+              <a:t>日付：</a:t>
+            </a:r>
+            <a:endParaRPr kumimoji="1" lang="ja-JP" altLang="en-US" dirty="0">
+              <a:latin typeface="メイリオ"/>
+              <a:ea typeface="メイリオ"/>
+              <a:cs typeface="メイリオ"/>
+            </a:endParaRPr>
+          </a:p>
+        </p:txBody>
+      </p:sp>
+      <p:sp>
+        <p:nvSpPr>
+          <p:cNvPr id="14" name="テキスト ボックス 13"/>
+          <p:cNvSpPr txBox="1"/>
+          <p:nvPr/>
+        </p:nvSpPr>
+        <p:spPr>
+          <a:xfrm>
+            <a:off x="3041515" y="1811337"/>
+            <a:ext cx="877163" cy="369332"/>
+          </a:xfrm>
+          <a:prstGeom prst="rect">
+            <a:avLst/>
+          </a:prstGeom>
+          <a:noFill/>
+          <a:ln>
+            <a:noFill/>
+          </a:ln>
+        </p:spPr>
+        <p:txBody>
+          <a:bodyPr wrap="none" rtlCol="0">
+            <a:spAutoFit/>
+          </a:bodyPr>
+          <a:lstStyle/>
+          <a:p>
+            <a:r>
+              <a:rPr lang="ja-JP" altLang="en-US" dirty="0" smtClean="0">
+                <a:latin typeface="メイリオ"/>
+                <a:ea typeface="メイリオ"/>
+                <a:cs typeface="メイリオ"/>
+              </a:rPr>
+              <a:t>内容</a:t>
+            </a:r>
+            <a:r>
+              <a:rPr kumimoji="1" lang="ja-JP" altLang="en-US" dirty="0" smtClean="0">
+                <a:latin typeface="メイリオ"/>
+                <a:ea typeface="メイリオ"/>
+                <a:cs typeface="メイリオ"/>
+              </a:rPr>
+              <a:t>：</a:t>
+            </a:r>
+            <a:endParaRPr kumimoji="1" lang="ja-JP" altLang="en-US" dirty="0">
+              <a:latin typeface="メイリオ"/>
+              <a:ea typeface="メイリオ"/>
+              <a:cs typeface="メイリオ"/>
+            </a:endParaRPr>
+          </a:p>
+        </p:txBody>
+      </p:sp>
+      <p:sp>
+        <p:nvSpPr>
+          <p:cNvPr id="15" name="テキスト ボックス 14"/>
+          <p:cNvSpPr txBox="1"/>
+          <p:nvPr/>
+        </p:nvSpPr>
+        <p:spPr>
+          <a:xfrm>
+            <a:off x="2579850" y="2326727"/>
+            <a:ext cx="1338828" cy="369332"/>
+          </a:xfrm>
+          <a:prstGeom prst="rect">
+            <a:avLst/>
+          </a:prstGeom>
+          <a:noFill/>
+          <a:ln>
+            <a:noFill/>
+          </a:ln>
+        </p:spPr>
+        <p:txBody>
+          <a:bodyPr wrap="none" rtlCol="0">
+            <a:spAutoFit/>
+          </a:bodyPr>
+          <a:lstStyle/>
+          <a:p>
+            <a:r>
+              <a:rPr lang="ja-JP" altLang="en-US" dirty="0" smtClean="0">
+                <a:latin typeface="メイリオ"/>
+                <a:ea typeface="メイリオ"/>
+                <a:cs typeface="メイリオ"/>
+              </a:rPr>
+              <a:t>カテゴリ</a:t>
+            </a:r>
+            <a:r>
+              <a:rPr kumimoji="1" lang="ja-JP" altLang="en-US" dirty="0" smtClean="0">
+                <a:latin typeface="メイリオ"/>
+                <a:ea typeface="メイリオ"/>
+                <a:cs typeface="メイリオ"/>
+              </a:rPr>
+              <a:t>：</a:t>
+            </a:r>
+            <a:endParaRPr kumimoji="1" lang="ja-JP" altLang="en-US" dirty="0">
+              <a:latin typeface="メイリオ"/>
+              <a:ea typeface="メイリオ"/>
+              <a:cs typeface="メイリオ"/>
+            </a:endParaRPr>
+          </a:p>
+        </p:txBody>
+      </p:sp>
+      <p:sp>
+        <p:nvSpPr>
+          <p:cNvPr id="16" name="テキスト ボックス 15"/>
+          <p:cNvSpPr txBox="1"/>
+          <p:nvPr/>
+        </p:nvSpPr>
+        <p:spPr>
+          <a:xfrm>
+            <a:off x="3041515" y="2842117"/>
+            <a:ext cx="877163" cy="369332"/>
+          </a:xfrm>
+          <a:prstGeom prst="rect">
+            <a:avLst/>
+          </a:prstGeom>
+          <a:noFill/>
+          <a:ln>
+            <a:noFill/>
+          </a:ln>
+        </p:spPr>
+        <p:txBody>
+          <a:bodyPr wrap="none" rtlCol="0">
+            <a:spAutoFit/>
+          </a:bodyPr>
+          <a:lstStyle/>
+          <a:p>
+            <a:r>
+              <a:rPr lang="ja-JP" altLang="en-US" dirty="0" smtClean="0">
+                <a:latin typeface="メイリオ"/>
+                <a:ea typeface="メイリオ"/>
+                <a:cs typeface="メイリオ"/>
+              </a:rPr>
+              <a:t>金額</a:t>
+            </a:r>
+            <a:r>
+              <a:rPr kumimoji="1" lang="ja-JP" altLang="en-US" dirty="0" smtClean="0">
+                <a:latin typeface="メイリオ"/>
+                <a:ea typeface="メイリオ"/>
+                <a:cs typeface="メイリオ"/>
+              </a:rPr>
+              <a:t>：</a:t>
+            </a:r>
+            <a:endParaRPr kumimoji="1" lang="ja-JP" altLang="en-US" dirty="0">
+              <a:latin typeface="メイリオ"/>
+              <a:ea typeface="メイリオ"/>
+              <a:cs typeface="メイリオ"/>
+            </a:endParaRPr>
+          </a:p>
+        </p:txBody>
+      </p:sp>
+      <p:sp>
+        <p:nvSpPr>
+          <p:cNvPr id="18" name="角丸四角形 17"/>
+          <p:cNvSpPr/>
+          <p:nvPr/>
+        </p:nvSpPr>
+        <p:spPr>
+          <a:xfrm>
+            <a:off x="3041515" y="5982125"/>
+            <a:ext cx="1243263" cy="360947"/>
+          </a:xfrm>
+          <a:prstGeom prst="roundRect">
+            <a:avLst/>
+          </a:prstGeom>
+          <a:noFill/>
+          <a:ln w="25400">
+            <a:solidFill>
+              <a:schemeClr val="tx1"/>
+            </a:solidFill>
+          </a:ln>
+          <a:effectLst/>
+        </p:spPr>
+        <p:style>
+          <a:lnRef idx="1">
+            <a:schemeClr val="accent1"/>
+          </a:lnRef>
+          <a:fillRef idx="3">
+            <a:schemeClr val="accent1"/>
+          </a:fillRef>
+          <a:effectRef idx="2">
+            <a:schemeClr val="accent1"/>
+          </a:effectRef>
+          <a:fontRef idx="minor">
+            <a:schemeClr val="lt1"/>
+          </a:fontRef>
+        </p:style>
+        <p:txBody>
+          <a:bodyPr rtlCol="0" anchor="ctr"/>
+          <a:lstStyle/>
+          <a:p>
+            <a:pPr algn="ctr"/>
+            <a:r>
+              <a:rPr lang="ja-JP" altLang="en-US" dirty="0" smtClean="0">
                 <a:solidFill>
                   <a:schemeClr val="tx1"/>
                 </a:solidFill>
                 <a:latin typeface="メイリオ"/>
                 <a:ea typeface="メイリオ"/>
                 <a:cs typeface="メイリオ"/>
-              </a:endParaRPr>
-            </a:p>
-          </p:txBody>
-        </p:sp>
-        <p:sp>
-          <p:nvSpPr>
-            <p:cNvPr id="13" name="テキスト ボックス 12"/>
-            <p:cNvSpPr txBox="1"/>
-            <p:nvPr/>
-          </p:nvSpPr>
-          <p:spPr>
-            <a:xfrm>
-              <a:off x="3041515" y="1295947"/>
-              <a:ext cx="877163" cy="369332"/>
-            </a:xfrm>
-            <a:prstGeom prst="rect">
-              <a:avLst/>
-            </a:prstGeom>
-            <a:noFill/>
-            <a:ln>
-              <a:noFill/>
-            </a:ln>
-          </p:spPr>
-          <p:txBody>
-            <a:bodyPr wrap="none" rtlCol="0">
-              <a:spAutoFit/>
-            </a:bodyPr>
-            <a:lstStyle/>
-            <a:p>
-              <a:r>
-                <a:rPr kumimoji="1" lang="ja-JP" altLang="en-US" dirty="0" smtClean="0">
-                  <a:latin typeface="メイリオ"/>
-                  <a:ea typeface="メイリオ"/>
-                  <a:cs typeface="メイリオ"/>
-                </a:rPr>
-                <a:t>日付：</a:t>
-              </a:r>
-              <a:endParaRPr kumimoji="1" lang="ja-JP" altLang="en-US" dirty="0">
-                <a:latin typeface="メイリオ"/>
-                <a:ea typeface="メイリオ"/>
-                <a:cs typeface="メイリオ"/>
-              </a:endParaRPr>
-            </a:p>
-          </p:txBody>
-        </p:sp>
-        <p:sp>
-          <p:nvSpPr>
-            <p:cNvPr id="14" name="テキスト ボックス 13"/>
-            <p:cNvSpPr txBox="1"/>
-            <p:nvPr/>
-          </p:nvSpPr>
-          <p:spPr>
-            <a:xfrm>
-              <a:off x="3041515" y="1811337"/>
-              <a:ext cx="877163" cy="369332"/>
-            </a:xfrm>
-            <a:prstGeom prst="rect">
-              <a:avLst/>
-            </a:prstGeom>
-            <a:noFill/>
-            <a:ln>
-              <a:noFill/>
-            </a:ln>
-          </p:spPr>
-          <p:txBody>
-            <a:bodyPr wrap="none" rtlCol="0">
-              <a:spAutoFit/>
-            </a:bodyPr>
-            <a:lstStyle/>
-            <a:p>
-              <a:r>
-                <a:rPr lang="ja-JP" altLang="en-US" dirty="0" smtClean="0">
-                  <a:latin typeface="メイリオ"/>
-                  <a:ea typeface="メイリオ"/>
-                  <a:cs typeface="メイリオ"/>
-                </a:rPr>
-                <a:t>内容</a:t>
-              </a:r>
-              <a:r>
-                <a:rPr kumimoji="1" lang="ja-JP" altLang="en-US" dirty="0" smtClean="0">
-                  <a:latin typeface="メイリオ"/>
-                  <a:ea typeface="メイリオ"/>
-                  <a:cs typeface="メイリオ"/>
-                </a:rPr>
-                <a:t>：</a:t>
-              </a:r>
-              <a:endParaRPr kumimoji="1" lang="ja-JP" altLang="en-US" dirty="0">
-                <a:latin typeface="メイリオ"/>
-                <a:ea typeface="メイリオ"/>
-                <a:cs typeface="メイリオ"/>
-              </a:endParaRPr>
-            </a:p>
-          </p:txBody>
-        </p:sp>
-        <p:sp>
-          <p:nvSpPr>
-            <p:cNvPr id="15" name="テキスト ボックス 14"/>
-            <p:cNvSpPr txBox="1"/>
-            <p:nvPr/>
-          </p:nvSpPr>
-          <p:spPr>
-            <a:xfrm>
-              <a:off x="2579850" y="2326727"/>
-              <a:ext cx="1338828" cy="369332"/>
-            </a:xfrm>
-            <a:prstGeom prst="rect">
-              <a:avLst/>
-            </a:prstGeom>
-            <a:noFill/>
-            <a:ln>
-              <a:noFill/>
-            </a:ln>
-          </p:spPr>
-          <p:txBody>
-            <a:bodyPr wrap="none" rtlCol="0">
-              <a:spAutoFit/>
-            </a:bodyPr>
-            <a:lstStyle/>
-            <a:p>
-              <a:r>
-                <a:rPr lang="ja-JP" altLang="en-US" dirty="0" smtClean="0">
-                  <a:latin typeface="メイリオ"/>
-                  <a:ea typeface="メイリオ"/>
-                  <a:cs typeface="メイリオ"/>
-                </a:rPr>
-                <a:t>カテゴリ</a:t>
-              </a:r>
-              <a:r>
-                <a:rPr kumimoji="1" lang="ja-JP" altLang="en-US" dirty="0" smtClean="0">
-                  <a:latin typeface="メイリオ"/>
-                  <a:ea typeface="メイリオ"/>
-                  <a:cs typeface="メイリオ"/>
-                </a:rPr>
-                <a:t>：</a:t>
-              </a:r>
-              <a:endParaRPr kumimoji="1" lang="ja-JP" altLang="en-US" dirty="0">
-                <a:latin typeface="メイリオ"/>
-                <a:ea typeface="メイリオ"/>
-                <a:cs typeface="メイリオ"/>
-              </a:endParaRPr>
-            </a:p>
-          </p:txBody>
-        </p:sp>
-        <p:sp>
-          <p:nvSpPr>
-            <p:cNvPr id="16" name="テキスト ボックス 15"/>
-            <p:cNvSpPr txBox="1"/>
-            <p:nvPr/>
-          </p:nvSpPr>
-          <p:spPr>
-            <a:xfrm>
-              <a:off x="3041515" y="2842117"/>
-              <a:ext cx="877163" cy="369332"/>
-            </a:xfrm>
-            <a:prstGeom prst="rect">
-              <a:avLst/>
-            </a:prstGeom>
-            <a:noFill/>
-            <a:ln>
-              <a:noFill/>
-            </a:ln>
-          </p:spPr>
-          <p:txBody>
-            <a:bodyPr wrap="none" rtlCol="0">
-              <a:spAutoFit/>
-            </a:bodyPr>
-            <a:lstStyle/>
-            <a:p>
-              <a:r>
-                <a:rPr lang="ja-JP" altLang="en-US" dirty="0" smtClean="0">
-                  <a:latin typeface="メイリオ"/>
-                  <a:ea typeface="メイリオ"/>
-                  <a:cs typeface="メイリオ"/>
-                </a:rPr>
-                <a:t>金額</a:t>
-              </a:r>
-              <a:r>
-                <a:rPr kumimoji="1" lang="ja-JP" altLang="en-US" dirty="0" smtClean="0">
-                  <a:latin typeface="メイリオ"/>
-                  <a:ea typeface="メイリオ"/>
-                  <a:cs typeface="メイリオ"/>
-                </a:rPr>
-                <a:t>：</a:t>
-              </a:r>
-              <a:endParaRPr kumimoji="1" lang="ja-JP" altLang="en-US" dirty="0">
-                <a:latin typeface="メイリオ"/>
-                <a:ea typeface="メイリオ"/>
-                <a:cs typeface="メイリオ"/>
-              </a:endParaRPr>
-            </a:p>
-          </p:txBody>
-        </p:sp>
-        <p:sp>
-          <p:nvSpPr>
-            <p:cNvPr id="18" name="角丸四角形 17"/>
-            <p:cNvSpPr/>
-            <p:nvPr/>
-          </p:nvSpPr>
-          <p:spPr>
-            <a:xfrm>
-              <a:off x="3041515" y="5982125"/>
-              <a:ext cx="1243263" cy="360947"/>
-            </a:xfrm>
-            <a:prstGeom prst="roundRect">
-              <a:avLst/>
-            </a:prstGeom>
-            <a:noFill/>
-            <a:ln w="25400">
+              </a:rPr>
+              <a:t>登録</a:t>
+            </a:r>
+            <a:endParaRPr lang="en-US" altLang="ja-JP" dirty="0" smtClean="0">
               <a:solidFill>
                 <a:schemeClr val="tx1"/>
               </a:solidFill>
-            </a:ln>
-            <a:effectLst/>
-          </p:spPr>
-          <p:style>
-            <a:lnRef idx="1">
-              <a:schemeClr val="accent1"/>
-            </a:lnRef>
-            <a:fillRef idx="3">
-              <a:schemeClr val="accent1"/>
-            </a:fillRef>
-            <a:effectRef idx="2">
-              <a:schemeClr val="accent1"/>
-            </a:effectRef>
-            <a:fontRef idx="minor">
-              <a:schemeClr val="lt1"/>
-            </a:fontRef>
-          </p:style>
-          <p:txBody>
-            <a:bodyPr rtlCol="0" anchor="ctr"/>
-            <a:lstStyle/>
-            <a:p>
-              <a:pPr algn="ctr"/>
-              <a:r>
-                <a:rPr lang="ja-JP" altLang="en-US" dirty="0" smtClean="0">
-                  <a:solidFill>
-                    <a:schemeClr val="tx1"/>
-                  </a:solidFill>
-                  <a:latin typeface="メイリオ"/>
-                  <a:ea typeface="メイリオ"/>
-                  <a:cs typeface="メイリオ"/>
-                </a:rPr>
-                <a:t>登録</a:t>
-              </a:r>
-              <a:endParaRPr lang="en-US" altLang="ja-JP" dirty="0" smtClean="0">
+              <a:latin typeface="メイリオ"/>
+              <a:ea typeface="メイリオ"/>
+              <a:cs typeface="メイリオ"/>
+            </a:endParaRPr>
+          </a:p>
+        </p:txBody>
+      </p:sp>
+      <p:sp>
+        <p:nvSpPr>
+          <p:cNvPr id="19" name="角丸四角形 18"/>
+          <p:cNvSpPr/>
+          <p:nvPr/>
+        </p:nvSpPr>
+        <p:spPr>
+          <a:xfrm>
+            <a:off x="4610962" y="5982125"/>
+            <a:ext cx="1243263" cy="360947"/>
+          </a:xfrm>
+          <a:prstGeom prst="roundRect">
+            <a:avLst/>
+          </a:prstGeom>
+          <a:noFill/>
+          <a:ln w="25400">
+            <a:solidFill>
+              <a:schemeClr val="tx1"/>
+            </a:solidFill>
+          </a:ln>
+          <a:effectLst/>
+        </p:spPr>
+        <p:style>
+          <a:lnRef idx="1">
+            <a:schemeClr val="accent1"/>
+          </a:lnRef>
+          <a:fillRef idx="3">
+            <a:schemeClr val="accent1"/>
+          </a:fillRef>
+          <a:effectRef idx="2">
+            <a:schemeClr val="accent1"/>
+          </a:effectRef>
+          <a:fontRef idx="minor">
+            <a:schemeClr val="lt1"/>
+          </a:fontRef>
+        </p:style>
+        <p:txBody>
+          <a:bodyPr rtlCol="0" anchor="ctr"/>
+          <a:lstStyle/>
+          <a:p>
+            <a:pPr algn="ctr"/>
+            <a:r>
+              <a:rPr lang="ja-JP" altLang="en-US" dirty="0" smtClean="0">
                 <a:solidFill>
                   <a:schemeClr val="tx1"/>
                 </a:solidFill>
                 <a:latin typeface="メイリオ"/>
                 <a:ea typeface="メイリオ"/>
                 <a:cs typeface="メイリオ"/>
-              </a:endParaRPr>
-            </a:p>
-          </p:txBody>
-        </p:sp>
-        <p:sp>
-          <p:nvSpPr>
-            <p:cNvPr id="19" name="角丸四角形 18"/>
-            <p:cNvSpPr/>
-            <p:nvPr/>
-          </p:nvSpPr>
-          <p:spPr>
-            <a:xfrm>
-              <a:off x="4610962" y="5982125"/>
-              <a:ext cx="1243263" cy="360947"/>
-            </a:xfrm>
-            <a:prstGeom prst="roundRect">
-              <a:avLst/>
-            </a:prstGeom>
-            <a:noFill/>
-            <a:ln w="25400">
+              </a:rPr>
+              <a:t>取消</a:t>
+            </a:r>
+            <a:endParaRPr lang="en-US" altLang="ja-JP" dirty="0" smtClean="0">
               <a:solidFill>
                 <a:schemeClr val="tx1"/>
               </a:solidFill>
-            </a:ln>
-            <a:effectLst/>
-          </p:spPr>
-          <p:style>
-            <a:lnRef idx="1">
-              <a:schemeClr val="accent1"/>
-            </a:lnRef>
-            <a:fillRef idx="3">
-              <a:schemeClr val="accent1"/>
-            </a:fillRef>
-            <a:effectRef idx="2">
-              <a:schemeClr val="accent1"/>
-            </a:effectRef>
-            <a:fontRef idx="minor">
-              <a:schemeClr val="lt1"/>
-            </a:fontRef>
-          </p:style>
-          <p:txBody>
-            <a:bodyPr rtlCol="0" anchor="ctr"/>
-            <a:lstStyle/>
-            <a:p>
-              <a:pPr algn="ctr"/>
-              <a:r>
-                <a:rPr lang="ja-JP" altLang="en-US" dirty="0" smtClean="0">
-                  <a:solidFill>
-                    <a:schemeClr val="tx1"/>
-                  </a:solidFill>
-                  <a:latin typeface="メイリオ"/>
-                  <a:ea typeface="メイリオ"/>
-                  <a:cs typeface="メイリオ"/>
-                </a:rPr>
-                <a:t>取消</a:t>
-              </a:r>
-              <a:endParaRPr lang="en-US" altLang="ja-JP" dirty="0" smtClean="0">
-                <a:solidFill>
-                  <a:schemeClr val="tx1"/>
-                </a:solidFill>
+              <a:latin typeface="メイリオ"/>
+              <a:ea typeface="メイリオ"/>
+              <a:cs typeface="メイリオ"/>
+            </a:endParaRPr>
+          </a:p>
+        </p:txBody>
+      </p:sp>
+      <p:sp>
+        <p:nvSpPr>
+          <p:cNvPr id="20" name="正方形/長方形 19"/>
+          <p:cNvSpPr/>
+          <p:nvPr/>
+        </p:nvSpPr>
+        <p:spPr>
+          <a:xfrm>
+            <a:off x="3918678" y="1295947"/>
+            <a:ext cx="1935547" cy="369332"/>
+          </a:xfrm>
+          <a:prstGeom prst="rect">
+            <a:avLst/>
+          </a:prstGeom>
+          <a:noFill/>
+          <a:ln w="25400">
+            <a:solidFill>
+              <a:schemeClr val="tx1"/>
+            </a:solidFill>
+          </a:ln>
+          <a:effectLst/>
+        </p:spPr>
+        <p:style>
+          <a:lnRef idx="1">
+            <a:schemeClr val="accent1"/>
+          </a:lnRef>
+          <a:fillRef idx="3">
+            <a:schemeClr val="accent1"/>
+          </a:fillRef>
+          <a:effectRef idx="2">
+            <a:schemeClr val="accent1"/>
+          </a:effectRef>
+          <a:fontRef idx="minor">
+            <a:schemeClr val="lt1"/>
+          </a:fontRef>
+        </p:style>
+        <p:txBody>
+          <a:bodyPr rtlCol="0" anchor="ctr"/>
+          <a:lstStyle/>
+          <a:p>
+            <a:pPr algn="ctr"/>
+            <a:endParaRPr kumimoji="1" lang="ja-JP" altLang="en-US">
+              <a:solidFill>
+                <a:schemeClr val="tx1"/>
+              </a:solidFill>
+            </a:endParaRPr>
+          </a:p>
+        </p:txBody>
+      </p:sp>
+      <p:sp>
+        <p:nvSpPr>
+          <p:cNvPr id="21" name="正方形/長方形 20"/>
+          <p:cNvSpPr/>
+          <p:nvPr/>
+        </p:nvSpPr>
+        <p:spPr>
+          <a:xfrm>
+            <a:off x="3918678" y="1814570"/>
+            <a:ext cx="1935547" cy="369332"/>
+          </a:xfrm>
+          <a:prstGeom prst="rect">
+            <a:avLst/>
+          </a:prstGeom>
+          <a:noFill/>
+          <a:ln w="25400">
+            <a:solidFill>
+              <a:schemeClr val="tx1"/>
+            </a:solidFill>
+          </a:ln>
+          <a:effectLst/>
+        </p:spPr>
+        <p:style>
+          <a:lnRef idx="1">
+            <a:schemeClr val="accent1"/>
+          </a:lnRef>
+          <a:fillRef idx="3">
+            <a:schemeClr val="accent1"/>
+          </a:fillRef>
+          <a:effectRef idx="2">
+            <a:schemeClr val="accent1"/>
+          </a:effectRef>
+          <a:fontRef idx="minor">
+            <a:schemeClr val="lt1"/>
+          </a:fontRef>
+        </p:style>
+        <p:txBody>
+          <a:bodyPr rtlCol="0" anchor="ctr"/>
+          <a:lstStyle/>
+          <a:p>
+            <a:pPr algn="ctr"/>
+            <a:endParaRPr kumimoji="1" lang="ja-JP" altLang="en-US">
+              <a:solidFill>
+                <a:schemeClr val="tx1"/>
+              </a:solidFill>
+            </a:endParaRPr>
+          </a:p>
+        </p:txBody>
+      </p:sp>
+      <p:sp>
+        <p:nvSpPr>
+          <p:cNvPr id="22" name="正方形/長方形 21"/>
+          <p:cNvSpPr/>
+          <p:nvPr/>
+        </p:nvSpPr>
+        <p:spPr>
+          <a:xfrm>
+            <a:off x="3918678" y="2842117"/>
+            <a:ext cx="1935547" cy="369332"/>
+          </a:xfrm>
+          <a:prstGeom prst="rect">
+            <a:avLst/>
+          </a:prstGeom>
+          <a:noFill/>
+          <a:ln w="25400">
+            <a:solidFill>
+              <a:schemeClr val="tx1"/>
+            </a:solidFill>
+          </a:ln>
+          <a:effectLst/>
+        </p:spPr>
+        <p:style>
+          <a:lnRef idx="1">
+            <a:schemeClr val="accent1"/>
+          </a:lnRef>
+          <a:fillRef idx="3">
+            <a:schemeClr val="accent1"/>
+          </a:fillRef>
+          <a:effectRef idx="2">
+            <a:schemeClr val="accent1"/>
+          </a:effectRef>
+          <a:fontRef idx="minor">
+            <a:schemeClr val="lt1"/>
+          </a:fontRef>
+        </p:style>
+        <p:txBody>
+          <a:bodyPr rtlCol="0" anchor="ctr"/>
+          <a:lstStyle/>
+          <a:p>
+            <a:pPr algn="ctr"/>
+            <a:endParaRPr kumimoji="1" lang="ja-JP" altLang="en-US">
+              <a:solidFill>
+                <a:schemeClr val="tx1"/>
+              </a:solidFill>
+            </a:endParaRPr>
+          </a:p>
+        </p:txBody>
+      </p:sp>
+      <p:sp>
+        <p:nvSpPr>
+          <p:cNvPr id="23" name="正方形/長方形 22"/>
+          <p:cNvSpPr/>
+          <p:nvPr/>
+        </p:nvSpPr>
+        <p:spPr>
+          <a:xfrm>
+            <a:off x="3918678" y="2326727"/>
+            <a:ext cx="1935547" cy="369332"/>
+          </a:xfrm>
+          <a:prstGeom prst="rect">
+            <a:avLst/>
+          </a:prstGeom>
+          <a:noFill/>
+          <a:ln w="25400">
+            <a:solidFill>
+              <a:schemeClr val="tx1"/>
+            </a:solidFill>
+          </a:ln>
+          <a:effectLst/>
+        </p:spPr>
+        <p:style>
+          <a:lnRef idx="1">
+            <a:schemeClr val="accent1"/>
+          </a:lnRef>
+          <a:fillRef idx="3">
+            <a:schemeClr val="accent1"/>
+          </a:fillRef>
+          <a:effectRef idx="2">
+            <a:schemeClr val="accent1"/>
+          </a:effectRef>
+          <a:fontRef idx="minor">
+            <a:schemeClr val="lt1"/>
+          </a:fontRef>
+        </p:style>
+        <p:txBody>
+          <a:bodyPr rtlCol="0" anchor="ctr"/>
+          <a:lstStyle/>
+          <a:p>
+            <a:pPr algn="ctr"/>
+            <a:endParaRPr kumimoji="1" lang="ja-JP" altLang="en-US">
+              <a:solidFill>
+                <a:schemeClr val="tx1"/>
+              </a:solidFill>
+            </a:endParaRPr>
+          </a:p>
+        </p:txBody>
+      </p:sp>
+      <p:sp>
+        <p:nvSpPr>
+          <p:cNvPr id="24" name="円/楕円 23"/>
+          <p:cNvSpPr/>
+          <p:nvPr/>
+        </p:nvSpPr>
+        <p:spPr>
+          <a:xfrm>
+            <a:off x="3635449" y="3464224"/>
+            <a:ext cx="163286" cy="179456"/>
+          </a:xfrm>
+          <a:prstGeom prst="ellipse">
+            <a:avLst/>
+          </a:prstGeom>
+          <a:solidFill>
+            <a:schemeClr val="tx1"/>
+          </a:solidFill>
+          <a:ln>
+            <a:solidFill>
+              <a:schemeClr val="tx1"/>
+            </a:solidFill>
+          </a:ln>
+          <a:effectLst/>
+        </p:spPr>
+        <p:style>
+          <a:lnRef idx="1">
+            <a:schemeClr val="accent1"/>
+          </a:lnRef>
+          <a:fillRef idx="3">
+            <a:schemeClr val="accent1"/>
+          </a:fillRef>
+          <a:effectRef idx="2">
+            <a:schemeClr val="accent1"/>
+          </a:effectRef>
+          <a:fontRef idx="minor">
+            <a:schemeClr val="lt1"/>
+          </a:fontRef>
+        </p:style>
+        <p:txBody>
+          <a:bodyPr rtlCol="0" anchor="ctr"/>
+          <a:lstStyle/>
+          <a:p>
+            <a:pPr algn="ctr"/>
+            <a:endParaRPr kumimoji="1" lang="ja-JP" altLang="en-US">
+              <a:solidFill>
+                <a:schemeClr val="tx1"/>
+              </a:solidFill>
+            </a:endParaRPr>
+          </a:p>
+        </p:txBody>
+      </p:sp>
+      <p:sp>
+        <p:nvSpPr>
+          <p:cNvPr id="25" name="テキスト ボックス 24"/>
+          <p:cNvSpPr txBox="1"/>
+          <p:nvPr/>
+        </p:nvSpPr>
+        <p:spPr>
+          <a:xfrm>
+            <a:off x="3814371" y="3370783"/>
+            <a:ext cx="646331" cy="369332"/>
+          </a:xfrm>
+          <a:prstGeom prst="rect">
+            <a:avLst/>
+          </a:prstGeom>
+          <a:noFill/>
+          <a:ln>
+            <a:noFill/>
+          </a:ln>
+        </p:spPr>
+        <p:txBody>
+          <a:bodyPr wrap="none" rtlCol="0">
+            <a:spAutoFit/>
+          </a:bodyPr>
+          <a:lstStyle/>
+          <a:p>
+            <a:r>
+              <a:rPr lang="ja-JP" altLang="en-US" dirty="0" smtClean="0">
                 <a:latin typeface="メイリオ"/>
                 <a:ea typeface="メイリオ"/>
                 <a:cs typeface="メイリオ"/>
-              </a:endParaRPr>
-            </a:p>
-          </p:txBody>
-        </p:sp>
-        <p:sp>
-          <p:nvSpPr>
-            <p:cNvPr id="20" name="正方形/長方形 19"/>
-            <p:cNvSpPr/>
-            <p:nvPr/>
-          </p:nvSpPr>
-          <p:spPr>
-            <a:xfrm>
-              <a:off x="3918678" y="1295947"/>
-              <a:ext cx="1935547" cy="369332"/>
-            </a:xfrm>
-            <a:prstGeom prst="rect">
-              <a:avLst/>
-            </a:prstGeom>
-            <a:noFill/>
-            <a:ln w="25400">
+              </a:rPr>
+              <a:t>収入</a:t>
+            </a:r>
+            <a:endParaRPr kumimoji="1" lang="ja-JP" altLang="en-US" dirty="0">
+              <a:latin typeface="メイリオ"/>
+              <a:ea typeface="メイリオ"/>
+              <a:cs typeface="メイリオ"/>
+            </a:endParaRPr>
+          </a:p>
+        </p:txBody>
+      </p:sp>
+      <p:sp>
+        <p:nvSpPr>
+          <p:cNvPr id="26" name="円/楕円 25"/>
+          <p:cNvSpPr/>
+          <p:nvPr/>
+        </p:nvSpPr>
+        <p:spPr>
+          <a:xfrm>
+            <a:off x="4530000" y="3467034"/>
+            <a:ext cx="163286" cy="179456"/>
+          </a:xfrm>
+          <a:prstGeom prst="ellipse">
+            <a:avLst/>
+          </a:prstGeom>
+          <a:solidFill>
+            <a:schemeClr val="tx1"/>
+          </a:solidFill>
+          <a:ln>
+            <a:solidFill>
+              <a:schemeClr val="tx1"/>
+            </a:solidFill>
+          </a:ln>
+          <a:effectLst/>
+        </p:spPr>
+        <p:style>
+          <a:lnRef idx="1">
+            <a:schemeClr val="accent1"/>
+          </a:lnRef>
+          <a:fillRef idx="3">
+            <a:schemeClr val="accent1"/>
+          </a:fillRef>
+          <a:effectRef idx="2">
+            <a:schemeClr val="accent1"/>
+          </a:effectRef>
+          <a:fontRef idx="minor">
+            <a:schemeClr val="lt1"/>
+          </a:fontRef>
+        </p:style>
+        <p:txBody>
+          <a:bodyPr rtlCol="0" anchor="ctr"/>
+          <a:lstStyle/>
+          <a:p>
+            <a:pPr algn="ctr"/>
+            <a:endParaRPr kumimoji="1" lang="ja-JP" altLang="en-US">
               <a:solidFill>
                 <a:schemeClr val="tx1"/>
               </a:solidFill>
-            </a:ln>
-            <a:effectLst/>
-          </p:spPr>
-          <p:style>
-            <a:lnRef idx="1">
-              <a:schemeClr val="accent1"/>
-            </a:lnRef>
-            <a:fillRef idx="3">
-              <a:schemeClr val="accent1"/>
-            </a:fillRef>
-            <a:effectRef idx="2">
-              <a:schemeClr val="accent1"/>
-            </a:effectRef>
-            <a:fontRef idx="minor">
-              <a:schemeClr val="lt1"/>
-            </a:fontRef>
-          </p:style>
-          <p:txBody>
-            <a:bodyPr rtlCol="0" anchor="ctr"/>
-            <a:lstStyle/>
-            <a:p>
-              <a:pPr algn="ctr"/>
-              <a:endParaRPr kumimoji="1" lang="ja-JP" altLang="en-US">
-                <a:solidFill>
-                  <a:schemeClr val="tx1"/>
-                </a:solidFill>
-              </a:endParaRPr>
-            </a:p>
-          </p:txBody>
-        </p:sp>
-        <p:sp>
-          <p:nvSpPr>
-            <p:cNvPr id="21" name="正方形/長方形 20"/>
-            <p:cNvSpPr/>
-            <p:nvPr/>
-          </p:nvSpPr>
-          <p:spPr>
-            <a:xfrm>
-              <a:off x="3918678" y="1814570"/>
-              <a:ext cx="1935547" cy="369332"/>
-            </a:xfrm>
-            <a:prstGeom prst="rect">
-              <a:avLst/>
-            </a:prstGeom>
+            </a:endParaRPr>
+          </a:p>
+        </p:txBody>
+      </p:sp>
+      <p:sp>
+        <p:nvSpPr>
+          <p:cNvPr id="27" name="テキスト ボックス 26"/>
+          <p:cNvSpPr txBox="1"/>
+          <p:nvPr/>
+        </p:nvSpPr>
+        <p:spPr>
+          <a:xfrm>
+            <a:off x="4708922" y="3360225"/>
+            <a:ext cx="646331" cy="369332"/>
+          </a:xfrm>
+          <a:prstGeom prst="rect">
+            <a:avLst/>
+          </a:prstGeom>
+          <a:noFill/>
+          <a:ln>
             <a:noFill/>
-            <a:ln w="25400">
-              <a:solidFill>
-                <a:schemeClr val="tx1"/>
-              </a:solidFill>
-            </a:ln>
-            <a:effectLst/>
-          </p:spPr>
-          <p:style>
-            <a:lnRef idx="1">
-              <a:schemeClr val="accent1"/>
-            </a:lnRef>
-            <a:fillRef idx="3">
-              <a:schemeClr val="accent1"/>
-            </a:fillRef>
-            <a:effectRef idx="2">
-              <a:schemeClr val="accent1"/>
-            </a:effectRef>
-            <a:fontRef idx="minor">
-              <a:schemeClr val="lt1"/>
-            </a:fontRef>
-          </p:style>
-          <p:txBody>
-            <a:bodyPr rtlCol="0" anchor="ctr"/>
-            <a:lstStyle/>
-            <a:p>
-              <a:pPr algn="ctr"/>
-              <a:endParaRPr kumimoji="1" lang="ja-JP" altLang="en-US">
-                <a:solidFill>
-                  <a:schemeClr val="tx1"/>
-                </a:solidFill>
-              </a:endParaRPr>
-            </a:p>
-          </p:txBody>
-        </p:sp>
-        <p:sp>
-          <p:nvSpPr>
-            <p:cNvPr id="22" name="正方形/長方形 21"/>
-            <p:cNvSpPr/>
-            <p:nvPr/>
-          </p:nvSpPr>
-          <p:spPr>
-            <a:xfrm>
-              <a:off x="3918678" y="2842117"/>
-              <a:ext cx="1935547" cy="369332"/>
-            </a:xfrm>
-            <a:prstGeom prst="rect">
-              <a:avLst/>
-            </a:prstGeom>
-            <a:noFill/>
-            <a:ln w="25400">
-              <a:solidFill>
-                <a:schemeClr val="tx1"/>
-              </a:solidFill>
-            </a:ln>
-            <a:effectLst/>
-          </p:spPr>
-          <p:style>
-            <a:lnRef idx="1">
-              <a:schemeClr val="accent1"/>
-            </a:lnRef>
-            <a:fillRef idx="3">
-              <a:schemeClr val="accent1"/>
-            </a:fillRef>
-            <a:effectRef idx="2">
-              <a:schemeClr val="accent1"/>
-            </a:effectRef>
-            <a:fontRef idx="minor">
-              <a:schemeClr val="lt1"/>
-            </a:fontRef>
-          </p:style>
-          <p:txBody>
-            <a:bodyPr rtlCol="0" anchor="ctr"/>
-            <a:lstStyle/>
-            <a:p>
-              <a:pPr algn="ctr"/>
-              <a:endParaRPr kumimoji="1" lang="ja-JP" altLang="en-US">
-                <a:solidFill>
-                  <a:schemeClr val="tx1"/>
-                </a:solidFill>
-              </a:endParaRPr>
-            </a:p>
-          </p:txBody>
-        </p:sp>
-        <p:sp>
-          <p:nvSpPr>
-            <p:cNvPr id="23" name="正方形/長方形 22"/>
-            <p:cNvSpPr/>
-            <p:nvPr/>
-          </p:nvSpPr>
-          <p:spPr>
-            <a:xfrm>
-              <a:off x="3918678" y="2326727"/>
-              <a:ext cx="1935547" cy="369332"/>
-            </a:xfrm>
-            <a:prstGeom prst="rect">
-              <a:avLst/>
-            </a:prstGeom>
-            <a:noFill/>
-            <a:ln w="25400">
-              <a:solidFill>
-                <a:schemeClr val="tx1"/>
-              </a:solidFill>
-            </a:ln>
-            <a:effectLst/>
-          </p:spPr>
-          <p:style>
-            <a:lnRef idx="1">
-              <a:schemeClr val="accent1"/>
-            </a:lnRef>
-            <a:fillRef idx="3">
-              <a:schemeClr val="accent1"/>
-            </a:fillRef>
-            <a:effectRef idx="2">
-              <a:schemeClr val="accent1"/>
-            </a:effectRef>
-            <a:fontRef idx="minor">
-              <a:schemeClr val="lt1"/>
-            </a:fontRef>
-          </p:style>
-          <p:txBody>
-            <a:bodyPr rtlCol="0" anchor="ctr"/>
-            <a:lstStyle/>
-            <a:p>
-              <a:pPr algn="ctr"/>
-              <a:endParaRPr kumimoji="1" lang="ja-JP" altLang="en-US">
-                <a:solidFill>
-                  <a:schemeClr val="tx1"/>
-                </a:solidFill>
-              </a:endParaRPr>
-            </a:p>
-          </p:txBody>
-        </p:sp>
-        <p:sp>
-          <p:nvSpPr>
-            <p:cNvPr id="24" name="円/楕円 23"/>
-            <p:cNvSpPr/>
-            <p:nvPr/>
-          </p:nvSpPr>
-          <p:spPr>
-            <a:xfrm>
-              <a:off x="3635449" y="3464224"/>
-              <a:ext cx="163286" cy="179456"/>
-            </a:xfrm>
-            <a:prstGeom prst="ellipse">
-              <a:avLst/>
-            </a:prstGeom>
-            <a:solidFill>
-              <a:schemeClr val="tx1"/>
-            </a:solidFill>
-            <a:ln>
-              <a:solidFill>
-                <a:schemeClr val="tx1"/>
-              </a:solidFill>
-            </a:ln>
-            <a:effectLst/>
-          </p:spPr>
-          <p:style>
-            <a:lnRef idx="1">
-              <a:schemeClr val="accent1"/>
-            </a:lnRef>
-            <a:fillRef idx="3">
-              <a:schemeClr val="accent1"/>
-            </a:fillRef>
-            <a:effectRef idx="2">
-              <a:schemeClr val="accent1"/>
-            </a:effectRef>
-            <a:fontRef idx="minor">
-              <a:schemeClr val="lt1"/>
-            </a:fontRef>
-          </p:style>
-          <p:txBody>
-            <a:bodyPr rtlCol="0" anchor="ctr"/>
-            <a:lstStyle/>
-            <a:p>
-              <a:pPr algn="ctr"/>
-              <a:endParaRPr kumimoji="1" lang="ja-JP" altLang="en-US">
-                <a:solidFill>
-                  <a:schemeClr val="tx1"/>
-                </a:solidFill>
-              </a:endParaRPr>
-            </a:p>
-          </p:txBody>
-        </p:sp>
-        <p:sp>
-          <p:nvSpPr>
-            <p:cNvPr id="25" name="テキスト ボックス 24"/>
-            <p:cNvSpPr txBox="1"/>
-            <p:nvPr/>
-          </p:nvSpPr>
-          <p:spPr>
-            <a:xfrm>
-              <a:off x="3814371" y="3370783"/>
-              <a:ext cx="646331" cy="369332"/>
-            </a:xfrm>
-            <a:prstGeom prst="rect">
-              <a:avLst/>
-            </a:prstGeom>
-            <a:noFill/>
-            <a:ln>
-              <a:noFill/>
-            </a:ln>
-          </p:spPr>
-          <p:txBody>
-            <a:bodyPr wrap="none" rtlCol="0">
-              <a:spAutoFit/>
-            </a:bodyPr>
-            <a:lstStyle/>
-            <a:p>
-              <a:r>
-                <a:rPr lang="ja-JP" altLang="en-US" dirty="0" smtClean="0">
-                  <a:latin typeface="メイリオ"/>
-                  <a:ea typeface="メイリオ"/>
-                  <a:cs typeface="メイリオ"/>
-                </a:rPr>
-                <a:t>収入</a:t>
-              </a:r>
-              <a:endParaRPr kumimoji="1" lang="ja-JP" altLang="en-US" dirty="0">
+          </a:ln>
+        </p:spPr>
+        <p:txBody>
+          <a:bodyPr wrap="none" rtlCol="0">
+            <a:spAutoFit/>
+          </a:bodyPr>
+          <a:lstStyle/>
+          <a:p>
+            <a:r>
+              <a:rPr lang="ja-JP" altLang="en-US" dirty="0" smtClean="0">
                 <a:latin typeface="メイリオ"/>
                 <a:ea typeface="メイリオ"/>
                 <a:cs typeface="メイリオ"/>
-              </a:endParaRPr>
-            </a:p>
-          </p:txBody>
-        </p:sp>
-        <p:sp>
-          <p:nvSpPr>
-            <p:cNvPr id="26" name="円/楕円 25"/>
-            <p:cNvSpPr/>
-            <p:nvPr/>
-          </p:nvSpPr>
-          <p:spPr>
-            <a:xfrm>
-              <a:off x="4530000" y="3467034"/>
-              <a:ext cx="163286" cy="179456"/>
-            </a:xfrm>
-            <a:prstGeom prst="ellipse">
-              <a:avLst/>
-            </a:prstGeom>
-            <a:solidFill>
-              <a:schemeClr val="tx1"/>
-            </a:solidFill>
-            <a:ln>
-              <a:solidFill>
-                <a:schemeClr val="tx1"/>
-              </a:solidFill>
-            </a:ln>
-            <a:effectLst/>
-          </p:spPr>
-          <p:style>
-            <a:lnRef idx="1">
-              <a:schemeClr val="accent1"/>
-            </a:lnRef>
-            <a:fillRef idx="3">
-              <a:schemeClr val="accent1"/>
-            </a:fillRef>
-            <a:effectRef idx="2">
-              <a:schemeClr val="accent1"/>
-            </a:effectRef>
-            <a:fontRef idx="minor">
-              <a:schemeClr val="lt1"/>
-            </a:fontRef>
-          </p:style>
-          <p:txBody>
-            <a:bodyPr rtlCol="0" anchor="ctr"/>
-            <a:lstStyle/>
-            <a:p>
-              <a:pPr algn="ctr"/>
-              <a:endParaRPr kumimoji="1" lang="ja-JP" altLang="en-US">
-                <a:solidFill>
-                  <a:schemeClr val="tx1"/>
-                </a:solidFill>
-              </a:endParaRPr>
-            </a:p>
-          </p:txBody>
-        </p:sp>
-        <p:sp>
-          <p:nvSpPr>
-            <p:cNvPr id="27" name="テキスト ボックス 26"/>
-            <p:cNvSpPr txBox="1"/>
-            <p:nvPr/>
-          </p:nvSpPr>
-          <p:spPr>
-            <a:xfrm>
-              <a:off x="4708922" y="3360225"/>
-              <a:ext cx="646331" cy="369332"/>
-            </a:xfrm>
-            <a:prstGeom prst="rect">
-              <a:avLst/>
-            </a:prstGeom>
-            <a:noFill/>
-            <a:ln>
-              <a:noFill/>
-            </a:ln>
-          </p:spPr>
-          <p:txBody>
-            <a:bodyPr wrap="none" rtlCol="0">
-              <a:spAutoFit/>
-            </a:bodyPr>
-            <a:lstStyle/>
-            <a:p>
-              <a:r>
-                <a:rPr lang="ja-JP" altLang="en-US" dirty="0" smtClean="0">
-                  <a:latin typeface="メイリオ"/>
-                  <a:ea typeface="メイリオ"/>
-                  <a:cs typeface="メイリオ"/>
-                </a:rPr>
-                <a:t>支出</a:t>
-              </a:r>
-              <a:endParaRPr kumimoji="1" lang="ja-JP" altLang="en-US" dirty="0">
-                <a:latin typeface="メイリオ"/>
-                <a:ea typeface="メイリオ"/>
-                <a:cs typeface="メイリオ"/>
-              </a:endParaRPr>
-            </a:p>
-          </p:txBody>
-        </p:sp>
-        <p:sp>
-          <p:nvSpPr>
-            <p:cNvPr id="3" name="星 7 2"/>
-            <p:cNvSpPr/>
-            <p:nvPr/>
-          </p:nvSpPr>
-          <p:spPr>
-            <a:xfrm>
-              <a:off x="6029729" y="1400682"/>
-              <a:ext cx="178043" cy="154313"/>
-            </a:xfrm>
-            <a:prstGeom prst="star7">
-              <a:avLst/>
-            </a:prstGeom>
+              </a:rPr>
+              <a:t>支出</a:t>
+            </a:r>
+            <a:endParaRPr kumimoji="1" lang="ja-JP" altLang="en-US" dirty="0">
+              <a:latin typeface="メイリオ"/>
+              <a:ea typeface="メイリオ"/>
+              <a:cs typeface="メイリオ"/>
+            </a:endParaRPr>
+          </a:p>
+        </p:txBody>
+      </p:sp>
+      <p:sp>
+        <p:nvSpPr>
+          <p:cNvPr id="3" name="星 7 2"/>
+          <p:cNvSpPr/>
+          <p:nvPr/>
+        </p:nvSpPr>
+        <p:spPr>
+          <a:xfrm>
+            <a:off x="6029729" y="1400682"/>
+            <a:ext cx="178043" cy="154313"/>
+          </a:xfrm>
+          <a:prstGeom prst="star7">
+            <a:avLst/>
+          </a:prstGeom>
+          <a:solidFill>
+            <a:srgbClr val="FF0000"/>
+          </a:solidFill>
+          <a:ln>
             <a:solidFill>
               <a:srgbClr val="FF0000"/>
             </a:solidFill>
-            <a:ln>
-              <a:solidFill>
-                <a:srgbClr val="FF0000"/>
-              </a:solidFill>
-            </a:ln>
-            <a:effectLst/>
-          </p:spPr>
-          <p:style>
-            <a:lnRef idx="1">
-              <a:schemeClr val="accent1"/>
-            </a:lnRef>
-            <a:fillRef idx="3">
-              <a:schemeClr val="accent1"/>
-            </a:fillRef>
-            <a:effectRef idx="2">
-              <a:schemeClr val="accent1"/>
-            </a:effectRef>
-            <a:fontRef idx="minor">
-              <a:schemeClr val="lt1"/>
-            </a:fontRef>
-          </p:style>
-          <p:txBody>
-            <a:bodyPr rtlCol="0" anchor="ctr"/>
-            <a:lstStyle/>
-            <a:p>
-              <a:pPr algn="ctr"/>
-              <a:endParaRPr kumimoji="1" lang="ja-JP" altLang="en-US"/>
-            </a:p>
-          </p:txBody>
-        </p:sp>
-        <p:sp>
-          <p:nvSpPr>
-            <p:cNvPr id="28" name="星 7 27"/>
-            <p:cNvSpPr/>
-            <p:nvPr/>
-          </p:nvSpPr>
-          <p:spPr>
-            <a:xfrm>
-              <a:off x="6029729" y="1924854"/>
-              <a:ext cx="178043" cy="154313"/>
-            </a:xfrm>
-            <a:prstGeom prst="star7">
-              <a:avLst/>
-            </a:prstGeom>
+          </a:ln>
+          <a:effectLst/>
+        </p:spPr>
+        <p:style>
+          <a:lnRef idx="1">
+            <a:schemeClr val="accent1"/>
+          </a:lnRef>
+          <a:fillRef idx="3">
+            <a:schemeClr val="accent1"/>
+          </a:fillRef>
+          <a:effectRef idx="2">
+            <a:schemeClr val="accent1"/>
+          </a:effectRef>
+          <a:fontRef idx="minor">
+            <a:schemeClr val="lt1"/>
+          </a:fontRef>
+        </p:style>
+        <p:txBody>
+          <a:bodyPr rtlCol="0" anchor="ctr"/>
+          <a:lstStyle/>
+          <a:p>
+            <a:pPr algn="ctr"/>
+            <a:endParaRPr kumimoji="1" lang="ja-JP" altLang="en-US"/>
+          </a:p>
+        </p:txBody>
+      </p:sp>
+      <p:sp>
+        <p:nvSpPr>
+          <p:cNvPr id="28" name="星 7 27"/>
+          <p:cNvSpPr/>
+          <p:nvPr/>
+        </p:nvSpPr>
+        <p:spPr>
+          <a:xfrm>
+            <a:off x="6029729" y="1924854"/>
+            <a:ext cx="178043" cy="154313"/>
+          </a:xfrm>
+          <a:prstGeom prst="star7">
+            <a:avLst/>
+          </a:prstGeom>
+          <a:solidFill>
+            <a:srgbClr val="FF0000"/>
+          </a:solidFill>
+          <a:ln>
             <a:solidFill>
               <a:srgbClr val="FF0000"/>
             </a:solidFill>
-            <a:ln>
-              <a:solidFill>
-                <a:srgbClr val="FF0000"/>
-              </a:solidFill>
-            </a:ln>
-            <a:effectLst/>
-          </p:spPr>
-          <p:style>
-            <a:lnRef idx="1">
-              <a:schemeClr val="accent1"/>
-            </a:lnRef>
-            <a:fillRef idx="3">
-              <a:schemeClr val="accent1"/>
-            </a:fillRef>
-            <a:effectRef idx="2">
-              <a:schemeClr val="accent1"/>
-            </a:effectRef>
-            <a:fontRef idx="minor">
-              <a:schemeClr val="lt1"/>
-            </a:fontRef>
-          </p:style>
-          <p:txBody>
-            <a:bodyPr rtlCol="0" anchor="ctr"/>
-            <a:lstStyle/>
-            <a:p>
-              <a:pPr algn="ctr"/>
-              <a:endParaRPr kumimoji="1" lang="ja-JP" altLang="en-US"/>
-            </a:p>
-          </p:txBody>
-        </p:sp>
-      </p:grpSp>
+          </a:ln>
+          <a:effectLst/>
+        </p:spPr>
+        <p:style>
+          <a:lnRef idx="1">
+            <a:schemeClr val="accent1"/>
+          </a:lnRef>
+          <a:fillRef idx="3">
+            <a:schemeClr val="accent1"/>
+          </a:fillRef>
+          <a:effectRef idx="2">
+            <a:schemeClr val="accent1"/>
+          </a:effectRef>
+          <a:fontRef idx="minor">
+            <a:schemeClr val="lt1"/>
+          </a:fontRef>
+        </p:style>
+        <p:txBody>
+          <a:bodyPr rtlCol="0" anchor="ctr"/>
+          <a:lstStyle/>
+          <a:p>
+            <a:pPr algn="ctr"/>
+            <a:endParaRPr kumimoji="1" lang="ja-JP" altLang="en-US"/>
+          </a:p>
+        </p:txBody>
+      </p:sp>
       <p:sp>
         <p:nvSpPr>
           <p:cNvPr id="6" name="円形吹き出し 5"/>

</xml_diff>

<commit_message>
settle on register (#84)
* upadte use case

* update requirement spec

* update ui

* output images for ui

* remove comment

* update functional spec

* update design umls

* update design spec

* update adhafera to 2.0.0

* update module test spec

* update system test spec
</commit_message>
<xml_diff>
--- a/adhafera/interface/ui.pptx
+++ b/adhafera/interface/ui.pptx
@@ -5,12 +5,13 @@
     <p:sldMasterId id="2147483648" r:id="rId1"/>
   </p:sldMasterIdLst>
   <p:notesMasterIdLst>
-    <p:notesMasterId r:id="rId5"/>
+    <p:notesMasterId r:id="rId6"/>
   </p:notesMasterIdLst>
   <p:sldIdLst>
     <p:sldId id="256" r:id="rId2"/>
     <p:sldId id="263" r:id="rId3"/>
-    <p:sldId id="264" r:id="rId4"/>
+    <p:sldId id="265" r:id="rId4"/>
+    <p:sldId id="264" r:id="rId5"/>
   </p:sldIdLst>
   <p:sldSz cx="9144000" cy="6858000" type="screen4x3"/>
   <p:notesSz cx="6858000" cy="9144000"/>
@@ -194,7 +195,7 @@
           <a:p>
             <a:fld id="{EE82FEE5-269B-9B49-A8C4-823C45BE6055}" type="datetimeFigureOut">
               <a:rPr kumimoji="1" lang="ja-JP" altLang="en-US" smtClean="0"/>
-              <a:t>16/05/01</a:t>
+              <a:t>16/08/06</a:t>
             </a:fld>
             <a:endParaRPr kumimoji="1" lang="ja-JP" altLang="en-US"/>
           </a:p>
@@ -662,6 +663,90 @@
 </p:notes>
 </file>
 
+<file path=ppt/notesSlides/notesSlide3.xml><?xml version="1.0" encoding="utf-8"?>
+<p:notes xmlns:a="http://schemas.openxmlformats.org/drawingml/2006/main" xmlns:r="http://schemas.openxmlformats.org/officeDocument/2006/relationships" xmlns:p="http://schemas.openxmlformats.org/presentationml/2006/main">
+  <p:cSld>
+    <p:spTree>
+      <p:nvGrpSpPr>
+        <p:cNvPr id="1" name=""/>
+        <p:cNvGrpSpPr/>
+        <p:nvPr/>
+      </p:nvGrpSpPr>
+      <p:grpSpPr>
+        <a:xfrm>
+          <a:off x="0" y="0"/>
+          <a:ext cx="0" cy="0"/>
+          <a:chOff x="0" y="0"/>
+          <a:chExt cx="0" cy="0"/>
+        </a:xfrm>
+      </p:grpSpPr>
+      <p:sp>
+        <p:nvSpPr>
+          <p:cNvPr id="2" name="スライド イメージ プレースホルダー 1"/>
+          <p:cNvSpPr>
+            <a:spLocks noGrp="1" noRot="1" noChangeAspect="1"/>
+          </p:cNvSpPr>
+          <p:nvPr>
+            <p:ph type="sldImg"/>
+          </p:nvPr>
+        </p:nvSpPr>
+        <p:spPr/>
+      </p:sp>
+      <p:sp>
+        <p:nvSpPr>
+          <p:cNvPr id="3" name="ノート プレースホルダー 2"/>
+          <p:cNvSpPr>
+            <a:spLocks noGrp="1"/>
+          </p:cNvSpPr>
+          <p:nvPr>
+            <p:ph type="body" idx="1"/>
+          </p:nvPr>
+        </p:nvSpPr>
+        <p:spPr/>
+        <p:txBody>
+          <a:bodyPr/>
+          <a:lstStyle/>
+          <a:p>
+            <a:endParaRPr kumimoji="1" lang="ja-JP" altLang="en-US" dirty="0"/>
+          </a:p>
+        </p:txBody>
+      </p:sp>
+      <p:sp>
+        <p:nvSpPr>
+          <p:cNvPr id="4" name="スライド番号プレースホルダー 3"/>
+          <p:cNvSpPr>
+            <a:spLocks noGrp="1"/>
+          </p:cNvSpPr>
+          <p:nvPr>
+            <p:ph type="sldNum" sz="quarter" idx="10"/>
+          </p:nvPr>
+        </p:nvSpPr>
+        <p:spPr/>
+        <p:txBody>
+          <a:bodyPr/>
+          <a:lstStyle/>
+          <a:p>
+            <a:fld id="{A9E1B25B-30E5-7A42-A56A-DF1A6F86BC06}" type="slidenum">
+              <a:rPr kumimoji="1" lang="ja-JP" altLang="en-US" smtClean="0"/>
+              <a:t>4</a:t>
+            </a:fld>
+            <a:endParaRPr kumimoji="1" lang="ja-JP" altLang="en-US"/>
+          </a:p>
+        </p:txBody>
+      </p:sp>
+    </p:spTree>
+    <p:extLst>
+      <p:ext uri="{BB962C8B-B14F-4D97-AF65-F5344CB8AC3E}">
+        <p14:creationId xmlns:p14="http://schemas.microsoft.com/office/powerpoint/2010/main" val="3631066132"/>
+      </p:ext>
+    </p:extLst>
+  </p:cSld>
+  <p:clrMapOvr>
+    <a:masterClrMapping/>
+  </p:clrMapOvr>
+</p:notes>
+</file>
+
 <file path=ppt/slideLayouts/slideLayout1.xml><?xml version="1.0" encoding="utf-8"?>
 <p:sldLayout xmlns:a="http://schemas.openxmlformats.org/drawingml/2006/main" xmlns:r="http://schemas.openxmlformats.org/officeDocument/2006/relationships" xmlns:p="http://schemas.openxmlformats.org/presentationml/2006/main" type="title" preserve="1">
   <p:cSld name="タイトル スライド">
@@ -843,7 +928,7 @@
           <a:p>
             <a:fld id="{3ABA01A1-4899-9944-833D-6A66CDE659CB}" type="datetimeFigureOut">
               <a:rPr kumimoji="1" lang="ja-JP" altLang="en-US" smtClean="0"/>
-              <a:t>16/05/01</a:t>
+              <a:t>16/08/06</a:t>
             </a:fld>
             <a:endParaRPr kumimoji="1" lang="ja-JP" altLang="en-US"/>
           </a:p>
@@ -1045,7 +1130,7 @@
           <a:p>
             <a:fld id="{3ABA01A1-4899-9944-833D-6A66CDE659CB}" type="datetimeFigureOut">
               <a:rPr kumimoji="1" lang="ja-JP" altLang="en-US" smtClean="0"/>
-              <a:t>16/05/01</a:t>
+              <a:t>16/08/06</a:t>
             </a:fld>
             <a:endParaRPr kumimoji="1" lang="ja-JP" altLang="en-US"/>
           </a:p>
@@ -1257,7 +1342,7 @@
           <a:p>
             <a:fld id="{3ABA01A1-4899-9944-833D-6A66CDE659CB}" type="datetimeFigureOut">
               <a:rPr kumimoji="1" lang="ja-JP" altLang="en-US" smtClean="0"/>
-              <a:t>16/05/01</a:t>
+              <a:t>16/08/06</a:t>
             </a:fld>
             <a:endParaRPr kumimoji="1" lang="ja-JP" altLang="en-US"/>
           </a:p>
@@ -1459,7 +1544,7 @@
           <a:p>
             <a:fld id="{3ABA01A1-4899-9944-833D-6A66CDE659CB}" type="datetimeFigureOut">
               <a:rPr kumimoji="1" lang="ja-JP" altLang="en-US" smtClean="0"/>
-              <a:t>16/05/01</a:t>
+              <a:t>16/08/06</a:t>
             </a:fld>
             <a:endParaRPr kumimoji="1" lang="ja-JP" altLang="en-US"/>
           </a:p>
@@ -1705,7 +1790,7 @@
           <a:p>
             <a:fld id="{3ABA01A1-4899-9944-833D-6A66CDE659CB}" type="datetimeFigureOut">
               <a:rPr kumimoji="1" lang="ja-JP" altLang="en-US" smtClean="0"/>
-              <a:t>16/05/01</a:t>
+              <a:t>16/08/06</a:t>
             </a:fld>
             <a:endParaRPr kumimoji="1" lang="ja-JP" altLang="en-US"/>
           </a:p>
@@ -2057,7 +2142,7 @@
           <a:p>
             <a:fld id="{3ABA01A1-4899-9944-833D-6A66CDE659CB}" type="datetimeFigureOut">
               <a:rPr kumimoji="1" lang="ja-JP" altLang="en-US" smtClean="0"/>
-              <a:t>16/05/01</a:t>
+              <a:t>16/08/06</a:t>
             </a:fld>
             <a:endParaRPr kumimoji="1" lang="ja-JP" altLang="en-US"/>
           </a:p>
@@ -2543,7 +2628,7 @@
           <a:p>
             <a:fld id="{3ABA01A1-4899-9944-833D-6A66CDE659CB}" type="datetimeFigureOut">
               <a:rPr kumimoji="1" lang="ja-JP" altLang="en-US" smtClean="0"/>
-              <a:t>16/05/01</a:t>
+              <a:t>16/08/06</a:t>
             </a:fld>
             <a:endParaRPr kumimoji="1" lang="ja-JP" altLang="en-US"/>
           </a:p>
@@ -2661,7 +2746,7 @@
           <a:p>
             <a:fld id="{3ABA01A1-4899-9944-833D-6A66CDE659CB}" type="datetimeFigureOut">
               <a:rPr kumimoji="1" lang="ja-JP" altLang="en-US" smtClean="0"/>
-              <a:t>16/05/01</a:t>
+              <a:t>16/08/06</a:t>
             </a:fld>
             <a:endParaRPr kumimoji="1" lang="ja-JP" altLang="en-US"/>
           </a:p>
@@ -2756,7 +2841,7 @@
           <a:p>
             <a:fld id="{3ABA01A1-4899-9944-833D-6A66CDE659CB}" type="datetimeFigureOut">
               <a:rPr kumimoji="1" lang="ja-JP" altLang="en-US" smtClean="0"/>
-              <a:t>16/05/01</a:t>
+              <a:t>16/08/06</a:t>
             </a:fld>
             <a:endParaRPr kumimoji="1" lang="ja-JP" altLang="en-US"/>
           </a:p>
@@ -3065,7 +3150,7 @@
           <a:p>
             <a:fld id="{3ABA01A1-4899-9944-833D-6A66CDE659CB}" type="datetimeFigureOut">
               <a:rPr kumimoji="1" lang="ja-JP" altLang="en-US" smtClean="0"/>
-              <a:t>16/05/01</a:t>
+              <a:t>16/08/06</a:t>
             </a:fld>
             <a:endParaRPr kumimoji="1" lang="ja-JP" altLang="en-US"/>
           </a:p>
@@ -3318,7 +3403,7 @@
           <a:p>
             <a:fld id="{3ABA01A1-4899-9944-833D-6A66CDE659CB}" type="datetimeFigureOut">
               <a:rPr kumimoji="1" lang="ja-JP" altLang="en-US" smtClean="0"/>
-              <a:t>16/05/01</a:t>
+              <a:t>16/08/06</a:t>
             </a:fld>
             <a:endParaRPr kumimoji="1" lang="ja-JP" altLang="en-US"/>
           </a:p>
@@ -3563,7 +3648,7 @@
           <a:p>
             <a:fld id="{3ABA01A1-4899-9944-833D-6A66CDE659CB}" type="datetimeFigureOut">
               <a:rPr kumimoji="1" lang="ja-JP" altLang="en-US" smtClean="0"/>
-              <a:t>16/05/01</a:t>
+              <a:t>16/08/06</a:t>
             </a:fld>
             <a:endParaRPr kumimoji="1" lang="ja-JP" altLang="en-US"/>
           </a:p>
@@ -3999,11 +4084,7 @@
             </a:r>
             <a:r>
               <a:rPr lang="en-US" altLang="ja-JP" sz="2800" dirty="0" smtClean="0"/>
-              <a:t>2016/05/01</a:t>
-            </a:r>
-            <a:r>
-              <a:rPr lang="en-US" altLang="ja-JP" sz="2800" dirty="0" smtClean="0"/>
-              <a:t/>
+              <a:t>2016/08/06</a:t>
             </a:r>
             <a:br>
               <a:rPr lang="en-US" altLang="ja-JP" sz="2800" dirty="0" smtClean="0"/>
@@ -4014,11 +4095,7 @@
             </a:r>
             <a:r>
               <a:rPr lang="en-US" altLang="ja-JP" sz="2800" dirty="0" smtClean="0"/>
-              <a:t> </a:t>
-            </a:r>
-            <a:r>
-              <a:rPr lang="en-US" altLang="ja-JP" sz="2800" dirty="0" smtClean="0"/>
-              <a:t>1.1.0</a:t>
+              <a:t> 2.0.0</a:t>
             </a:r>
             <a:endParaRPr kumimoji="1" lang="ja-JP" altLang="en-US" dirty="0"/>
           </a:p>
@@ -4906,7 +4983,212 @@
             </a:p>
           </p:txBody>
         </p:sp>
+        <p:sp>
+          <p:nvSpPr>
+            <p:cNvPr id="30" name="テキスト ボックス 29"/>
+            <p:cNvSpPr txBox="1"/>
+            <p:nvPr/>
+          </p:nvSpPr>
+          <p:spPr>
+            <a:xfrm>
+              <a:off x="3041515" y="4056699"/>
+              <a:ext cx="877163" cy="369332"/>
+            </a:xfrm>
+            <a:prstGeom prst="rect">
+              <a:avLst/>
+            </a:prstGeom>
+            <a:noFill/>
+            <a:ln>
+              <a:noFill/>
+            </a:ln>
+          </p:spPr>
+          <p:txBody>
+            <a:bodyPr wrap="none" rtlCol="0">
+              <a:spAutoFit/>
+            </a:bodyPr>
+            <a:lstStyle/>
+            <a:p>
+              <a:r>
+                <a:rPr lang="en-US" altLang="en-US" dirty="0" smtClean="0">
+                  <a:latin typeface="メイリオ"/>
+                  <a:ea typeface="メイリオ"/>
+                  <a:cs typeface="メイリオ"/>
+                </a:rPr>
+                <a:t>収支</a:t>
+              </a:r>
+              <a:r>
+                <a:rPr kumimoji="1" lang="ja-JP" altLang="en-US" dirty="0" smtClean="0">
+                  <a:latin typeface="メイリオ"/>
+                  <a:ea typeface="メイリオ"/>
+                  <a:cs typeface="メイリオ"/>
+                </a:rPr>
+                <a:t>：</a:t>
+              </a:r>
+              <a:endParaRPr kumimoji="1" lang="ja-JP" altLang="en-US" dirty="0">
+                <a:latin typeface="メイリオ"/>
+                <a:ea typeface="メイリオ"/>
+                <a:cs typeface="メイリオ"/>
+              </a:endParaRPr>
+            </a:p>
+          </p:txBody>
+        </p:sp>
+        <p:sp>
+          <p:nvSpPr>
+            <p:cNvPr id="31" name="テキスト ボックス 30"/>
+            <p:cNvSpPr txBox="1"/>
+            <p:nvPr/>
+          </p:nvSpPr>
+          <p:spPr>
+            <a:xfrm>
+              <a:off x="4669812" y="4056699"/>
+              <a:ext cx="1184413" cy="369332"/>
+            </a:xfrm>
+            <a:prstGeom prst="rect">
+              <a:avLst/>
+            </a:prstGeom>
+            <a:noFill/>
+            <a:ln>
+              <a:noFill/>
+            </a:ln>
+          </p:spPr>
+          <p:txBody>
+            <a:bodyPr wrap="square" rtlCol="0">
+              <a:spAutoFit/>
+            </a:bodyPr>
+            <a:lstStyle/>
+            <a:p>
+              <a:r>
+                <a:rPr lang="en-US" altLang="ja-JP" dirty="0" err="1" smtClean="0">
+                  <a:latin typeface="メイリオ"/>
+                  <a:ea typeface="メイリオ"/>
+                  <a:cs typeface="メイリオ"/>
+                </a:rPr>
+                <a:t>xxxxx</a:t>
+              </a:r>
+              <a:r>
+                <a:rPr lang="en-US" altLang="ja-JP" dirty="0">
+                  <a:latin typeface="メイリオ"/>
+                  <a:ea typeface="メイリオ"/>
+                  <a:cs typeface="メイリオ"/>
+                </a:rPr>
+                <a:t> </a:t>
+              </a:r>
+              <a:r>
+                <a:rPr lang="ja-JP" altLang="en-US" dirty="0" smtClean="0">
+                  <a:latin typeface="メイリオ"/>
+                  <a:ea typeface="メイリオ"/>
+                  <a:cs typeface="メイリオ"/>
+                </a:rPr>
+                <a:t>円</a:t>
+              </a:r>
+              <a:endParaRPr kumimoji="1" lang="ja-JP" altLang="en-US" dirty="0">
+                <a:latin typeface="メイリオ"/>
+                <a:ea typeface="メイリオ"/>
+                <a:cs typeface="メイリオ"/>
+              </a:endParaRPr>
+            </a:p>
+          </p:txBody>
+        </p:sp>
       </p:grpSp>
+      <p:sp>
+        <p:nvSpPr>
+          <p:cNvPr id="32" name="円形吹き出し 31"/>
+          <p:cNvSpPr/>
+          <p:nvPr/>
+        </p:nvSpPr>
+        <p:spPr>
+          <a:xfrm>
+            <a:off x="5133990" y="4623225"/>
+            <a:ext cx="2409517" cy="872852"/>
+          </a:xfrm>
+          <a:prstGeom prst="wedgeEllipseCallout">
+            <a:avLst>
+              <a:gd name="adj1" fmla="val -47434"/>
+              <a:gd name="adj2" fmla="val -62691"/>
+            </a:avLst>
+          </a:prstGeom>
+          <a:solidFill>
+            <a:schemeClr val="bg1"/>
+          </a:solidFill>
+          <a:ln w="19050">
+            <a:solidFill>
+              <a:srgbClr val="008000"/>
+            </a:solidFill>
+          </a:ln>
+        </p:spPr>
+        <p:style>
+          <a:lnRef idx="1">
+            <a:schemeClr val="accent1"/>
+          </a:lnRef>
+          <a:fillRef idx="3">
+            <a:schemeClr val="accent1"/>
+          </a:fillRef>
+          <a:effectRef idx="2">
+            <a:schemeClr val="accent1"/>
+          </a:effectRef>
+          <a:fontRef idx="minor">
+            <a:schemeClr val="lt1"/>
+          </a:fontRef>
+        </p:style>
+        <p:txBody>
+          <a:bodyPr rtlCol="0" anchor="ctr"/>
+          <a:lstStyle/>
+          <a:p>
+            <a:pPr algn="ctr"/>
+            <a:endParaRPr kumimoji="1" lang="ja-JP" altLang="en-US" sz="1400" dirty="0">
+              <a:solidFill>
+                <a:schemeClr val="tx1"/>
+              </a:solidFill>
+              <a:latin typeface="メイリオ"/>
+              <a:ea typeface="メイリオ"/>
+              <a:cs typeface="メイリオ"/>
+            </a:endParaRPr>
+          </a:p>
+        </p:txBody>
+      </p:sp>
+      <p:sp>
+        <p:nvSpPr>
+          <p:cNvPr id="33" name="テキスト ボックス 32"/>
+          <p:cNvSpPr txBox="1"/>
+          <p:nvPr/>
+        </p:nvSpPr>
+        <p:spPr>
+          <a:xfrm>
+            <a:off x="5285980" y="4807152"/>
+            <a:ext cx="2159566" cy="523220"/>
+          </a:xfrm>
+          <a:prstGeom prst="rect">
+            <a:avLst/>
+          </a:prstGeom>
+          <a:noFill/>
+        </p:spPr>
+        <p:txBody>
+          <a:bodyPr wrap="none" rtlCol="0">
+            <a:spAutoFit/>
+          </a:bodyPr>
+          <a:lstStyle/>
+          <a:p>
+            <a:r>
+              <a:rPr lang="en-US" altLang="en-US" sz="1400" dirty="0" smtClean="0">
+                <a:latin typeface="メイリオ"/>
+                <a:ea typeface="メイリオ"/>
+                <a:cs typeface="メイリオ"/>
+              </a:rPr>
+              <a:t>アプリ起動時の月の収支</a:t>
+            </a:r>
+          </a:p>
+          <a:p>
+            <a:r>
+              <a:rPr lang="en-US" altLang="en-US" sz="1400" dirty="0" smtClean="0">
+                <a:latin typeface="メイリオ"/>
+                <a:ea typeface="メイリオ"/>
+                <a:cs typeface="メイリオ"/>
+              </a:rPr>
+              <a:t>が表示される</a:t>
+            </a:r>
+          </a:p>
+        </p:txBody>
+      </p:sp>
       <p:sp>
         <p:nvSpPr>
           <p:cNvPr id="28" name="円形吹き出し 27"/>
@@ -5077,7 +5359,7 @@
                 <a:ea typeface="メイリオ"/>
                 <a:cs typeface="メイリオ"/>
               </a:rPr>
-              <a:t>登録失敗時</a:t>
+              <a:t>登録成功時</a:t>
             </a:r>
             <a:endParaRPr kumimoji="1" lang="ja-JP" altLang="en-US" sz="2000" dirty="0">
               <a:latin typeface="メイリオ"/>
@@ -5089,7 +5371,7 @@
       </p:sp>
       <p:grpSp>
         <p:nvGrpSpPr>
-          <p:cNvPr id="8" name="図形グループ 7"/>
+          <p:cNvPr id="6" name="図形グループ 5"/>
           <p:cNvGrpSpPr/>
           <p:nvPr/>
         </p:nvGrpSpPr>
@@ -5849,6 +6131,1360 @@
         </p:sp>
         <p:sp>
           <p:nvSpPr>
+            <p:cNvPr id="3" name="テキスト ボックス 2"/>
+            <p:cNvSpPr txBox="1"/>
+            <p:nvPr/>
+          </p:nvSpPr>
+          <p:spPr>
+            <a:xfrm>
+              <a:off x="3974436" y="1295947"/>
+              <a:ext cx="1468972" cy="338554"/>
+            </a:xfrm>
+            <a:prstGeom prst="rect">
+              <a:avLst/>
+            </a:prstGeom>
+            <a:noFill/>
+          </p:spPr>
+          <p:txBody>
+            <a:bodyPr wrap="none" rtlCol="0">
+              <a:spAutoFit/>
+            </a:bodyPr>
+            <a:lstStyle/>
+            <a:p>
+              <a:r>
+                <a:rPr kumimoji="1" lang="en-US" altLang="ja-JP" sz="1600" dirty="0" err="1" smtClean="0">
+                  <a:latin typeface="メイリオ"/>
+                  <a:ea typeface="メイリオ"/>
+                  <a:cs typeface="メイリオ"/>
+                </a:rPr>
+                <a:t>yyyy</a:t>
+              </a:r>
+              <a:r>
+                <a:rPr kumimoji="1" lang="en-US" altLang="ja-JP" sz="1600" dirty="0" smtClean="0">
+                  <a:latin typeface="メイリオ"/>
+                  <a:ea typeface="メイリオ"/>
+                  <a:cs typeface="メイリオ"/>
+                </a:rPr>
+                <a:t>-mm-</a:t>
+              </a:r>
+              <a:r>
+                <a:rPr kumimoji="1" lang="en-US" altLang="ja-JP" sz="1600" dirty="0" err="1" smtClean="0">
+                  <a:latin typeface="メイリオ"/>
+                  <a:ea typeface="メイリオ"/>
+                  <a:cs typeface="メイリオ"/>
+                </a:rPr>
+                <a:t>dd</a:t>
+              </a:r>
+              <a:endParaRPr kumimoji="1" lang="ja-JP" altLang="en-US" sz="1600" dirty="0">
+                <a:latin typeface="メイリオ"/>
+                <a:ea typeface="メイリオ"/>
+                <a:cs typeface="メイリオ"/>
+              </a:endParaRPr>
+            </a:p>
+          </p:txBody>
+        </p:sp>
+        <p:sp>
+          <p:nvSpPr>
+            <p:cNvPr id="30" name="テキスト ボックス 29"/>
+            <p:cNvSpPr txBox="1"/>
+            <p:nvPr/>
+          </p:nvSpPr>
+          <p:spPr>
+            <a:xfrm>
+              <a:off x="3041515" y="4056699"/>
+              <a:ext cx="877163" cy="369332"/>
+            </a:xfrm>
+            <a:prstGeom prst="rect">
+              <a:avLst/>
+            </a:prstGeom>
+            <a:noFill/>
+            <a:ln>
+              <a:noFill/>
+            </a:ln>
+          </p:spPr>
+          <p:txBody>
+            <a:bodyPr wrap="none" rtlCol="0">
+              <a:spAutoFit/>
+            </a:bodyPr>
+            <a:lstStyle/>
+            <a:p>
+              <a:r>
+                <a:rPr lang="en-US" altLang="en-US" dirty="0" smtClean="0">
+                  <a:latin typeface="メイリオ"/>
+                  <a:ea typeface="メイリオ"/>
+                  <a:cs typeface="メイリオ"/>
+                </a:rPr>
+                <a:t>収支</a:t>
+              </a:r>
+              <a:r>
+                <a:rPr kumimoji="1" lang="ja-JP" altLang="en-US" dirty="0" smtClean="0">
+                  <a:latin typeface="メイリオ"/>
+                  <a:ea typeface="メイリオ"/>
+                  <a:cs typeface="メイリオ"/>
+                </a:rPr>
+                <a:t>：</a:t>
+              </a:r>
+              <a:endParaRPr kumimoji="1" lang="ja-JP" altLang="en-US" dirty="0">
+                <a:latin typeface="メイリオ"/>
+                <a:ea typeface="メイリオ"/>
+                <a:cs typeface="メイリオ"/>
+              </a:endParaRPr>
+            </a:p>
+          </p:txBody>
+        </p:sp>
+        <p:sp>
+          <p:nvSpPr>
+            <p:cNvPr id="31" name="テキスト ボックス 30"/>
+            <p:cNvSpPr txBox="1"/>
+            <p:nvPr/>
+          </p:nvSpPr>
+          <p:spPr>
+            <a:xfrm>
+              <a:off x="4669812" y="4056699"/>
+              <a:ext cx="1184413" cy="369332"/>
+            </a:xfrm>
+            <a:prstGeom prst="rect">
+              <a:avLst/>
+            </a:prstGeom>
+            <a:noFill/>
+            <a:ln>
+              <a:noFill/>
+            </a:ln>
+          </p:spPr>
+          <p:txBody>
+            <a:bodyPr wrap="square" rtlCol="0">
+              <a:spAutoFit/>
+            </a:bodyPr>
+            <a:lstStyle/>
+            <a:p>
+              <a:r>
+                <a:rPr lang="en-US" altLang="ja-JP" dirty="0" err="1" smtClean="0">
+                  <a:latin typeface="メイリオ"/>
+                  <a:ea typeface="メイリオ"/>
+                  <a:cs typeface="メイリオ"/>
+                </a:rPr>
+                <a:t>xxxxx</a:t>
+              </a:r>
+              <a:r>
+                <a:rPr lang="en-US" altLang="ja-JP" dirty="0">
+                  <a:latin typeface="メイリオ"/>
+                  <a:ea typeface="メイリオ"/>
+                  <a:cs typeface="メイリオ"/>
+                </a:rPr>
+                <a:t> </a:t>
+              </a:r>
+              <a:r>
+                <a:rPr lang="ja-JP" altLang="en-US" dirty="0" smtClean="0">
+                  <a:latin typeface="メイリオ"/>
+                  <a:ea typeface="メイリオ"/>
+                  <a:cs typeface="メイリオ"/>
+                </a:rPr>
+                <a:t>円</a:t>
+              </a:r>
+              <a:endParaRPr kumimoji="1" lang="ja-JP" altLang="en-US" dirty="0">
+                <a:latin typeface="メイリオ"/>
+                <a:ea typeface="メイリオ"/>
+                <a:cs typeface="メイリオ"/>
+              </a:endParaRPr>
+            </a:p>
+          </p:txBody>
+        </p:sp>
+      </p:grpSp>
+      <p:sp>
+        <p:nvSpPr>
+          <p:cNvPr id="32" name="円形吹き出し 31"/>
+          <p:cNvSpPr/>
+          <p:nvPr/>
+        </p:nvSpPr>
+        <p:spPr>
+          <a:xfrm>
+            <a:off x="5133990" y="4623225"/>
+            <a:ext cx="2409517" cy="872852"/>
+          </a:xfrm>
+          <a:prstGeom prst="wedgeEllipseCallout">
+            <a:avLst>
+              <a:gd name="adj1" fmla="val -47434"/>
+              <a:gd name="adj2" fmla="val -62691"/>
+            </a:avLst>
+          </a:prstGeom>
+          <a:solidFill>
+            <a:schemeClr val="bg1"/>
+          </a:solidFill>
+          <a:ln w="19050">
+            <a:solidFill>
+              <a:srgbClr val="008000"/>
+            </a:solidFill>
+          </a:ln>
+        </p:spPr>
+        <p:style>
+          <a:lnRef idx="1">
+            <a:schemeClr val="accent1"/>
+          </a:lnRef>
+          <a:fillRef idx="3">
+            <a:schemeClr val="accent1"/>
+          </a:fillRef>
+          <a:effectRef idx="2">
+            <a:schemeClr val="accent1"/>
+          </a:effectRef>
+          <a:fontRef idx="minor">
+            <a:schemeClr val="lt1"/>
+          </a:fontRef>
+        </p:style>
+        <p:txBody>
+          <a:bodyPr rtlCol="0" anchor="ctr"/>
+          <a:lstStyle/>
+          <a:p>
+            <a:pPr algn="ctr"/>
+            <a:endParaRPr kumimoji="1" lang="ja-JP" altLang="en-US" sz="1400" dirty="0">
+              <a:solidFill>
+                <a:schemeClr val="tx1"/>
+              </a:solidFill>
+              <a:latin typeface="メイリオ"/>
+              <a:ea typeface="メイリオ"/>
+              <a:cs typeface="メイリオ"/>
+            </a:endParaRPr>
+          </a:p>
+        </p:txBody>
+      </p:sp>
+      <p:sp>
+        <p:nvSpPr>
+          <p:cNvPr id="33" name="テキスト ボックス 32"/>
+          <p:cNvSpPr txBox="1"/>
+          <p:nvPr/>
+        </p:nvSpPr>
+        <p:spPr>
+          <a:xfrm>
+            <a:off x="5285980" y="4807152"/>
+            <a:ext cx="2159566" cy="523220"/>
+          </a:xfrm>
+          <a:prstGeom prst="rect">
+            <a:avLst/>
+          </a:prstGeom>
+          <a:noFill/>
+        </p:spPr>
+        <p:txBody>
+          <a:bodyPr wrap="none" rtlCol="0">
+            <a:spAutoFit/>
+          </a:bodyPr>
+          <a:lstStyle/>
+          <a:p>
+            <a:r>
+              <a:rPr lang="ja-JP" altLang="en-US" sz="1400" dirty="0" smtClean="0">
+                <a:latin typeface="メイリオ"/>
+                <a:ea typeface="メイリオ"/>
+                <a:cs typeface="メイリオ"/>
+              </a:rPr>
+              <a:t>登録した家計簿を含めて</a:t>
+            </a:r>
+            <a:endParaRPr lang="en-US" altLang="ja-JP" sz="1400" dirty="0" smtClean="0">
+              <a:latin typeface="メイリオ"/>
+              <a:ea typeface="メイリオ"/>
+              <a:cs typeface="メイリオ"/>
+            </a:endParaRPr>
+          </a:p>
+          <a:p>
+            <a:r>
+              <a:rPr lang="en-US" altLang="en-US" sz="1400" dirty="0" smtClean="0">
+                <a:latin typeface="メイリオ"/>
+                <a:ea typeface="メイリオ"/>
+                <a:cs typeface="メイリオ"/>
+              </a:rPr>
+              <a:t>収支が</a:t>
+            </a:r>
+            <a:r>
+              <a:rPr lang="ja-JP" altLang="en-US" sz="1400" dirty="0" smtClean="0">
+                <a:latin typeface="メイリオ"/>
+                <a:ea typeface="メイリオ"/>
+                <a:cs typeface="メイリオ"/>
+              </a:rPr>
+              <a:t>再計算</a:t>
+            </a:r>
+            <a:r>
+              <a:rPr lang="en-US" altLang="en-US" sz="1400" dirty="0" smtClean="0">
+                <a:latin typeface="メイリオ"/>
+                <a:ea typeface="メイリオ"/>
+                <a:cs typeface="メイリオ"/>
+              </a:rPr>
+              <a:t>される</a:t>
+            </a:r>
+          </a:p>
+        </p:txBody>
+      </p:sp>
+      <p:sp>
+        <p:nvSpPr>
+          <p:cNvPr id="28" name="円形吹き出し 27"/>
+          <p:cNvSpPr/>
+          <p:nvPr/>
+        </p:nvSpPr>
+        <p:spPr>
+          <a:xfrm>
+            <a:off x="5443408" y="1665279"/>
+            <a:ext cx="2409517" cy="872852"/>
+          </a:xfrm>
+          <a:prstGeom prst="wedgeEllipseCallout">
+            <a:avLst>
+              <a:gd name="adj1" fmla="val -47434"/>
+              <a:gd name="adj2" fmla="val -62691"/>
+            </a:avLst>
+          </a:prstGeom>
+          <a:solidFill>
+            <a:schemeClr val="bg1"/>
+          </a:solidFill>
+          <a:ln w="19050">
+            <a:solidFill>
+              <a:srgbClr val="008000"/>
+            </a:solidFill>
+          </a:ln>
+        </p:spPr>
+        <p:style>
+          <a:lnRef idx="1">
+            <a:schemeClr val="accent1"/>
+          </a:lnRef>
+          <a:fillRef idx="3">
+            <a:schemeClr val="accent1"/>
+          </a:fillRef>
+          <a:effectRef idx="2">
+            <a:schemeClr val="accent1"/>
+          </a:effectRef>
+          <a:fontRef idx="minor">
+            <a:schemeClr val="lt1"/>
+          </a:fontRef>
+        </p:style>
+        <p:txBody>
+          <a:bodyPr rtlCol="0" anchor="ctr"/>
+          <a:lstStyle/>
+          <a:p>
+            <a:pPr algn="ctr"/>
+            <a:endParaRPr kumimoji="1" lang="ja-JP" altLang="en-US" sz="1400" dirty="0">
+              <a:solidFill>
+                <a:schemeClr val="tx1"/>
+              </a:solidFill>
+              <a:latin typeface="メイリオ"/>
+              <a:ea typeface="メイリオ"/>
+              <a:cs typeface="メイリオ"/>
+            </a:endParaRPr>
+          </a:p>
+        </p:txBody>
+      </p:sp>
+      <p:sp>
+        <p:nvSpPr>
+          <p:cNvPr id="29" name="テキスト ボックス 28"/>
+          <p:cNvSpPr txBox="1"/>
+          <p:nvPr/>
+        </p:nvSpPr>
+        <p:spPr>
+          <a:xfrm>
+            <a:off x="5648428" y="1837660"/>
+            <a:ext cx="1980029" cy="523220"/>
+          </a:xfrm>
+          <a:prstGeom prst="rect">
+            <a:avLst/>
+          </a:prstGeom>
+          <a:noFill/>
+        </p:spPr>
+        <p:txBody>
+          <a:bodyPr wrap="none" rtlCol="0">
+            <a:spAutoFit/>
+          </a:bodyPr>
+          <a:lstStyle/>
+          <a:p>
+            <a:r>
+              <a:rPr lang="ja-JP" altLang="en-US" sz="1400" dirty="0" smtClean="0">
+                <a:latin typeface="メイリオ"/>
+                <a:ea typeface="メイリオ"/>
+                <a:cs typeface="メイリオ"/>
+              </a:rPr>
+              <a:t>アプリ起動時の</a:t>
+            </a:r>
+            <a:r>
+              <a:rPr lang="en-US" altLang="en-US" sz="1400" dirty="0" smtClean="0">
+                <a:latin typeface="メイリオ"/>
+                <a:ea typeface="メイリオ"/>
+                <a:cs typeface="メイリオ"/>
+              </a:rPr>
+              <a:t>日付が</a:t>
+            </a:r>
+          </a:p>
+          <a:p>
+            <a:r>
+              <a:rPr lang="ja-JP" altLang="en-US" sz="1400" dirty="0" smtClean="0">
+                <a:latin typeface="メイリオ"/>
+                <a:ea typeface="メイリオ"/>
+                <a:cs typeface="メイリオ"/>
+              </a:rPr>
+              <a:t>入力されている</a:t>
+            </a:r>
+            <a:endParaRPr lang="en-US" altLang="ja-JP" sz="1400" dirty="0" smtClean="0">
+              <a:latin typeface="メイリオ"/>
+              <a:ea typeface="メイリオ"/>
+              <a:cs typeface="メイリオ"/>
+            </a:endParaRPr>
+          </a:p>
+        </p:txBody>
+      </p:sp>
+    </p:spTree>
+    <p:extLst>
+      <p:ext uri="{BB962C8B-B14F-4D97-AF65-F5344CB8AC3E}">
+        <p14:creationId xmlns:p14="http://schemas.microsoft.com/office/powerpoint/2010/main" val="1486037018"/>
+      </p:ext>
+    </p:extLst>
+  </p:cSld>
+  <p:clrMapOvr>
+    <a:masterClrMapping/>
+  </p:clrMapOvr>
+</p:sld>
+</file>
+
+<file path=ppt/slides/slide4.xml><?xml version="1.0" encoding="utf-8"?>
+<p:sld xmlns:a="http://schemas.openxmlformats.org/drawingml/2006/main" xmlns:r="http://schemas.openxmlformats.org/officeDocument/2006/relationships" xmlns:p="http://schemas.openxmlformats.org/presentationml/2006/main">
+  <p:cSld>
+    <p:spTree>
+      <p:nvGrpSpPr>
+        <p:cNvPr id="1" name=""/>
+        <p:cNvGrpSpPr/>
+        <p:nvPr/>
+      </p:nvGrpSpPr>
+      <p:grpSpPr>
+        <a:xfrm>
+          <a:off x="0" y="0"/>
+          <a:ext cx="0" cy="0"/>
+          <a:chOff x="0" y="0"/>
+          <a:chExt cx="0" cy="0"/>
+        </a:xfrm>
+      </p:grpSpPr>
+      <p:sp>
+        <p:nvSpPr>
+          <p:cNvPr id="4" name="テキスト ボックス 3"/>
+          <p:cNvSpPr txBox="1"/>
+          <p:nvPr/>
+        </p:nvSpPr>
+        <p:spPr>
+          <a:xfrm>
+            <a:off x="200532" y="187161"/>
+            <a:ext cx="1980029" cy="523220"/>
+          </a:xfrm>
+          <a:prstGeom prst="rect">
+            <a:avLst/>
+          </a:prstGeom>
+          <a:noFill/>
+        </p:spPr>
+        <p:txBody>
+          <a:bodyPr wrap="none" rtlCol="0">
+            <a:spAutoFit/>
+          </a:bodyPr>
+          <a:lstStyle/>
+          <a:p>
+            <a:r>
+              <a:rPr lang="ja-JP" altLang="en-US" sz="2800" dirty="0" smtClean="0">
+                <a:latin typeface="メイリオ"/>
+                <a:ea typeface="メイリオ"/>
+                <a:cs typeface="メイリオ"/>
+              </a:rPr>
+              <a:t>登録失敗時</a:t>
+            </a:r>
+            <a:endParaRPr kumimoji="1" lang="ja-JP" altLang="en-US" sz="2000" dirty="0">
+              <a:latin typeface="メイリオ"/>
+              <a:ea typeface="メイリオ"/>
+              <a:cs typeface="メイリオ"/>
+            </a:endParaRPr>
+          </a:p>
+        </p:txBody>
+      </p:sp>
+      <p:sp>
+        <p:nvSpPr>
+          <p:cNvPr id="6" name="円形吹き出し 5"/>
+          <p:cNvSpPr/>
+          <p:nvPr/>
+        </p:nvSpPr>
+        <p:spPr>
+          <a:xfrm>
+            <a:off x="6207771" y="2338597"/>
+            <a:ext cx="2409517" cy="872852"/>
+          </a:xfrm>
+          <a:prstGeom prst="wedgeEllipseCallout">
+            <a:avLst>
+              <a:gd name="adj1" fmla="val -47434"/>
+              <a:gd name="adj2" fmla="val -62691"/>
+            </a:avLst>
+          </a:prstGeom>
+          <a:solidFill>
+            <a:schemeClr val="bg1"/>
+          </a:solidFill>
+          <a:ln w="19050">
+            <a:solidFill>
+              <a:srgbClr val="008000"/>
+            </a:solidFill>
+          </a:ln>
+        </p:spPr>
+        <p:style>
+          <a:lnRef idx="1">
+            <a:schemeClr val="accent1"/>
+          </a:lnRef>
+          <a:fillRef idx="3">
+            <a:schemeClr val="accent1"/>
+          </a:fillRef>
+          <a:effectRef idx="2">
+            <a:schemeClr val="accent1"/>
+          </a:effectRef>
+          <a:fontRef idx="minor">
+            <a:schemeClr val="lt1"/>
+          </a:fontRef>
+        </p:style>
+        <p:txBody>
+          <a:bodyPr rtlCol="0" anchor="ctr"/>
+          <a:lstStyle/>
+          <a:p>
+            <a:pPr algn="ctr"/>
+            <a:endParaRPr kumimoji="1" lang="ja-JP" altLang="en-US" sz="1400" dirty="0">
+              <a:solidFill>
+                <a:schemeClr val="tx1"/>
+              </a:solidFill>
+              <a:latin typeface="メイリオ"/>
+              <a:ea typeface="メイリオ"/>
+              <a:cs typeface="メイリオ"/>
+            </a:endParaRPr>
+          </a:p>
+        </p:txBody>
+      </p:sp>
+      <p:sp>
+        <p:nvSpPr>
+          <p:cNvPr id="7" name="テキスト ボックス 6"/>
+          <p:cNvSpPr txBox="1"/>
+          <p:nvPr/>
+        </p:nvSpPr>
+        <p:spPr>
+          <a:xfrm>
+            <a:off x="6530474" y="2542170"/>
+            <a:ext cx="1800493" cy="523220"/>
+          </a:xfrm>
+          <a:prstGeom prst="rect">
+            <a:avLst/>
+          </a:prstGeom>
+          <a:noFill/>
+        </p:spPr>
+        <p:txBody>
+          <a:bodyPr wrap="none" rtlCol="0">
+            <a:spAutoFit/>
+          </a:bodyPr>
+          <a:lstStyle/>
+          <a:p>
+            <a:r>
+              <a:rPr lang="ja-JP" altLang="en-US" sz="1400" dirty="0">
+                <a:latin typeface="メイリオ"/>
+                <a:ea typeface="メイリオ"/>
+                <a:cs typeface="メイリオ"/>
+              </a:rPr>
+              <a:t>入力が不正な項目</a:t>
+            </a:r>
+            <a:r>
+              <a:rPr lang="ja-JP" altLang="en-US" sz="1400" dirty="0" smtClean="0">
+                <a:latin typeface="メイリオ"/>
+                <a:ea typeface="メイリオ"/>
+                <a:cs typeface="メイリオ"/>
+              </a:rPr>
+              <a:t>に</a:t>
+            </a:r>
+            <a:endParaRPr lang="en-US" altLang="ja-JP" sz="1400" dirty="0" smtClean="0">
+              <a:latin typeface="メイリオ"/>
+              <a:ea typeface="メイリオ"/>
+              <a:cs typeface="メイリオ"/>
+            </a:endParaRPr>
+          </a:p>
+          <a:p>
+            <a:r>
+              <a:rPr lang="ja-JP" altLang="en-US" sz="1400" dirty="0" smtClean="0">
+                <a:latin typeface="メイリオ"/>
+                <a:ea typeface="メイリオ"/>
+                <a:cs typeface="メイリオ"/>
+              </a:rPr>
+              <a:t>マーク</a:t>
+            </a:r>
+            <a:r>
+              <a:rPr lang="ja-JP" altLang="en-US" sz="1400" dirty="0">
+                <a:latin typeface="メイリオ"/>
+                <a:ea typeface="メイリオ"/>
+                <a:cs typeface="メイリオ"/>
+              </a:rPr>
+              <a:t>が表示</a:t>
+            </a:r>
+            <a:r>
+              <a:rPr lang="ja-JP" altLang="en-US" sz="1400" dirty="0" smtClean="0">
+                <a:latin typeface="メイリオ"/>
+                <a:ea typeface="メイリオ"/>
+                <a:cs typeface="メイリオ"/>
+              </a:rPr>
+              <a:t>される</a:t>
+            </a:r>
+            <a:endParaRPr lang="ja-JP" altLang="en-US" sz="1400" dirty="0">
+              <a:latin typeface="メイリオ"/>
+              <a:ea typeface="メイリオ"/>
+              <a:cs typeface="メイリオ"/>
+            </a:endParaRPr>
+          </a:p>
+        </p:txBody>
+      </p:sp>
+      <p:grpSp>
+        <p:nvGrpSpPr>
+          <p:cNvPr id="2" name="図形グループ 1"/>
+          <p:cNvGrpSpPr/>
+          <p:nvPr/>
+        </p:nvGrpSpPr>
+        <p:grpSpPr>
+          <a:xfrm>
+            <a:off x="2399632" y="815476"/>
+            <a:ext cx="4130842" cy="5788523"/>
+            <a:chOff x="2399632" y="815476"/>
+            <a:chExt cx="4130842" cy="5788523"/>
+          </a:xfrm>
+        </p:grpSpPr>
+        <p:sp>
+          <p:nvSpPr>
+            <p:cNvPr id="5" name="正方形/長方形 4"/>
+            <p:cNvSpPr/>
+            <p:nvPr/>
+          </p:nvSpPr>
+          <p:spPr>
+            <a:xfrm>
+              <a:off x="2399632" y="815476"/>
+              <a:ext cx="4130842" cy="5788523"/>
+            </a:xfrm>
+            <a:prstGeom prst="rect">
+              <a:avLst/>
+            </a:prstGeom>
+            <a:noFill/>
+            <a:ln w="25400">
+              <a:solidFill>
+                <a:schemeClr val="tx1"/>
+              </a:solidFill>
+            </a:ln>
+            <a:effectLst/>
+          </p:spPr>
+          <p:style>
+            <a:lnRef idx="1">
+              <a:schemeClr val="accent1"/>
+            </a:lnRef>
+            <a:fillRef idx="3">
+              <a:schemeClr val="accent1"/>
+            </a:fillRef>
+            <a:effectRef idx="2">
+              <a:schemeClr val="accent1"/>
+            </a:effectRef>
+            <a:fontRef idx="minor">
+              <a:schemeClr val="lt1"/>
+            </a:fontRef>
+          </p:style>
+          <p:txBody>
+            <a:bodyPr rtlCol="0" anchor="ctr"/>
+            <a:lstStyle/>
+            <a:p>
+              <a:pPr algn="ctr"/>
+              <a:endParaRPr kumimoji="1" lang="ja-JP" altLang="en-US" sz="2800" dirty="0">
+                <a:solidFill>
+                  <a:schemeClr val="tx1"/>
+                </a:solidFill>
+                <a:latin typeface="メイリオ"/>
+                <a:ea typeface="メイリオ"/>
+                <a:cs typeface="メイリオ"/>
+              </a:endParaRPr>
+            </a:p>
+          </p:txBody>
+        </p:sp>
+        <p:sp>
+          <p:nvSpPr>
+            <p:cNvPr id="13" name="テキスト ボックス 12"/>
+            <p:cNvSpPr txBox="1"/>
+            <p:nvPr/>
+          </p:nvSpPr>
+          <p:spPr>
+            <a:xfrm>
+              <a:off x="3041515" y="1295947"/>
+              <a:ext cx="877163" cy="369332"/>
+            </a:xfrm>
+            <a:prstGeom prst="rect">
+              <a:avLst/>
+            </a:prstGeom>
+            <a:noFill/>
+            <a:ln>
+              <a:noFill/>
+            </a:ln>
+          </p:spPr>
+          <p:txBody>
+            <a:bodyPr wrap="none" rtlCol="0">
+              <a:spAutoFit/>
+            </a:bodyPr>
+            <a:lstStyle/>
+            <a:p>
+              <a:r>
+                <a:rPr kumimoji="1" lang="ja-JP" altLang="en-US" dirty="0" smtClean="0">
+                  <a:latin typeface="メイリオ"/>
+                  <a:ea typeface="メイリオ"/>
+                  <a:cs typeface="メイリオ"/>
+                </a:rPr>
+                <a:t>日付：</a:t>
+              </a:r>
+              <a:endParaRPr kumimoji="1" lang="ja-JP" altLang="en-US" dirty="0">
+                <a:latin typeface="メイリオ"/>
+                <a:ea typeface="メイリオ"/>
+                <a:cs typeface="メイリオ"/>
+              </a:endParaRPr>
+            </a:p>
+          </p:txBody>
+        </p:sp>
+        <p:sp>
+          <p:nvSpPr>
+            <p:cNvPr id="14" name="テキスト ボックス 13"/>
+            <p:cNvSpPr txBox="1"/>
+            <p:nvPr/>
+          </p:nvSpPr>
+          <p:spPr>
+            <a:xfrm>
+              <a:off x="3041515" y="1811337"/>
+              <a:ext cx="877163" cy="369332"/>
+            </a:xfrm>
+            <a:prstGeom prst="rect">
+              <a:avLst/>
+            </a:prstGeom>
+            <a:noFill/>
+            <a:ln>
+              <a:noFill/>
+            </a:ln>
+          </p:spPr>
+          <p:txBody>
+            <a:bodyPr wrap="none" rtlCol="0">
+              <a:spAutoFit/>
+            </a:bodyPr>
+            <a:lstStyle/>
+            <a:p>
+              <a:r>
+                <a:rPr lang="ja-JP" altLang="en-US" dirty="0" smtClean="0">
+                  <a:latin typeface="メイリオ"/>
+                  <a:ea typeface="メイリオ"/>
+                  <a:cs typeface="メイリオ"/>
+                </a:rPr>
+                <a:t>内容</a:t>
+              </a:r>
+              <a:r>
+                <a:rPr kumimoji="1" lang="ja-JP" altLang="en-US" dirty="0" smtClean="0">
+                  <a:latin typeface="メイリオ"/>
+                  <a:ea typeface="メイリオ"/>
+                  <a:cs typeface="メイリオ"/>
+                </a:rPr>
+                <a:t>：</a:t>
+              </a:r>
+              <a:endParaRPr kumimoji="1" lang="ja-JP" altLang="en-US" dirty="0">
+                <a:latin typeface="メイリオ"/>
+                <a:ea typeface="メイリオ"/>
+                <a:cs typeface="メイリオ"/>
+              </a:endParaRPr>
+            </a:p>
+          </p:txBody>
+        </p:sp>
+        <p:sp>
+          <p:nvSpPr>
+            <p:cNvPr id="15" name="テキスト ボックス 14"/>
+            <p:cNvSpPr txBox="1"/>
+            <p:nvPr/>
+          </p:nvSpPr>
+          <p:spPr>
+            <a:xfrm>
+              <a:off x="2579850" y="2326727"/>
+              <a:ext cx="1338828" cy="369332"/>
+            </a:xfrm>
+            <a:prstGeom prst="rect">
+              <a:avLst/>
+            </a:prstGeom>
+            <a:noFill/>
+            <a:ln>
+              <a:noFill/>
+            </a:ln>
+          </p:spPr>
+          <p:txBody>
+            <a:bodyPr wrap="none" rtlCol="0">
+              <a:spAutoFit/>
+            </a:bodyPr>
+            <a:lstStyle/>
+            <a:p>
+              <a:r>
+                <a:rPr lang="ja-JP" altLang="en-US" dirty="0" smtClean="0">
+                  <a:latin typeface="メイリオ"/>
+                  <a:ea typeface="メイリオ"/>
+                  <a:cs typeface="メイリオ"/>
+                </a:rPr>
+                <a:t>カテゴリ</a:t>
+              </a:r>
+              <a:r>
+                <a:rPr kumimoji="1" lang="ja-JP" altLang="en-US" dirty="0" smtClean="0">
+                  <a:latin typeface="メイリオ"/>
+                  <a:ea typeface="メイリオ"/>
+                  <a:cs typeface="メイリオ"/>
+                </a:rPr>
+                <a:t>：</a:t>
+              </a:r>
+              <a:endParaRPr kumimoji="1" lang="ja-JP" altLang="en-US" dirty="0">
+                <a:latin typeface="メイリオ"/>
+                <a:ea typeface="メイリオ"/>
+                <a:cs typeface="メイリオ"/>
+              </a:endParaRPr>
+            </a:p>
+          </p:txBody>
+        </p:sp>
+        <p:sp>
+          <p:nvSpPr>
+            <p:cNvPr id="16" name="テキスト ボックス 15"/>
+            <p:cNvSpPr txBox="1"/>
+            <p:nvPr/>
+          </p:nvSpPr>
+          <p:spPr>
+            <a:xfrm>
+              <a:off x="3041515" y="2842117"/>
+              <a:ext cx="877163" cy="369332"/>
+            </a:xfrm>
+            <a:prstGeom prst="rect">
+              <a:avLst/>
+            </a:prstGeom>
+            <a:noFill/>
+            <a:ln>
+              <a:noFill/>
+            </a:ln>
+          </p:spPr>
+          <p:txBody>
+            <a:bodyPr wrap="none" rtlCol="0">
+              <a:spAutoFit/>
+            </a:bodyPr>
+            <a:lstStyle/>
+            <a:p>
+              <a:r>
+                <a:rPr lang="ja-JP" altLang="en-US" dirty="0" smtClean="0">
+                  <a:latin typeface="メイリオ"/>
+                  <a:ea typeface="メイリオ"/>
+                  <a:cs typeface="メイリオ"/>
+                </a:rPr>
+                <a:t>金額</a:t>
+              </a:r>
+              <a:r>
+                <a:rPr kumimoji="1" lang="ja-JP" altLang="en-US" dirty="0" smtClean="0">
+                  <a:latin typeface="メイリオ"/>
+                  <a:ea typeface="メイリオ"/>
+                  <a:cs typeface="メイリオ"/>
+                </a:rPr>
+                <a:t>：</a:t>
+              </a:r>
+              <a:endParaRPr kumimoji="1" lang="ja-JP" altLang="en-US" dirty="0">
+                <a:latin typeface="メイリオ"/>
+                <a:ea typeface="メイリオ"/>
+                <a:cs typeface="メイリオ"/>
+              </a:endParaRPr>
+            </a:p>
+          </p:txBody>
+        </p:sp>
+        <p:sp>
+          <p:nvSpPr>
+            <p:cNvPr id="18" name="角丸四角形 17"/>
+            <p:cNvSpPr/>
+            <p:nvPr/>
+          </p:nvSpPr>
+          <p:spPr>
+            <a:xfrm>
+              <a:off x="3041515" y="5982125"/>
+              <a:ext cx="1243263" cy="360947"/>
+            </a:xfrm>
+            <a:prstGeom prst="roundRect">
+              <a:avLst/>
+            </a:prstGeom>
+            <a:noFill/>
+            <a:ln w="25400">
+              <a:solidFill>
+                <a:schemeClr val="tx1"/>
+              </a:solidFill>
+            </a:ln>
+            <a:effectLst/>
+          </p:spPr>
+          <p:style>
+            <a:lnRef idx="1">
+              <a:schemeClr val="accent1"/>
+            </a:lnRef>
+            <a:fillRef idx="3">
+              <a:schemeClr val="accent1"/>
+            </a:fillRef>
+            <a:effectRef idx="2">
+              <a:schemeClr val="accent1"/>
+            </a:effectRef>
+            <a:fontRef idx="minor">
+              <a:schemeClr val="lt1"/>
+            </a:fontRef>
+          </p:style>
+          <p:txBody>
+            <a:bodyPr rtlCol="0" anchor="ctr"/>
+            <a:lstStyle/>
+            <a:p>
+              <a:pPr algn="ctr"/>
+              <a:r>
+                <a:rPr lang="ja-JP" altLang="en-US" dirty="0" smtClean="0">
+                  <a:solidFill>
+                    <a:schemeClr val="tx1"/>
+                  </a:solidFill>
+                  <a:latin typeface="メイリオ"/>
+                  <a:ea typeface="メイリオ"/>
+                  <a:cs typeface="メイリオ"/>
+                </a:rPr>
+                <a:t>登録</a:t>
+              </a:r>
+              <a:endParaRPr lang="en-US" altLang="ja-JP" dirty="0" smtClean="0">
+                <a:solidFill>
+                  <a:schemeClr val="tx1"/>
+                </a:solidFill>
+                <a:latin typeface="メイリオ"/>
+                <a:ea typeface="メイリオ"/>
+                <a:cs typeface="メイリオ"/>
+              </a:endParaRPr>
+            </a:p>
+          </p:txBody>
+        </p:sp>
+        <p:sp>
+          <p:nvSpPr>
+            <p:cNvPr id="19" name="角丸四角形 18"/>
+            <p:cNvSpPr/>
+            <p:nvPr/>
+          </p:nvSpPr>
+          <p:spPr>
+            <a:xfrm>
+              <a:off x="4610962" y="5982125"/>
+              <a:ext cx="1243263" cy="360947"/>
+            </a:xfrm>
+            <a:prstGeom prst="roundRect">
+              <a:avLst/>
+            </a:prstGeom>
+            <a:noFill/>
+            <a:ln w="25400">
+              <a:solidFill>
+                <a:schemeClr val="tx1"/>
+              </a:solidFill>
+            </a:ln>
+            <a:effectLst/>
+          </p:spPr>
+          <p:style>
+            <a:lnRef idx="1">
+              <a:schemeClr val="accent1"/>
+            </a:lnRef>
+            <a:fillRef idx="3">
+              <a:schemeClr val="accent1"/>
+            </a:fillRef>
+            <a:effectRef idx="2">
+              <a:schemeClr val="accent1"/>
+            </a:effectRef>
+            <a:fontRef idx="minor">
+              <a:schemeClr val="lt1"/>
+            </a:fontRef>
+          </p:style>
+          <p:txBody>
+            <a:bodyPr rtlCol="0" anchor="ctr"/>
+            <a:lstStyle/>
+            <a:p>
+              <a:pPr algn="ctr"/>
+              <a:r>
+                <a:rPr lang="ja-JP" altLang="en-US" dirty="0" smtClean="0">
+                  <a:solidFill>
+                    <a:schemeClr val="tx1"/>
+                  </a:solidFill>
+                  <a:latin typeface="メイリオ"/>
+                  <a:ea typeface="メイリオ"/>
+                  <a:cs typeface="メイリオ"/>
+                </a:rPr>
+                <a:t>取消</a:t>
+              </a:r>
+              <a:endParaRPr lang="en-US" altLang="ja-JP" dirty="0" smtClean="0">
+                <a:solidFill>
+                  <a:schemeClr val="tx1"/>
+                </a:solidFill>
+                <a:latin typeface="メイリオ"/>
+                <a:ea typeface="メイリオ"/>
+                <a:cs typeface="メイリオ"/>
+              </a:endParaRPr>
+            </a:p>
+          </p:txBody>
+        </p:sp>
+        <p:sp>
+          <p:nvSpPr>
+            <p:cNvPr id="20" name="正方形/長方形 19"/>
+            <p:cNvSpPr/>
+            <p:nvPr/>
+          </p:nvSpPr>
+          <p:spPr>
+            <a:xfrm>
+              <a:off x="3918678" y="1295947"/>
+              <a:ext cx="1935547" cy="369332"/>
+            </a:xfrm>
+            <a:prstGeom prst="rect">
+              <a:avLst/>
+            </a:prstGeom>
+            <a:noFill/>
+            <a:ln w="25400">
+              <a:solidFill>
+                <a:schemeClr val="tx1"/>
+              </a:solidFill>
+            </a:ln>
+            <a:effectLst/>
+          </p:spPr>
+          <p:style>
+            <a:lnRef idx="1">
+              <a:schemeClr val="accent1"/>
+            </a:lnRef>
+            <a:fillRef idx="3">
+              <a:schemeClr val="accent1"/>
+            </a:fillRef>
+            <a:effectRef idx="2">
+              <a:schemeClr val="accent1"/>
+            </a:effectRef>
+            <a:fontRef idx="minor">
+              <a:schemeClr val="lt1"/>
+            </a:fontRef>
+          </p:style>
+          <p:txBody>
+            <a:bodyPr rtlCol="0" anchor="ctr"/>
+            <a:lstStyle/>
+            <a:p>
+              <a:pPr algn="ctr"/>
+              <a:endParaRPr kumimoji="1" lang="ja-JP" altLang="en-US">
+                <a:solidFill>
+                  <a:schemeClr val="tx1"/>
+                </a:solidFill>
+              </a:endParaRPr>
+            </a:p>
+          </p:txBody>
+        </p:sp>
+        <p:sp>
+          <p:nvSpPr>
+            <p:cNvPr id="21" name="正方形/長方形 20"/>
+            <p:cNvSpPr/>
+            <p:nvPr/>
+          </p:nvSpPr>
+          <p:spPr>
+            <a:xfrm>
+              <a:off x="3918678" y="1814570"/>
+              <a:ext cx="1935547" cy="369332"/>
+            </a:xfrm>
+            <a:prstGeom prst="rect">
+              <a:avLst/>
+            </a:prstGeom>
+            <a:noFill/>
+            <a:ln w="25400">
+              <a:solidFill>
+                <a:schemeClr val="tx1"/>
+              </a:solidFill>
+            </a:ln>
+            <a:effectLst/>
+          </p:spPr>
+          <p:style>
+            <a:lnRef idx="1">
+              <a:schemeClr val="accent1"/>
+            </a:lnRef>
+            <a:fillRef idx="3">
+              <a:schemeClr val="accent1"/>
+            </a:fillRef>
+            <a:effectRef idx="2">
+              <a:schemeClr val="accent1"/>
+            </a:effectRef>
+            <a:fontRef idx="minor">
+              <a:schemeClr val="lt1"/>
+            </a:fontRef>
+          </p:style>
+          <p:txBody>
+            <a:bodyPr rtlCol="0" anchor="ctr"/>
+            <a:lstStyle/>
+            <a:p>
+              <a:pPr algn="ctr"/>
+              <a:endParaRPr kumimoji="1" lang="ja-JP" altLang="en-US">
+                <a:solidFill>
+                  <a:schemeClr val="tx1"/>
+                </a:solidFill>
+              </a:endParaRPr>
+            </a:p>
+          </p:txBody>
+        </p:sp>
+        <p:sp>
+          <p:nvSpPr>
+            <p:cNvPr id="22" name="正方形/長方形 21"/>
+            <p:cNvSpPr/>
+            <p:nvPr/>
+          </p:nvSpPr>
+          <p:spPr>
+            <a:xfrm>
+              <a:off x="3918678" y="2842117"/>
+              <a:ext cx="1935547" cy="369332"/>
+            </a:xfrm>
+            <a:prstGeom prst="rect">
+              <a:avLst/>
+            </a:prstGeom>
+            <a:noFill/>
+            <a:ln w="25400">
+              <a:solidFill>
+                <a:schemeClr val="tx1"/>
+              </a:solidFill>
+            </a:ln>
+            <a:effectLst/>
+          </p:spPr>
+          <p:style>
+            <a:lnRef idx="1">
+              <a:schemeClr val="accent1"/>
+            </a:lnRef>
+            <a:fillRef idx="3">
+              <a:schemeClr val="accent1"/>
+            </a:fillRef>
+            <a:effectRef idx="2">
+              <a:schemeClr val="accent1"/>
+            </a:effectRef>
+            <a:fontRef idx="minor">
+              <a:schemeClr val="lt1"/>
+            </a:fontRef>
+          </p:style>
+          <p:txBody>
+            <a:bodyPr rtlCol="0" anchor="ctr"/>
+            <a:lstStyle/>
+            <a:p>
+              <a:pPr algn="ctr"/>
+              <a:endParaRPr kumimoji="1" lang="ja-JP" altLang="en-US">
+                <a:solidFill>
+                  <a:schemeClr val="tx1"/>
+                </a:solidFill>
+              </a:endParaRPr>
+            </a:p>
+          </p:txBody>
+        </p:sp>
+        <p:sp>
+          <p:nvSpPr>
+            <p:cNvPr id="23" name="正方形/長方形 22"/>
+            <p:cNvSpPr/>
+            <p:nvPr/>
+          </p:nvSpPr>
+          <p:spPr>
+            <a:xfrm>
+              <a:off x="3918678" y="2326727"/>
+              <a:ext cx="1935547" cy="369332"/>
+            </a:xfrm>
+            <a:prstGeom prst="rect">
+              <a:avLst/>
+            </a:prstGeom>
+            <a:noFill/>
+            <a:ln w="25400">
+              <a:solidFill>
+                <a:schemeClr val="tx1"/>
+              </a:solidFill>
+            </a:ln>
+            <a:effectLst/>
+          </p:spPr>
+          <p:style>
+            <a:lnRef idx="1">
+              <a:schemeClr val="accent1"/>
+            </a:lnRef>
+            <a:fillRef idx="3">
+              <a:schemeClr val="accent1"/>
+            </a:fillRef>
+            <a:effectRef idx="2">
+              <a:schemeClr val="accent1"/>
+            </a:effectRef>
+            <a:fontRef idx="minor">
+              <a:schemeClr val="lt1"/>
+            </a:fontRef>
+          </p:style>
+          <p:txBody>
+            <a:bodyPr rtlCol="0" anchor="ctr"/>
+            <a:lstStyle/>
+            <a:p>
+              <a:pPr algn="ctr"/>
+              <a:endParaRPr kumimoji="1" lang="ja-JP" altLang="en-US">
+                <a:solidFill>
+                  <a:schemeClr val="tx1"/>
+                </a:solidFill>
+              </a:endParaRPr>
+            </a:p>
+          </p:txBody>
+        </p:sp>
+        <p:sp>
+          <p:nvSpPr>
+            <p:cNvPr id="24" name="円/楕円 23"/>
+            <p:cNvSpPr/>
+            <p:nvPr/>
+          </p:nvSpPr>
+          <p:spPr>
+            <a:xfrm>
+              <a:off x="3635449" y="3464224"/>
+              <a:ext cx="163286" cy="179456"/>
+            </a:xfrm>
+            <a:prstGeom prst="ellipse">
+              <a:avLst/>
+            </a:prstGeom>
+            <a:solidFill>
+              <a:schemeClr val="tx1"/>
+            </a:solidFill>
+            <a:ln>
+              <a:solidFill>
+                <a:schemeClr val="tx1"/>
+              </a:solidFill>
+            </a:ln>
+            <a:effectLst/>
+          </p:spPr>
+          <p:style>
+            <a:lnRef idx="1">
+              <a:schemeClr val="accent1"/>
+            </a:lnRef>
+            <a:fillRef idx="3">
+              <a:schemeClr val="accent1"/>
+            </a:fillRef>
+            <a:effectRef idx="2">
+              <a:schemeClr val="accent1"/>
+            </a:effectRef>
+            <a:fontRef idx="minor">
+              <a:schemeClr val="lt1"/>
+            </a:fontRef>
+          </p:style>
+          <p:txBody>
+            <a:bodyPr rtlCol="0" anchor="ctr"/>
+            <a:lstStyle/>
+            <a:p>
+              <a:pPr algn="ctr"/>
+              <a:endParaRPr kumimoji="1" lang="ja-JP" altLang="en-US">
+                <a:solidFill>
+                  <a:schemeClr val="tx1"/>
+                </a:solidFill>
+              </a:endParaRPr>
+            </a:p>
+          </p:txBody>
+        </p:sp>
+        <p:sp>
+          <p:nvSpPr>
+            <p:cNvPr id="25" name="テキスト ボックス 24"/>
+            <p:cNvSpPr txBox="1"/>
+            <p:nvPr/>
+          </p:nvSpPr>
+          <p:spPr>
+            <a:xfrm>
+              <a:off x="3814371" y="3370783"/>
+              <a:ext cx="646331" cy="369332"/>
+            </a:xfrm>
+            <a:prstGeom prst="rect">
+              <a:avLst/>
+            </a:prstGeom>
+            <a:noFill/>
+            <a:ln>
+              <a:noFill/>
+            </a:ln>
+          </p:spPr>
+          <p:txBody>
+            <a:bodyPr wrap="none" rtlCol="0">
+              <a:spAutoFit/>
+            </a:bodyPr>
+            <a:lstStyle/>
+            <a:p>
+              <a:r>
+                <a:rPr lang="ja-JP" altLang="en-US" dirty="0" smtClean="0">
+                  <a:latin typeface="メイリオ"/>
+                  <a:ea typeface="メイリオ"/>
+                  <a:cs typeface="メイリオ"/>
+                </a:rPr>
+                <a:t>収入</a:t>
+              </a:r>
+              <a:endParaRPr kumimoji="1" lang="ja-JP" altLang="en-US" dirty="0">
+                <a:latin typeface="メイリオ"/>
+                <a:ea typeface="メイリオ"/>
+                <a:cs typeface="メイリオ"/>
+              </a:endParaRPr>
+            </a:p>
+          </p:txBody>
+        </p:sp>
+        <p:sp>
+          <p:nvSpPr>
+            <p:cNvPr id="26" name="円/楕円 25"/>
+            <p:cNvSpPr/>
+            <p:nvPr/>
+          </p:nvSpPr>
+          <p:spPr>
+            <a:xfrm>
+              <a:off x="4530000" y="3467034"/>
+              <a:ext cx="163286" cy="179456"/>
+            </a:xfrm>
+            <a:prstGeom prst="ellipse">
+              <a:avLst/>
+            </a:prstGeom>
+            <a:solidFill>
+              <a:schemeClr val="tx1"/>
+            </a:solidFill>
+            <a:ln>
+              <a:solidFill>
+                <a:schemeClr val="tx1"/>
+              </a:solidFill>
+            </a:ln>
+            <a:effectLst/>
+          </p:spPr>
+          <p:style>
+            <a:lnRef idx="1">
+              <a:schemeClr val="accent1"/>
+            </a:lnRef>
+            <a:fillRef idx="3">
+              <a:schemeClr val="accent1"/>
+            </a:fillRef>
+            <a:effectRef idx="2">
+              <a:schemeClr val="accent1"/>
+            </a:effectRef>
+            <a:fontRef idx="minor">
+              <a:schemeClr val="lt1"/>
+            </a:fontRef>
+          </p:style>
+          <p:txBody>
+            <a:bodyPr rtlCol="0" anchor="ctr"/>
+            <a:lstStyle/>
+            <a:p>
+              <a:pPr algn="ctr"/>
+              <a:endParaRPr kumimoji="1" lang="ja-JP" altLang="en-US">
+                <a:solidFill>
+                  <a:schemeClr val="tx1"/>
+                </a:solidFill>
+              </a:endParaRPr>
+            </a:p>
+          </p:txBody>
+        </p:sp>
+        <p:sp>
+          <p:nvSpPr>
+            <p:cNvPr id="27" name="テキスト ボックス 26"/>
+            <p:cNvSpPr txBox="1"/>
+            <p:nvPr/>
+          </p:nvSpPr>
+          <p:spPr>
+            <a:xfrm>
+              <a:off x="4708922" y="3360225"/>
+              <a:ext cx="646331" cy="369332"/>
+            </a:xfrm>
+            <a:prstGeom prst="rect">
+              <a:avLst/>
+            </a:prstGeom>
+            <a:noFill/>
+            <a:ln>
+              <a:noFill/>
+            </a:ln>
+          </p:spPr>
+          <p:txBody>
+            <a:bodyPr wrap="none" rtlCol="0">
+              <a:spAutoFit/>
+            </a:bodyPr>
+            <a:lstStyle/>
+            <a:p>
+              <a:r>
+                <a:rPr lang="ja-JP" altLang="en-US" dirty="0" smtClean="0">
+                  <a:latin typeface="メイリオ"/>
+                  <a:ea typeface="メイリオ"/>
+                  <a:cs typeface="メイリオ"/>
+                </a:rPr>
+                <a:t>支出</a:t>
+              </a:r>
+              <a:endParaRPr kumimoji="1" lang="ja-JP" altLang="en-US" dirty="0">
+                <a:latin typeface="メイリオ"/>
+                <a:ea typeface="メイリオ"/>
+                <a:cs typeface="メイリオ"/>
+              </a:endParaRPr>
+            </a:p>
+          </p:txBody>
+        </p:sp>
+        <p:sp>
+          <p:nvSpPr>
             <p:cNvPr id="3" name="星 7 2"/>
             <p:cNvSpPr/>
             <p:nvPr/>
@@ -5941,140 +7577,113 @@
             </a:p>
           </p:txBody>
         </p:sp>
-      </p:grpSp>
-      <p:sp>
-        <p:nvSpPr>
-          <p:cNvPr id="6" name="円形吹き出し 5"/>
-          <p:cNvSpPr/>
-          <p:nvPr/>
-        </p:nvSpPr>
-        <p:spPr>
-          <a:xfrm>
-            <a:off x="6207771" y="2338597"/>
-            <a:ext cx="2409517" cy="872852"/>
-          </a:xfrm>
-          <a:prstGeom prst="wedgeEllipseCallout">
-            <a:avLst>
-              <a:gd name="adj1" fmla="val -47434"/>
-              <a:gd name="adj2" fmla="val -62691"/>
-            </a:avLst>
-          </a:prstGeom>
-          <a:solidFill>
-            <a:schemeClr val="bg1"/>
-          </a:solidFill>
-          <a:ln w="19050">
-            <a:solidFill>
-              <a:srgbClr val="008000"/>
-            </a:solidFill>
-          </a:ln>
-        </p:spPr>
-        <p:style>
-          <a:lnRef idx="1">
-            <a:schemeClr val="accent1"/>
-          </a:lnRef>
-          <a:fillRef idx="3">
-            <a:schemeClr val="accent1"/>
-          </a:fillRef>
-          <a:effectRef idx="2">
-            <a:schemeClr val="accent1"/>
-          </a:effectRef>
-          <a:fontRef idx="minor">
-            <a:schemeClr val="lt1"/>
-          </a:fontRef>
-        </p:style>
-        <p:txBody>
-          <a:bodyPr rtlCol="0" anchor="ctr"/>
-          <a:lstStyle/>
-          <a:p>
-            <a:pPr algn="ctr"/>
-            <a:endParaRPr kumimoji="1" lang="ja-JP" altLang="en-US" sz="1400" dirty="0">
-              <a:solidFill>
-                <a:schemeClr val="tx1"/>
-              </a:solidFill>
-              <a:latin typeface="メイリオ"/>
-              <a:ea typeface="メイリオ"/>
-              <a:cs typeface="メイリオ"/>
-            </a:endParaRPr>
-          </a:p>
-        </p:txBody>
-      </p:sp>
-      <p:sp>
-        <p:nvSpPr>
-          <p:cNvPr id="7" name="テキスト ボックス 6"/>
-          <p:cNvSpPr txBox="1"/>
-          <p:nvPr/>
-        </p:nvSpPr>
-        <p:spPr>
-          <a:xfrm>
-            <a:off x="6530474" y="2542170"/>
-            <a:ext cx="1800493" cy="523220"/>
-          </a:xfrm>
-          <a:prstGeom prst="rect">
-            <a:avLst/>
-          </a:prstGeom>
-          <a:noFill/>
-        </p:spPr>
-        <p:txBody>
-          <a:bodyPr wrap="none" rtlCol="0">
-            <a:spAutoFit/>
-          </a:bodyPr>
-          <a:lstStyle/>
-          <a:p>
-            <a:r>
-              <a:rPr lang="ja-JP" altLang="en-US" sz="1400" dirty="0">
+        <p:sp>
+          <p:nvSpPr>
+            <p:cNvPr id="29" name="テキスト ボックス 28"/>
+            <p:cNvSpPr txBox="1"/>
+            <p:nvPr/>
+          </p:nvSpPr>
+          <p:spPr>
+            <a:xfrm>
+              <a:off x="3041515" y="4056699"/>
+              <a:ext cx="877163" cy="369332"/>
+            </a:xfrm>
+            <a:prstGeom prst="rect">
+              <a:avLst/>
+            </a:prstGeom>
+            <a:noFill/>
+            <a:ln>
+              <a:noFill/>
+            </a:ln>
+          </p:spPr>
+          <p:txBody>
+            <a:bodyPr wrap="none" rtlCol="0">
+              <a:spAutoFit/>
+            </a:bodyPr>
+            <a:lstStyle/>
+            <a:p>
+              <a:r>
+                <a:rPr lang="en-US" altLang="en-US" dirty="0" smtClean="0">
+                  <a:latin typeface="メイリオ"/>
+                  <a:ea typeface="メイリオ"/>
+                  <a:cs typeface="メイリオ"/>
+                </a:rPr>
+                <a:t>収支</a:t>
+              </a:r>
+              <a:r>
+                <a:rPr kumimoji="1" lang="ja-JP" altLang="en-US" dirty="0" smtClean="0">
+                  <a:latin typeface="メイリオ"/>
+                  <a:ea typeface="メイリオ"/>
+                  <a:cs typeface="メイリオ"/>
+                </a:rPr>
+                <a:t>：</a:t>
+              </a:r>
+              <a:endParaRPr kumimoji="1" lang="ja-JP" altLang="en-US" dirty="0">
                 <a:latin typeface="メイリオ"/>
                 <a:ea typeface="メイリオ"/>
                 <a:cs typeface="メイリオ"/>
-              </a:rPr>
-              <a:t>入力が不正な項目</a:t>
-            </a:r>
-            <a:r>
-              <a:rPr lang="ja-JP" altLang="en-US" sz="1400" dirty="0" smtClean="0">
+              </a:endParaRPr>
+            </a:p>
+          </p:txBody>
+        </p:sp>
+        <p:sp>
+          <p:nvSpPr>
+            <p:cNvPr id="30" name="テキスト ボックス 29"/>
+            <p:cNvSpPr txBox="1"/>
+            <p:nvPr/>
+          </p:nvSpPr>
+          <p:spPr>
+            <a:xfrm>
+              <a:off x="4669812" y="4056699"/>
+              <a:ext cx="1184413" cy="369332"/>
+            </a:xfrm>
+            <a:prstGeom prst="rect">
+              <a:avLst/>
+            </a:prstGeom>
+            <a:noFill/>
+            <a:ln>
+              <a:noFill/>
+            </a:ln>
+          </p:spPr>
+          <p:txBody>
+            <a:bodyPr wrap="square" rtlCol="0">
+              <a:spAutoFit/>
+            </a:bodyPr>
+            <a:lstStyle/>
+            <a:p>
+              <a:r>
+                <a:rPr lang="en-US" altLang="ja-JP" dirty="0" err="1" smtClean="0">
+                  <a:latin typeface="メイリオ"/>
+                  <a:ea typeface="メイリオ"/>
+                  <a:cs typeface="メイリオ"/>
+                </a:rPr>
+                <a:t>xxxxx</a:t>
+              </a:r>
+              <a:r>
+                <a:rPr lang="en-US" altLang="ja-JP" dirty="0">
+                  <a:latin typeface="メイリオ"/>
+                  <a:ea typeface="メイリオ"/>
+                  <a:cs typeface="メイリオ"/>
+                </a:rPr>
+                <a:t> </a:t>
+              </a:r>
+              <a:r>
+                <a:rPr lang="ja-JP" altLang="en-US" dirty="0" smtClean="0">
+                  <a:latin typeface="メイリオ"/>
+                  <a:ea typeface="メイリオ"/>
+                  <a:cs typeface="メイリオ"/>
+                </a:rPr>
+                <a:t>円</a:t>
+              </a:r>
+              <a:endParaRPr kumimoji="1" lang="ja-JP" altLang="en-US" dirty="0">
                 <a:latin typeface="メイリオ"/>
                 <a:ea typeface="メイリオ"/>
                 <a:cs typeface="メイリオ"/>
-              </a:rPr>
-              <a:t>に</a:t>
-            </a:r>
-            <a:endParaRPr lang="en-US" altLang="ja-JP" sz="1400" dirty="0" smtClean="0">
-              <a:latin typeface="メイリオ"/>
-              <a:ea typeface="メイリオ"/>
-              <a:cs typeface="メイリオ"/>
-            </a:endParaRPr>
-          </a:p>
-          <a:p>
-            <a:r>
-              <a:rPr lang="ja-JP" altLang="en-US" sz="1400" dirty="0" smtClean="0">
-                <a:latin typeface="メイリオ"/>
-                <a:ea typeface="メイリオ"/>
-                <a:cs typeface="メイリオ"/>
-              </a:rPr>
-              <a:t>マーク</a:t>
-            </a:r>
-            <a:r>
-              <a:rPr lang="ja-JP" altLang="en-US" sz="1400" dirty="0">
-                <a:latin typeface="メイリオ"/>
-                <a:ea typeface="メイリオ"/>
-                <a:cs typeface="メイリオ"/>
-              </a:rPr>
-              <a:t>が表示</a:t>
-            </a:r>
-            <a:r>
-              <a:rPr lang="ja-JP" altLang="en-US" sz="1400" dirty="0" smtClean="0">
-                <a:latin typeface="メイリオ"/>
-                <a:ea typeface="メイリオ"/>
-                <a:cs typeface="メイリオ"/>
-              </a:rPr>
-              <a:t>される</a:t>
-            </a:r>
-            <a:endParaRPr lang="ja-JP" altLang="en-US" sz="1400" dirty="0">
-              <a:latin typeface="メイリオ"/>
-              <a:ea typeface="メイリオ"/>
-              <a:cs typeface="メイリオ"/>
-            </a:endParaRPr>
-          </a:p>
-        </p:txBody>
-      </p:sp>
+              </a:endParaRPr>
+            </a:p>
+          </p:txBody>
+        </p:sp>
+      </p:grpSp>
     </p:spTree>
     <p:extLst>
       <p:ext uri="{BB962C8B-B14F-4D97-AF65-F5344CB8AC3E}">

</xml_diff>